<commit_message>
reorganize and new plots for kalman filter analysis
</commit_message>
<xml_diff>
--- a/Presentations/Kalman Filter.pptx
+++ b/Presentations/Kalman Filter.pptx
@@ -5,10 +5,10 @@
     <p:sldMasterId id="2147483648" r:id="rId3"/>
   </p:sldMasterIdLst>
   <p:notesMasterIdLst>
-    <p:notesMasterId r:id="rId15"/>
+    <p:notesMasterId r:id="rId17"/>
   </p:notesMasterIdLst>
   <p:handoutMasterIdLst>
-    <p:handoutMasterId r:id="rId16"/>
+    <p:handoutMasterId r:id="rId18"/>
   </p:handoutMasterIdLst>
   <p:sldIdLst>
     <p:sldId id="391" r:id="rId4"/>
@@ -22,6 +22,8 @@
     <p:sldId id="404" r:id="rId12"/>
     <p:sldId id="405" r:id="rId13"/>
     <p:sldId id="407" r:id="rId14"/>
+    <p:sldId id="408" r:id="rId15"/>
+    <p:sldId id="409" r:id="rId16"/>
   </p:sldIdLst>
   <p:sldSz cx="12192000" cy="6858000"/>
   <p:notesSz cx="6858000" cy="9144000"/>
@@ -244,7 +246,7 @@
             <a:pPr rtl="0"/>
             <a:fld id="{444DDF42-EA81-4D58-9E48-71D338B26FAC}" type="datetime1">
               <a:rPr lang="it-IT" smtClean="0"/>
-              <a:t>09/10/2020</a:t>
+              <a:t>25/10/2020</a:t>
             </a:fld>
             <a:endParaRPr lang="it-IT" dirty="0"/>
           </a:p>
@@ -425,7 +427,7 @@
             <a:fld id="{FABFCAD0-C8D4-46EE-8714-3DAE081602B2}" type="datetime1">
               <a:rPr lang="it-IT" smtClean="0"/>
               <a:pPr/>
-              <a:t>09/10/2020</a:t>
+              <a:t>25/10/2020</a:t>
             </a:fld>
             <a:endParaRPr lang="it-IT" dirty="0"/>
           </a:p>
@@ -6711,8 +6713,8 @@
           </a:p>
         </p:txBody>
       </p:sp>
-      <mc:AlternateContent xmlns:mc="http://schemas.openxmlformats.org/markup-compatibility/2006">
-        <mc:Choice xmlns:a14="http://schemas.microsoft.com/office/drawing/2010/main" Requires="a14">
+      <mc:AlternateContent xmlns:mc="http://schemas.openxmlformats.org/markup-compatibility/2006" xmlns:a14="http://schemas.microsoft.com/office/drawing/2010/main">
+        <mc:Choice Requires="a14">
           <p:sp>
             <p:nvSpPr>
               <p:cNvPr id="8" name="TextBox 7">
@@ -6909,7 +6911,7 @@
             </p:txBody>
           </p:sp>
         </mc:Choice>
-        <mc:Fallback>
+        <mc:Fallback xmlns="">
           <p:sp>
             <p:nvSpPr>
               <p:cNvPr id="8" name="TextBox 7">
@@ -6954,8 +6956,8 @@
           </p:sp>
         </mc:Fallback>
       </mc:AlternateContent>
-      <mc:AlternateContent xmlns:mc="http://schemas.openxmlformats.org/markup-compatibility/2006">
-        <mc:Choice xmlns:a14="http://schemas.microsoft.com/office/drawing/2010/main" Requires="a14">
+      <mc:AlternateContent xmlns:mc="http://schemas.openxmlformats.org/markup-compatibility/2006" xmlns:a14="http://schemas.microsoft.com/office/drawing/2010/main">
+        <mc:Choice Requires="a14">
           <p:sp>
             <p:nvSpPr>
               <p:cNvPr id="9" name="Rectangle 8">
@@ -7272,7 +7274,7 @@
             </p:txBody>
           </p:sp>
         </mc:Choice>
-        <mc:Fallback>
+        <mc:Fallback xmlns="">
           <p:sp>
             <p:nvSpPr>
               <p:cNvPr id="9" name="Rectangle 8">
@@ -7317,8 +7319,8 @@
           </p:sp>
         </mc:Fallback>
       </mc:AlternateContent>
-      <mc:AlternateContent xmlns:mc="http://schemas.openxmlformats.org/markup-compatibility/2006">
-        <mc:Choice xmlns:a14="http://schemas.microsoft.com/office/drawing/2010/main" Requires="a14">
+      <mc:AlternateContent xmlns:mc="http://schemas.openxmlformats.org/markup-compatibility/2006" xmlns:a14="http://schemas.microsoft.com/office/drawing/2010/main">
+        <mc:Choice Requires="a14">
           <p:sp>
             <p:nvSpPr>
               <p:cNvPr id="10" name="TextBox 9">
@@ -7472,7 +7474,7 @@
             </p:txBody>
           </p:sp>
         </mc:Choice>
-        <mc:Fallback>
+        <mc:Fallback xmlns="">
           <p:sp>
             <p:nvSpPr>
               <p:cNvPr id="10" name="TextBox 9">
@@ -7688,8 +7690,8 @@
           </a:p>
         </p:txBody>
       </p:sp>
-      <mc:AlternateContent xmlns:mc="http://schemas.openxmlformats.org/markup-compatibility/2006">
-        <mc:Choice xmlns:a14="http://schemas.microsoft.com/office/drawing/2010/main" Requires="a14">
+      <mc:AlternateContent xmlns:mc="http://schemas.openxmlformats.org/markup-compatibility/2006" xmlns:a14="http://schemas.microsoft.com/office/drawing/2010/main">
+        <mc:Choice Requires="a14">
           <p:sp>
             <p:nvSpPr>
               <p:cNvPr id="3" name="TextBox 2">
@@ -7718,6 +7720,7 @@
               </a:bodyPr>
               <a:lstStyle/>
               <a:p>
+                <a:pPr/>
                 <a14:m>
                   <m:oMathPara xmlns:m="http://schemas.openxmlformats.org/officeDocument/2006/math">
                     <m:oMathParaPr>
@@ -7896,7 +7899,7 @@
             </p:txBody>
           </p:sp>
         </mc:Choice>
-        <mc:Fallback>
+        <mc:Fallback xmlns="">
           <p:sp>
             <p:nvSpPr>
               <p:cNvPr id="3" name="TextBox 2">
@@ -7941,8 +7944,8 @@
           </p:sp>
         </mc:Fallback>
       </mc:AlternateContent>
-      <mc:AlternateContent xmlns:mc="http://schemas.openxmlformats.org/markup-compatibility/2006">
-        <mc:Choice xmlns:a14="http://schemas.microsoft.com/office/drawing/2010/main" Requires="a14">
+      <mc:AlternateContent xmlns:mc="http://schemas.openxmlformats.org/markup-compatibility/2006" xmlns:a14="http://schemas.microsoft.com/office/drawing/2010/main">
+        <mc:Choice Requires="a14">
           <p:sp>
             <p:nvSpPr>
               <p:cNvPr id="5" name="TextBox 4">
@@ -7971,6 +7974,7 @@
               </a:bodyPr>
               <a:lstStyle/>
               <a:p>
+                <a:pPr/>
                 <a14:m>
                   <m:oMathPara xmlns:m="http://schemas.openxmlformats.org/officeDocument/2006/math">
                     <m:oMathParaPr>
@@ -8127,7 +8131,7 @@
             </p:txBody>
           </p:sp>
         </mc:Choice>
-        <mc:Fallback>
+        <mc:Fallback xmlns="">
           <p:sp>
             <p:nvSpPr>
               <p:cNvPr id="5" name="TextBox 4">
@@ -8391,8 +8395,8 @@
           <a:chExt cx="0" cy="0"/>
         </a:xfrm>
       </p:grpSpPr>
-      <mc:AlternateContent xmlns:mc="http://schemas.openxmlformats.org/markup-compatibility/2006">
-        <mc:Choice xmlns:a14="http://schemas.microsoft.com/office/drawing/2010/main" Requires="a14">
+      <mc:AlternateContent xmlns:mc="http://schemas.openxmlformats.org/markup-compatibility/2006" xmlns:a14="http://schemas.microsoft.com/office/drawing/2010/main">
+        <mc:Choice Requires="a14">
           <p:sp>
             <p:nvSpPr>
               <p:cNvPr id="2" name="Titolo 1">
@@ -8440,7 +8444,7 @@
                     <m:sSup>
                       <m:sSupPr>
                         <m:ctrlPr>
-                          <a:rPr lang="it-IT" b="1" i="0" smtClean="0">
+                          <a:rPr lang="it-IT" b="1" i="1" smtClean="0">
                             <a:latin typeface="Cambria Math" panose="02040503050406030204" pitchFamily="18" charset="0"/>
                           </a:rPr>
                         </m:ctrlPr>
@@ -8469,7 +8473,7 @@
             </p:txBody>
           </p:sp>
         </mc:Choice>
-        <mc:Fallback>
+        <mc:Fallback xmlns="">
           <p:sp>
             <p:nvSpPr>
               <p:cNvPr id="2" name="Titolo 1">
@@ -8516,8 +8520,8 @@
           </p:sp>
         </mc:Fallback>
       </mc:AlternateContent>
-      <mc:AlternateContent xmlns:mc="http://schemas.openxmlformats.org/markup-compatibility/2006">
-        <mc:Choice xmlns:a14="http://schemas.microsoft.com/office/drawing/2010/main" Requires="a14">
+      <mc:AlternateContent xmlns:mc="http://schemas.openxmlformats.org/markup-compatibility/2006" xmlns:a14="http://schemas.microsoft.com/office/drawing/2010/main">
+        <mc:Choice Requires="a14">
           <p:sp>
             <p:nvSpPr>
               <p:cNvPr id="7" name="Rectangle 6">
@@ -8619,7 +8623,7 @@
             </p:txBody>
           </p:sp>
         </mc:Choice>
-        <mc:Fallback>
+        <mc:Fallback xmlns="">
           <p:sp>
             <p:nvSpPr>
               <p:cNvPr id="7" name="Rectangle 6">
@@ -8713,8 +8717,8 @@
           </a:p>
         </p:txBody>
       </p:sp>
-      <mc:AlternateContent xmlns:mc="http://schemas.openxmlformats.org/markup-compatibility/2006">
-        <mc:Choice xmlns:a14="http://schemas.microsoft.com/office/drawing/2010/main" Requires="a14">
+      <mc:AlternateContent xmlns:mc="http://schemas.openxmlformats.org/markup-compatibility/2006" xmlns:a14="http://schemas.microsoft.com/office/drawing/2010/main">
+        <mc:Choice Requires="a14">
           <p:sp>
             <p:nvSpPr>
               <p:cNvPr id="4" name="TextBox 3">
@@ -8743,6 +8747,7 @@
               </a:bodyPr>
               <a:lstStyle/>
               <a:p>
+                <a:pPr/>
                 <a14:m>
                   <m:oMathPara xmlns:m="http://schemas.openxmlformats.org/officeDocument/2006/math">
                     <m:oMathParaPr>
@@ -8967,7 +8972,7 @@
             </p:txBody>
           </p:sp>
         </mc:Choice>
-        <mc:Fallback>
+        <mc:Fallback xmlns="">
           <p:sp>
             <p:nvSpPr>
               <p:cNvPr id="4" name="TextBox 3">
@@ -9064,8 +9069,8 @@
           </a:p>
         </p:txBody>
       </p:sp>
-      <mc:AlternateContent xmlns:mc="http://schemas.openxmlformats.org/markup-compatibility/2006">
-        <mc:Choice xmlns:a14="http://schemas.microsoft.com/office/drawing/2010/main" Requires="a14">
+      <mc:AlternateContent xmlns:mc="http://schemas.openxmlformats.org/markup-compatibility/2006" xmlns:a14="http://schemas.microsoft.com/office/drawing/2010/main">
+        <mc:Choice Requires="a14">
           <p:sp>
             <p:nvSpPr>
               <p:cNvPr id="9" name="Rectangle 8">
@@ -9146,7 +9151,7 @@
             </p:txBody>
           </p:sp>
         </mc:Choice>
-        <mc:Fallback>
+        <mc:Fallback xmlns="">
           <p:sp>
             <p:nvSpPr>
               <p:cNvPr id="9" name="Rectangle 8">
@@ -9195,6 +9200,842 @@
     <p:extLst>
       <p:ext uri="{BB962C8B-B14F-4D97-AF65-F5344CB8AC3E}">
         <p14:creationId xmlns:p14="http://schemas.microsoft.com/office/powerpoint/2010/main" val="365704648"/>
+      </p:ext>
+    </p:extLst>
+  </p:cSld>
+  <p:clrMapOvr>
+    <a:masterClrMapping/>
+  </p:clrMapOvr>
+</p:sld>
+</file>
+
+<file path=ppt/slides/slide12.xml><?xml version="1.0" encoding="utf-8"?>
+<p:sld xmlns:a="http://schemas.openxmlformats.org/drawingml/2006/main" xmlns:r="http://schemas.openxmlformats.org/officeDocument/2006/relationships" xmlns:p="http://schemas.openxmlformats.org/presentationml/2006/main">
+  <p:cSld>
+    <p:spTree>
+      <p:nvGrpSpPr>
+        <p:cNvPr id="1" name=""/>
+        <p:cNvGrpSpPr/>
+        <p:nvPr/>
+      </p:nvGrpSpPr>
+      <p:grpSpPr>
+        <a:xfrm>
+          <a:off x="0" y="0"/>
+          <a:ext cx="0" cy="0"/>
+          <a:chOff x="0" y="0"/>
+          <a:chExt cx="0" cy="0"/>
+        </a:xfrm>
+      </p:grpSpPr>
+      <p:sp>
+        <p:nvSpPr>
+          <p:cNvPr id="2" name="Titolo 1">
+            <a:extLst>
+              <a:ext uri="{FF2B5EF4-FFF2-40B4-BE49-F238E27FC236}">
+                <a16:creationId xmlns:a16="http://schemas.microsoft.com/office/drawing/2014/main" id="{AEA5083B-CC27-4F1C-AD03-E3DBEC1C9E78}"/>
+              </a:ext>
+            </a:extLst>
+          </p:cNvPr>
+          <p:cNvSpPr>
+            <a:spLocks noGrp="1"/>
+          </p:cNvSpPr>
+          <p:nvPr>
+            <p:ph type="title"/>
+          </p:nvPr>
+        </p:nvSpPr>
+        <p:spPr>
+          <a:xfrm>
+            <a:off x="431999" y="413238"/>
+            <a:ext cx="10425391" cy="450762"/>
+          </a:xfrm>
+          <a:prstGeom prst="rect">
+            <a:avLst/>
+          </a:prstGeom>
+        </p:spPr>
+        <p:txBody>
+          <a:bodyPr rtlCol="0" anchor="ctr">
+            <a:normAutofit/>
+          </a:bodyPr>
+          <a:lstStyle/>
+          <a:p>
+            <a:pPr rtl="0"/>
+            <a:r>
+              <a:rPr lang="it-IT" dirty="0"/>
+              <a:t>KALMAN FILTER PERFORMANCE</a:t>
+            </a:r>
+          </a:p>
+        </p:txBody>
+      </p:sp>
+      <mc:AlternateContent xmlns:mc="http://schemas.openxmlformats.org/markup-compatibility/2006">
+        <mc:Choice xmlns:a14="http://schemas.microsoft.com/office/drawing/2010/main" Requires="a14">
+          <p:sp>
+            <p:nvSpPr>
+              <p:cNvPr id="7" name="Rectangle 6">
+                <a:extLst>
+                  <a:ext uri="{FF2B5EF4-FFF2-40B4-BE49-F238E27FC236}">
+                    <a16:creationId xmlns:a16="http://schemas.microsoft.com/office/drawing/2014/main" id="{28277CB6-6666-40F4-935A-E5B84D104CD2}"/>
+                  </a:ext>
+                </a:extLst>
+              </p:cNvPr>
+              <p:cNvSpPr/>
+              <p:nvPr/>
+            </p:nvSpPr>
+            <p:spPr>
+              <a:xfrm>
+                <a:off x="532636" y="1003616"/>
+                <a:ext cx="11126727" cy="830997"/>
+              </a:xfrm>
+              <a:prstGeom prst="rect">
+                <a:avLst/>
+              </a:prstGeom>
+            </p:spPr>
+            <p:txBody>
+              <a:bodyPr wrap="square">
+                <a:spAutoFit/>
+              </a:bodyPr>
+              <a:lstStyle/>
+              <a:p>
+                <a:pPr marL="342900" indent="-342900">
+                  <a:buFont typeface="Arial" panose="020B0604020202020204" pitchFamily="34" charset="0"/>
+                  <a:buChar char="•"/>
+                </a:pPr>
+                <a:r>
+                  <a:rPr lang="it-IT" sz="1600" dirty="0"/>
+                  <a:t>Plots describing the evolution of the estimate of the </a:t>
+                </a:r>
+                <a:r>
+                  <a:rPr lang="it-IT" sz="1600" dirty="0">
+                    <a:solidFill>
+                      <a:srgbClr val="FF0000"/>
+                    </a:solidFill>
+                  </a:rPr>
+                  <a:t>measured quantities </a:t>
+                </a:r>
+                <a14:m>
+                  <m:oMath xmlns:m="http://schemas.openxmlformats.org/officeDocument/2006/math">
+                    <m:r>
+                      <a:rPr lang="it-IT" sz="1600" b="0" i="1" smtClean="0">
+                        <a:solidFill>
+                          <a:srgbClr val="FF0000"/>
+                        </a:solidFill>
+                        <a:latin typeface="Cambria Math" panose="02040503050406030204" pitchFamily="18" charset="0"/>
+                      </a:rPr>
+                      <m:t>(</m:t>
+                    </m:r>
+                    <m:r>
+                      <a:rPr lang="it-IT" sz="1600" b="0" i="1" smtClean="0">
+                        <a:solidFill>
+                          <a:srgbClr val="FF0000"/>
+                        </a:solidFill>
+                        <a:latin typeface="Cambria Math" panose="02040503050406030204" pitchFamily="18" charset="0"/>
+                      </a:rPr>
+                      <m:t>𝑦</m:t>
+                    </m:r>
+                    <m:r>
+                      <a:rPr lang="it-IT" sz="1600" b="0" i="1" smtClean="0">
+                        <a:solidFill>
+                          <a:srgbClr val="FF0000"/>
+                        </a:solidFill>
+                        <a:latin typeface="Cambria Math" panose="02040503050406030204" pitchFamily="18" charset="0"/>
+                      </a:rPr>
+                      <m:t>,</m:t>
+                    </m:r>
+                    <m:r>
+                      <a:rPr lang="it-IT" sz="1600" b="0" i="1" smtClean="0">
+                        <a:solidFill>
+                          <a:srgbClr val="FF0000"/>
+                        </a:solidFill>
+                        <a:latin typeface="Cambria Math" panose="02040503050406030204" pitchFamily="18" charset="0"/>
+                      </a:rPr>
+                      <m:t>𝑧</m:t>
+                    </m:r>
+                    <m:r>
+                      <a:rPr lang="it-IT" sz="1600" b="0" i="1" smtClean="0">
+                        <a:solidFill>
+                          <a:srgbClr val="FF0000"/>
+                        </a:solidFill>
+                        <a:latin typeface="Cambria Math" panose="02040503050406030204" pitchFamily="18" charset="0"/>
+                      </a:rPr>
+                      <m:t>)</m:t>
+                    </m:r>
+                  </m:oMath>
+                </a14:m>
+                <a:r>
+                  <a:rPr lang="it-IT" sz="1600" dirty="0">
+                    <a:solidFill>
+                      <a:srgbClr val="FF0000"/>
+                    </a:solidFill>
+                  </a:rPr>
+                  <a:t> </a:t>
+                </a:r>
+                <a:r>
+                  <a:rPr lang="it-IT" sz="1600" dirty="0"/>
+                  <a:t>as a function of the </a:t>
+                </a:r>
+                <a:r>
+                  <a:rPr lang="it-IT" sz="1600" dirty="0">
+                    <a:solidFill>
+                      <a:srgbClr val="FF0000"/>
+                    </a:solidFill>
+                  </a:rPr>
+                  <a:t>free parameter </a:t>
+                </a:r>
+                <a14:m>
+                  <m:oMath xmlns:m="http://schemas.openxmlformats.org/officeDocument/2006/math">
+                    <m:r>
+                      <a:rPr lang="it-IT" sz="1600" b="0" i="1" smtClean="0">
+                        <a:solidFill>
+                          <a:srgbClr val="FF0000"/>
+                        </a:solidFill>
+                        <a:latin typeface="Cambria Math" panose="02040503050406030204" pitchFamily="18" charset="0"/>
+                      </a:rPr>
+                      <m:t>𝑥</m:t>
+                    </m:r>
+                  </m:oMath>
+                </a14:m>
+                <a:r>
+                  <a:rPr lang="it-IT" sz="1600" dirty="0">
+                    <a:solidFill>
+                      <a:srgbClr val="FF0000"/>
+                    </a:solidFill>
+                  </a:rPr>
+                  <a:t> </a:t>
+                </a:r>
+                <a:r>
+                  <a:rPr lang="it-IT" sz="1600" dirty="0"/>
+                  <a:t>(Information retrieved directly modifying the kalman filter module in garsoft </a:t>
+                </a:r>
+                <a:r>
+                  <a:rPr lang="en-US" sz="1600" dirty="0">
+                    <a:solidFill>
+                      <a:schemeClr val="accent3"/>
+                    </a:solidFill>
+                  </a:rPr>
+                  <a:t>tpctrackfit2_module.cc</a:t>
+                </a:r>
+                <a:r>
+                  <a:rPr lang="it-IT" sz="1600" dirty="0"/>
+                  <a:t>) for a muon from a particle gun pointing towards the center of the TPC</a:t>
+                </a:r>
+              </a:p>
+            </p:txBody>
+          </p:sp>
+        </mc:Choice>
+        <mc:Fallback>
+          <p:sp>
+            <p:nvSpPr>
+              <p:cNvPr id="7" name="Rectangle 6">
+                <a:extLst>
+                  <a:ext uri="{FF2B5EF4-FFF2-40B4-BE49-F238E27FC236}">
+                    <a16:creationId xmlns:a16="http://schemas.microsoft.com/office/drawing/2014/main" id="{28277CB6-6666-40F4-935A-E5B84D104CD2}"/>
+                  </a:ext>
+                </a:extLst>
+              </p:cNvPr>
+              <p:cNvSpPr>
+                <a:spLocks noRot="1" noChangeAspect="1" noMove="1" noResize="1" noEditPoints="1" noAdjustHandles="1" noChangeArrowheads="1" noChangeShapeType="1" noTextEdit="1"/>
+              </p:cNvSpPr>
+              <p:nvPr/>
+            </p:nvSpPr>
+            <p:spPr>
+              <a:xfrm>
+                <a:off x="532636" y="1003616"/>
+                <a:ext cx="11126727" cy="830997"/>
+              </a:xfrm>
+              <a:prstGeom prst="rect">
+                <a:avLst/>
+              </a:prstGeom>
+              <a:blipFill>
+                <a:blip r:embed="rId2"/>
+                <a:stretch>
+                  <a:fillRect l="-219" t="-2206" b="-8824"/>
+                </a:stretch>
+              </a:blipFill>
+            </p:spPr>
+            <p:txBody>
+              <a:bodyPr/>
+              <a:lstStyle/>
+              <a:p>
+                <a:r>
+                  <a:rPr lang="en-US">
+                    <a:noFill/>
+                  </a:rPr>
+                  <a:t> </a:t>
+                </a:r>
+              </a:p>
+            </p:txBody>
+          </p:sp>
+        </mc:Fallback>
+      </mc:AlternateContent>
+      <p:sp>
+        <p:nvSpPr>
+          <p:cNvPr id="24" name="Segnaposto numero diapositiva 5">
+            <a:extLst>
+              <a:ext uri="{FF2B5EF4-FFF2-40B4-BE49-F238E27FC236}">
+                <a16:creationId xmlns:a16="http://schemas.microsoft.com/office/drawing/2014/main" id="{C66DAD69-A13B-4F24-87EB-361EA46CEE80}"/>
+              </a:ext>
+            </a:extLst>
+          </p:cNvPr>
+          <p:cNvSpPr>
+            <a:spLocks noGrp="1"/>
+          </p:cNvSpPr>
+          <p:nvPr>
+            <p:ph type="sldNum" sz="quarter" idx="33"/>
+          </p:nvPr>
+        </p:nvSpPr>
+        <p:spPr>
+          <a:xfrm>
+            <a:off x="11772820" y="6401750"/>
+            <a:ext cx="278418" cy="274324"/>
+          </a:xfrm>
+          <a:prstGeom prst="rect">
+            <a:avLst/>
+          </a:prstGeom>
+        </p:spPr>
+        <p:txBody>
+          <a:bodyPr rtlCol="0" anchor="ctr">
+            <a:normAutofit/>
+          </a:bodyPr>
+          <a:lstStyle/>
+          <a:p>
+            <a:pPr rtl="0">
+              <a:spcAft>
+                <a:spcPts val="600"/>
+              </a:spcAft>
+            </a:pPr>
+            <a:fld id="{19B51A1E-902D-48AF-9020-955120F399B6}" type="slidenum">
+              <a:rPr lang="it-IT" smtClean="0"/>
+              <a:pPr rtl="0">
+                <a:spcAft>
+                  <a:spcPts val="600"/>
+                </a:spcAft>
+              </a:pPr>
+              <a:t>12</a:t>
+            </a:fld>
+            <a:endParaRPr lang="it-IT"/>
+          </a:p>
+        </p:txBody>
+      </p:sp>
+      <p:pic>
+        <p:nvPicPr>
+          <p:cNvPr id="5" name="Picture 4" descr="A picture containing chart&#10;&#10;Description automatically generated">
+            <a:extLst>
+              <a:ext uri="{FF2B5EF4-FFF2-40B4-BE49-F238E27FC236}">
+                <a16:creationId xmlns:a16="http://schemas.microsoft.com/office/drawing/2014/main" id="{B867C71A-AAC8-4B0F-BDB1-7C6CE23A4886}"/>
+              </a:ext>
+            </a:extLst>
+          </p:cNvPr>
+          <p:cNvPicPr>
+            <a:picLocks noChangeAspect="1"/>
+          </p:cNvPicPr>
+          <p:nvPr/>
+        </p:nvPicPr>
+        <p:blipFill>
+          <a:blip r:embed="rId3">
+            <a:extLst>
+              <a:ext uri="{28A0092B-C50C-407E-A947-70E740481C1C}">
+                <a14:useLocalDpi xmlns:a14="http://schemas.microsoft.com/office/drawing/2010/main" val="0"/>
+              </a:ext>
+            </a:extLst>
+          </a:blip>
+          <a:stretch>
+            <a:fillRect/>
+          </a:stretch>
+        </p:blipFill>
+        <p:spPr>
+          <a:xfrm>
+            <a:off x="1009777" y="2066562"/>
+            <a:ext cx="4966988" cy="3852153"/>
+          </a:xfrm>
+          <a:prstGeom prst="rect">
+            <a:avLst/>
+          </a:prstGeom>
+        </p:spPr>
+      </p:pic>
+      <p:pic>
+        <p:nvPicPr>
+          <p:cNvPr id="10" name="Picture 9" descr="Chart&#10;&#10;Description automatically generated">
+            <a:extLst>
+              <a:ext uri="{FF2B5EF4-FFF2-40B4-BE49-F238E27FC236}">
+                <a16:creationId xmlns:a16="http://schemas.microsoft.com/office/drawing/2014/main" id="{D31F8521-5F67-488B-A78A-8203974DDD63}"/>
+              </a:ext>
+            </a:extLst>
+          </p:cNvPr>
+          <p:cNvPicPr>
+            <a:picLocks noChangeAspect="1"/>
+          </p:cNvPicPr>
+          <p:nvPr/>
+        </p:nvPicPr>
+        <p:blipFill>
+          <a:blip r:embed="rId4">
+            <a:extLst>
+              <a:ext uri="{28A0092B-C50C-407E-A947-70E740481C1C}">
+                <a14:useLocalDpi xmlns:a14="http://schemas.microsoft.com/office/drawing/2010/main" val="0"/>
+              </a:ext>
+            </a:extLst>
+          </a:blip>
+          <a:stretch>
+            <a:fillRect/>
+          </a:stretch>
+        </p:blipFill>
+        <p:spPr>
+          <a:xfrm>
+            <a:off x="6429243" y="2066562"/>
+            <a:ext cx="4966988" cy="3852153"/>
+          </a:xfrm>
+          <a:prstGeom prst="rect">
+            <a:avLst/>
+          </a:prstGeom>
+        </p:spPr>
+      </p:pic>
+    </p:spTree>
+    <p:extLst>
+      <p:ext uri="{BB962C8B-B14F-4D97-AF65-F5344CB8AC3E}">
+        <p14:creationId xmlns:p14="http://schemas.microsoft.com/office/powerpoint/2010/main" val="1543876892"/>
+      </p:ext>
+    </p:extLst>
+  </p:cSld>
+  <p:clrMapOvr>
+    <a:masterClrMapping/>
+  </p:clrMapOvr>
+</p:sld>
+</file>
+
+<file path=ppt/slides/slide13.xml><?xml version="1.0" encoding="utf-8"?>
+<p:sld xmlns:a="http://schemas.openxmlformats.org/drawingml/2006/main" xmlns:r="http://schemas.openxmlformats.org/officeDocument/2006/relationships" xmlns:p="http://schemas.openxmlformats.org/presentationml/2006/main">
+  <p:cSld>
+    <p:spTree>
+      <p:nvGrpSpPr>
+        <p:cNvPr id="1" name=""/>
+        <p:cNvGrpSpPr/>
+        <p:nvPr/>
+      </p:nvGrpSpPr>
+      <p:grpSpPr>
+        <a:xfrm>
+          <a:off x="0" y="0"/>
+          <a:ext cx="0" cy="0"/>
+          <a:chOff x="0" y="0"/>
+          <a:chExt cx="0" cy="0"/>
+        </a:xfrm>
+      </p:grpSpPr>
+      <p:sp>
+        <p:nvSpPr>
+          <p:cNvPr id="2" name="Titolo 1">
+            <a:extLst>
+              <a:ext uri="{FF2B5EF4-FFF2-40B4-BE49-F238E27FC236}">
+                <a16:creationId xmlns:a16="http://schemas.microsoft.com/office/drawing/2014/main" id="{AEA5083B-CC27-4F1C-AD03-E3DBEC1C9E78}"/>
+              </a:ext>
+            </a:extLst>
+          </p:cNvPr>
+          <p:cNvSpPr>
+            <a:spLocks noGrp="1"/>
+          </p:cNvSpPr>
+          <p:nvPr>
+            <p:ph type="title"/>
+          </p:nvPr>
+        </p:nvSpPr>
+        <p:spPr>
+          <a:xfrm>
+            <a:off x="431999" y="413238"/>
+            <a:ext cx="10425391" cy="450762"/>
+          </a:xfrm>
+          <a:prstGeom prst="rect">
+            <a:avLst/>
+          </a:prstGeom>
+        </p:spPr>
+        <p:txBody>
+          <a:bodyPr rtlCol="0" anchor="ctr">
+            <a:normAutofit/>
+          </a:bodyPr>
+          <a:lstStyle/>
+          <a:p>
+            <a:pPr rtl="0"/>
+            <a:r>
+              <a:rPr lang="it-IT" dirty="0"/>
+              <a:t>KALMAN FILTER PERFORMANCE</a:t>
+            </a:r>
+          </a:p>
+        </p:txBody>
+      </p:sp>
+      <mc:AlternateContent xmlns:mc="http://schemas.openxmlformats.org/markup-compatibility/2006">
+        <mc:Choice xmlns:a14="http://schemas.microsoft.com/office/drawing/2010/main" Requires="a14">
+          <p:sp>
+            <p:nvSpPr>
+              <p:cNvPr id="7" name="Rectangle 6">
+                <a:extLst>
+                  <a:ext uri="{FF2B5EF4-FFF2-40B4-BE49-F238E27FC236}">
+                    <a16:creationId xmlns:a16="http://schemas.microsoft.com/office/drawing/2014/main" id="{28277CB6-6666-40F4-935A-E5B84D104CD2}"/>
+                  </a:ext>
+                </a:extLst>
+              </p:cNvPr>
+              <p:cNvSpPr/>
+              <p:nvPr/>
+            </p:nvSpPr>
+            <p:spPr>
+              <a:xfrm>
+                <a:off x="532636" y="1522301"/>
+                <a:ext cx="11126727" cy="439992"/>
+              </a:xfrm>
+              <a:prstGeom prst="rect">
+                <a:avLst/>
+              </a:prstGeom>
+            </p:spPr>
+            <p:txBody>
+              <a:bodyPr wrap="square">
+                <a:spAutoFit/>
+              </a:bodyPr>
+              <a:lstStyle/>
+              <a:p>
+                <a:pPr marL="342900" indent="-342900">
+                  <a:buFont typeface="Arial" panose="020B0604020202020204" pitchFamily="34" charset="0"/>
+                  <a:buChar char="•"/>
+                </a:pPr>
+                <a:r>
+                  <a:rPr lang="it-IT" sz="1600" dirty="0"/>
+                  <a:t>Plots describing the evolution of the estimate of the </a:t>
+                </a:r>
+                <a:r>
+                  <a:rPr lang="it-IT" sz="1600" dirty="0">
+                    <a:solidFill>
+                      <a:srgbClr val="FF0000"/>
+                    </a:solidFill>
+                  </a:rPr>
+                  <a:t>non measured quantities </a:t>
+                </a:r>
+                <a14:m>
+                  <m:oMath xmlns:m="http://schemas.openxmlformats.org/officeDocument/2006/math">
+                    <m:r>
+                      <a:rPr lang="it-IT" sz="1600" b="0" i="1" smtClean="0">
+                        <a:solidFill>
+                          <a:srgbClr val="FF0000"/>
+                        </a:solidFill>
+                        <a:latin typeface="Cambria Math" panose="02040503050406030204" pitchFamily="18" charset="0"/>
+                      </a:rPr>
+                      <m:t>(</m:t>
+                    </m:r>
+                    <m:f>
+                      <m:fPr>
+                        <m:ctrlPr>
+                          <a:rPr lang="it-IT" sz="1600" b="0" i="1" smtClean="0">
+                            <a:solidFill>
+                              <a:srgbClr val="FF0000"/>
+                            </a:solidFill>
+                            <a:latin typeface="Cambria Math" panose="02040503050406030204" pitchFamily="18" charset="0"/>
+                          </a:rPr>
+                        </m:ctrlPr>
+                      </m:fPr>
+                      <m:num>
+                        <m:r>
+                          <a:rPr lang="it-IT" sz="1600" b="0" i="1" smtClean="0">
+                            <a:solidFill>
+                              <a:srgbClr val="FF0000"/>
+                            </a:solidFill>
+                            <a:latin typeface="Cambria Math" panose="02040503050406030204" pitchFamily="18" charset="0"/>
+                          </a:rPr>
+                          <m:t>1</m:t>
+                        </m:r>
+                      </m:num>
+                      <m:den>
+                        <m:r>
+                          <a:rPr lang="it-IT" sz="1600" b="0" i="1" smtClean="0">
+                            <a:solidFill>
+                              <a:srgbClr val="FF0000"/>
+                            </a:solidFill>
+                            <a:latin typeface="Cambria Math" panose="02040503050406030204" pitchFamily="18" charset="0"/>
+                          </a:rPr>
+                          <m:t>𝑟</m:t>
+                        </m:r>
+                      </m:den>
+                    </m:f>
+                    <m:r>
+                      <a:rPr lang="it-IT" sz="1600" b="0" i="1" smtClean="0">
+                        <a:solidFill>
+                          <a:srgbClr val="FF0000"/>
+                        </a:solidFill>
+                        <a:latin typeface="Cambria Math" panose="02040503050406030204" pitchFamily="18" charset="0"/>
+                      </a:rPr>
+                      <m:t>,</m:t>
+                    </m:r>
+                    <m:r>
+                      <a:rPr lang="it-IT" sz="1600" b="0" i="1" smtClean="0">
+                        <a:solidFill>
+                          <a:srgbClr val="FF0000"/>
+                        </a:solidFill>
+                        <a:latin typeface="Cambria Math" panose="02040503050406030204" pitchFamily="18" charset="0"/>
+                      </a:rPr>
+                      <m:t>𝜙</m:t>
+                    </m:r>
+                    <m:r>
+                      <a:rPr lang="it-IT" sz="1600" b="0" i="1" smtClean="0">
+                        <a:solidFill>
+                          <a:srgbClr val="FF0000"/>
+                        </a:solidFill>
+                        <a:latin typeface="Cambria Math" panose="02040503050406030204" pitchFamily="18" charset="0"/>
+                      </a:rPr>
+                      <m:t>,</m:t>
+                    </m:r>
+                    <m:r>
+                      <a:rPr lang="it-IT" sz="1600" b="0" i="1" smtClean="0">
+                        <a:solidFill>
+                          <a:srgbClr val="FF0000"/>
+                        </a:solidFill>
+                        <a:latin typeface="Cambria Math" panose="02040503050406030204" pitchFamily="18" charset="0"/>
+                      </a:rPr>
+                      <m:t>𝜆</m:t>
+                    </m:r>
+                    <m:r>
+                      <a:rPr lang="it-IT" sz="1600" b="0" i="1" smtClean="0">
+                        <a:solidFill>
+                          <a:srgbClr val="FF0000"/>
+                        </a:solidFill>
+                        <a:latin typeface="Cambria Math" panose="02040503050406030204" pitchFamily="18" charset="0"/>
+                      </a:rPr>
+                      <m:t>)</m:t>
+                    </m:r>
+                  </m:oMath>
+                </a14:m>
+                <a:r>
+                  <a:rPr lang="it-IT" sz="1600" dirty="0">
+                    <a:solidFill>
+                      <a:srgbClr val="FF0000"/>
+                    </a:solidFill>
+                  </a:rPr>
+                  <a:t> </a:t>
+                </a:r>
+                <a:r>
+                  <a:rPr lang="it-IT" sz="1600" dirty="0"/>
+                  <a:t>as a function of the </a:t>
+                </a:r>
+                <a:r>
+                  <a:rPr lang="it-IT" sz="1600" dirty="0">
+                    <a:solidFill>
+                      <a:srgbClr val="FF0000"/>
+                    </a:solidFill>
+                  </a:rPr>
+                  <a:t>free parameter </a:t>
+                </a:r>
+                <a14:m>
+                  <m:oMath xmlns:m="http://schemas.openxmlformats.org/officeDocument/2006/math">
+                    <m:r>
+                      <a:rPr lang="it-IT" sz="1600" b="0" i="1" smtClean="0">
+                        <a:solidFill>
+                          <a:srgbClr val="FF0000"/>
+                        </a:solidFill>
+                        <a:latin typeface="Cambria Math" panose="02040503050406030204" pitchFamily="18" charset="0"/>
+                      </a:rPr>
+                      <m:t>𝑥</m:t>
+                    </m:r>
+                  </m:oMath>
+                </a14:m>
+                <a:endParaRPr lang="it-IT" sz="1600" dirty="0"/>
+              </a:p>
+            </p:txBody>
+          </p:sp>
+        </mc:Choice>
+        <mc:Fallback>
+          <p:sp>
+            <p:nvSpPr>
+              <p:cNvPr id="7" name="Rectangle 6">
+                <a:extLst>
+                  <a:ext uri="{FF2B5EF4-FFF2-40B4-BE49-F238E27FC236}">
+                    <a16:creationId xmlns:a16="http://schemas.microsoft.com/office/drawing/2014/main" id="{28277CB6-6666-40F4-935A-E5B84D104CD2}"/>
+                  </a:ext>
+                </a:extLst>
+              </p:cNvPr>
+              <p:cNvSpPr>
+                <a:spLocks noRot="1" noChangeAspect="1" noMove="1" noResize="1" noEditPoints="1" noAdjustHandles="1" noChangeArrowheads="1" noChangeShapeType="1" noTextEdit="1"/>
+              </p:cNvSpPr>
+              <p:nvPr/>
+            </p:nvSpPr>
+            <p:spPr>
+              <a:xfrm>
+                <a:off x="532636" y="1522301"/>
+                <a:ext cx="11126727" cy="439992"/>
+              </a:xfrm>
+              <a:prstGeom prst="rect">
+                <a:avLst/>
+              </a:prstGeom>
+              <a:blipFill>
+                <a:blip r:embed="rId2"/>
+                <a:stretch>
+                  <a:fillRect l="-219" b="-5556"/>
+                </a:stretch>
+              </a:blipFill>
+            </p:spPr>
+            <p:txBody>
+              <a:bodyPr/>
+              <a:lstStyle/>
+              <a:p>
+                <a:r>
+                  <a:rPr lang="en-US">
+                    <a:noFill/>
+                  </a:rPr>
+                  <a:t> </a:t>
+                </a:r>
+              </a:p>
+            </p:txBody>
+          </p:sp>
+        </mc:Fallback>
+      </mc:AlternateContent>
+      <p:sp>
+        <p:nvSpPr>
+          <p:cNvPr id="24" name="Segnaposto numero diapositiva 5">
+            <a:extLst>
+              <a:ext uri="{FF2B5EF4-FFF2-40B4-BE49-F238E27FC236}">
+                <a16:creationId xmlns:a16="http://schemas.microsoft.com/office/drawing/2014/main" id="{C66DAD69-A13B-4F24-87EB-361EA46CEE80}"/>
+              </a:ext>
+            </a:extLst>
+          </p:cNvPr>
+          <p:cNvSpPr>
+            <a:spLocks noGrp="1"/>
+          </p:cNvSpPr>
+          <p:nvPr>
+            <p:ph type="sldNum" sz="quarter" idx="33"/>
+          </p:nvPr>
+        </p:nvSpPr>
+        <p:spPr>
+          <a:xfrm>
+            <a:off x="11772820" y="6099910"/>
+            <a:ext cx="278418" cy="274324"/>
+          </a:xfrm>
+          <a:prstGeom prst="rect">
+            <a:avLst/>
+          </a:prstGeom>
+        </p:spPr>
+        <p:txBody>
+          <a:bodyPr rtlCol="0" anchor="ctr">
+            <a:normAutofit/>
+          </a:bodyPr>
+          <a:lstStyle/>
+          <a:p>
+            <a:pPr rtl="0">
+              <a:spcAft>
+                <a:spcPts val="600"/>
+              </a:spcAft>
+            </a:pPr>
+            <a:fld id="{19B51A1E-902D-48AF-9020-955120F399B6}" type="slidenum">
+              <a:rPr lang="it-IT" smtClean="0"/>
+              <a:pPr rtl="0">
+                <a:spcAft>
+                  <a:spcPts val="600"/>
+                </a:spcAft>
+              </a:pPr>
+              <a:t>13</a:t>
+            </a:fld>
+            <a:endParaRPr lang="it-IT"/>
+          </a:p>
+        </p:txBody>
+      </p:sp>
+      <p:pic>
+        <p:nvPicPr>
+          <p:cNvPr id="4" name="Picture 3" descr="A picture containing chart&#10;&#10;Description automatically generated">
+            <a:extLst>
+              <a:ext uri="{FF2B5EF4-FFF2-40B4-BE49-F238E27FC236}">
+                <a16:creationId xmlns:a16="http://schemas.microsoft.com/office/drawing/2014/main" id="{BEF66F0C-1CFC-4398-973F-20CD775ED96B}"/>
+              </a:ext>
+            </a:extLst>
+          </p:cNvPr>
+          <p:cNvPicPr>
+            <a:picLocks noChangeAspect="1"/>
+          </p:cNvPicPr>
+          <p:nvPr/>
+        </p:nvPicPr>
+        <p:blipFill>
+          <a:blip r:embed="rId3">
+            <a:extLst>
+              <a:ext uri="{28A0092B-C50C-407E-A947-70E740481C1C}">
+                <a14:useLocalDpi xmlns:a14="http://schemas.microsoft.com/office/drawing/2010/main" val="0"/>
+              </a:ext>
+            </a:extLst>
+          </a:blip>
+          <a:stretch>
+            <a:fillRect/>
+          </a:stretch>
+        </p:blipFill>
+        <p:spPr>
+          <a:xfrm>
+            <a:off x="146584" y="2182290"/>
+            <a:ext cx="4045034" cy="3137130"/>
+          </a:xfrm>
+          <a:prstGeom prst="rect">
+            <a:avLst/>
+          </a:prstGeom>
+        </p:spPr>
+      </p:pic>
+      <p:pic>
+        <p:nvPicPr>
+          <p:cNvPr id="11" name="Picture 10" descr="A picture containing chart&#10;&#10;Description automatically generated">
+            <a:extLst>
+              <a:ext uri="{FF2B5EF4-FFF2-40B4-BE49-F238E27FC236}">
+                <a16:creationId xmlns:a16="http://schemas.microsoft.com/office/drawing/2014/main" id="{B9DD1E1F-BDE0-4D1D-A015-9B1CC556E1EC}"/>
+              </a:ext>
+            </a:extLst>
+          </p:cNvPr>
+          <p:cNvPicPr>
+            <a:picLocks noChangeAspect="1"/>
+          </p:cNvPicPr>
+          <p:nvPr/>
+        </p:nvPicPr>
+        <p:blipFill>
+          <a:blip r:embed="rId4">
+            <a:extLst>
+              <a:ext uri="{28A0092B-C50C-407E-A947-70E740481C1C}">
+                <a14:useLocalDpi xmlns:a14="http://schemas.microsoft.com/office/drawing/2010/main" val="0"/>
+              </a:ext>
+            </a:extLst>
+          </a:blip>
+          <a:stretch>
+            <a:fillRect/>
+          </a:stretch>
+        </p:blipFill>
+        <p:spPr>
+          <a:xfrm>
+            <a:off x="4056678" y="2182290"/>
+            <a:ext cx="4090288" cy="3172227"/>
+          </a:xfrm>
+          <a:prstGeom prst="rect">
+            <a:avLst/>
+          </a:prstGeom>
+        </p:spPr>
+      </p:pic>
+      <p:pic>
+        <p:nvPicPr>
+          <p:cNvPr id="13" name="Picture 12" descr="Graphical user interface, text, application&#10;&#10;Description automatically generated">
+            <a:extLst>
+              <a:ext uri="{FF2B5EF4-FFF2-40B4-BE49-F238E27FC236}">
+                <a16:creationId xmlns:a16="http://schemas.microsoft.com/office/drawing/2014/main" id="{E6BD3268-0578-465F-B770-72E0C886B0D7}"/>
+              </a:ext>
+            </a:extLst>
+          </p:cNvPr>
+          <p:cNvPicPr>
+            <a:picLocks noChangeAspect="1"/>
+          </p:cNvPicPr>
+          <p:nvPr/>
+        </p:nvPicPr>
+        <p:blipFill>
+          <a:blip r:embed="rId5">
+            <a:extLst>
+              <a:ext uri="{28A0092B-C50C-407E-A947-70E740481C1C}">
+                <a14:useLocalDpi xmlns:a14="http://schemas.microsoft.com/office/drawing/2010/main" val="0"/>
+              </a:ext>
+            </a:extLst>
+          </a:blip>
+          <a:stretch>
+            <a:fillRect/>
+          </a:stretch>
+        </p:blipFill>
+        <p:spPr>
+          <a:xfrm>
+            <a:off x="8146966" y="2182289"/>
+            <a:ext cx="4045034" cy="3137131"/>
+          </a:xfrm>
+          <a:prstGeom prst="rect">
+            <a:avLst/>
+          </a:prstGeom>
+        </p:spPr>
+      </p:pic>
+    </p:spTree>
+    <p:extLst>
+      <p:ext uri="{BB962C8B-B14F-4D97-AF65-F5344CB8AC3E}">
+        <p14:creationId xmlns:p14="http://schemas.microsoft.com/office/powerpoint/2010/main" val="100911908"/>
       </p:ext>
     </p:extLst>
   </p:cSld>
@@ -9368,8 +10209,8 @@
           </a:p>
         </p:txBody>
       </p:sp>
-      <mc:AlternateContent xmlns:mc="http://schemas.openxmlformats.org/markup-compatibility/2006">
-        <mc:Choice xmlns:a14="http://schemas.microsoft.com/office/drawing/2010/main" Requires="a14">
+      <mc:AlternateContent xmlns:mc="http://schemas.openxmlformats.org/markup-compatibility/2006" xmlns:a14="http://schemas.microsoft.com/office/drawing/2010/main">
+        <mc:Choice Requires="a14">
           <p:sp>
             <p:nvSpPr>
               <p:cNvPr id="8" name="TextBox 7">
@@ -9510,13 +10351,7 @@
                                 <a:rPr lang="it-IT" b="0" i="1" smtClean="0">
                                   <a:latin typeface="Cambria Math" panose="02040503050406030204" pitchFamily="18" charset="0"/>
                                 </a:rPr>
-                                <m:t>−</m:t>
-                              </m:r>
-                              <m:r>
-                                <a:rPr lang="it-IT" b="0" i="1" smtClean="0">
-                                  <a:latin typeface="Cambria Math" panose="02040503050406030204" pitchFamily="18" charset="0"/>
-                                </a:rPr>
-                                <m:t>1</m:t>
+                                <m:t>−1</m:t>
                               </m:r>
                             </m:sub>
                             <m:sup>
@@ -9561,13 +10396,7 @@
                                 <a:rPr lang="it-IT" b="0" i="1" smtClean="0">
                                   <a:latin typeface="Cambria Math" panose="02040503050406030204" pitchFamily="18" charset="0"/>
                                 </a:rPr>
-                                <m:t>−</m:t>
-                              </m:r>
-                              <m:r>
-                                <a:rPr lang="it-IT" b="0" i="1" smtClean="0">
-                                  <a:latin typeface="Cambria Math" panose="02040503050406030204" pitchFamily="18" charset="0"/>
-                                </a:rPr>
-                                <m:t>1</m:t>
+                                <m:t>−1</m:t>
                               </m:r>
                             </m:sub>
                           </m:sSub>
@@ -9581,7 +10410,7 @@
             </p:txBody>
           </p:sp>
         </mc:Choice>
-        <mc:Fallback>
+        <mc:Fallback xmlns="">
           <p:sp>
             <p:nvSpPr>
               <p:cNvPr id="8" name="TextBox 7">
@@ -9626,8 +10455,8 @@
           </p:sp>
         </mc:Fallback>
       </mc:AlternateContent>
-      <mc:AlternateContent xmlns:mc="http://schemas.openxmlformats.org/markup-compatibility/2006">
-        <mc:Choice xmlns:a14="http://schemas.microsoft.com/office/drawing/2010/main" Requires="a14">
+      <mc:AlternateContent xmlns:mc="http://schemas.openxmlformats.org/markup-compatibility/2006" xmlns:a14="http://schemas.microsoft.com/office/drawing/2010/main">
+        <mc:Choice Requires="a14">
           <p:sp>
             <p:nvSpPr>
               <p:cNvPr id="10" name="TextBox 9">
@@ -9729,13 +10558,7 @@
                             <a:rPr lang="it-IT" b="0" i="1" smtClean="0">
                               <a:latin typeface="Cambria Math" panose="02040503050406030204" pitchFamily="18" charset="0"/>
                             </a:rPr>
-                            <m:t>−</m:t>
-                          </m:r>
-                          <m:r>
-                            <a:rPr lang="it-IT" b="0" i="1" smtClean="0">
-                              <a:latin typeface="Cambria Math" panose="02040503050406030204" pitchFamily="18" charset="0"/>
-                            </a:rPr>
-                            <m:t>1</m:t>
+                            <m:t>−1</m:t>
                           </m:r>
                         </m:sub>
                       </m:sSub>
@@ -9766,13 +10589,7 @@
                             <a:rPr lang="it-IT" b="0" i="1" smtClean="0">
                               <a:latin typeface="Cambria Math" panose="02040503050406030204" pitchFamily="18" charset="0"/>
                             </a:rPr>
-                            <m:t>−</m:t>
-                          </m:r>
-                          <m:r>
-                            <a:rPr lang="it-IT" b="0" i="1" smtClean="0">
-                              <a:latin typeface="Cambria Math" panose="02040503050406030204" pitchFamily="18" charset="0"/>
-                            </a:rPr>
-                            <m:t>1</m:t>
+                            <m:t>−1</m:t>
                           </m:r>
                         </m:sub>
                         <m:sup>
@@ -9811,13 +10628,7 @@
                             <a:rPr lang="it-IT" b="0" i="1" smtClean="0">
                               <a:latin typeface="Cambria Math" panose="02040503050406030204" pitchFamily="18" charset="0"/>
                             </a:rPr>
-                            <m:t>−</m:t>
-                          </m:r>
-                          <m:r>
-                            <a:rPr lang="it-IT" b="0" i="1" smtClean="0">
-                              <a:latin typeface="Cambria Math" panose="02040503050406030204" pitchFamily="18" charset="0"/>
-                            </a:rPr>
-                            <m:t>1</m:t>
+                            <m:t>−1</m:t>
                           </m:r>
                         </m:sub>
                         <m:sup>
@@ -9849,7 +10660,7 @@
             </p:txBody>
           </p:sp>
         </mc:Choice>
-        <mc:Fallback>
+        <mc:Fallback xmlns="">
           <p:sp>
             <p:nvSpPr>
               <p:cNvPr id="10" name="TextBox 9">
@@ -9894,8 +10705,8 @@
           </p:sp>
         </mc:Fallback>
       </mc:AlternateContent>
-      <mc:AlternateContent xmlns:mc="http://schemas.openxmlformats.org/markup-compatibility/2006">
-        <mc:Choice xmlns:a14="http://schemas.microsoft.com/office/drawing/2010/main" Requires="a14">
+      <mc:AlternateContent xmlns:mc="http://schemas.openxmlformats.org/markup-compatibility/2006" xmlns:a14="http://schemas.microsoft.com/office/drawing/2010/main">
+        <mc:Choice Requires="a14">
           <p:sp>
             <p:nvSpPr>
               <p:cNvPr id="5" name="TextBox 4">
@@ -9958,13 +10769,7 @@
                             <a:rPr lang="it-IT" b="0" i="1" dirty="0" smtClean="0">
                               <a:latin typeface="Cambria Math" panose="02040503050406030204" pitchFamily="18" charset="0"/>
                             </a:rPr>
-                            <m:t>−</m:t>
-                          </m:r>
-                          <m:r>
-                            <a:rPr lang="it-IT" b="0" i="1" dirty="0" smtClean="0">
-                              <a:latin typeface="Cambria Math" panose="02040503050406030204" pitchFamily="18" charset="0"/>
-                            </a:rPr>
-                            <m:t>1</m:t>
+                            <m:t>−1</m:t>
                           </m:r>
                         </m:sub>
                       </m:sSub>
@@ -10074,13 +10879,7 @@
                                 <a:rPr lang="it-IT" b="0" i="1" dirty="0" smtClean="0">
                                   <a:latin typeface="Cambria Math" panose="02040503050406030204" pitchFamily="18" charset="0"/>
                                 </a:rPr>
-                                <m:t>−</m:t>
-                              </m:r>
-                              <m:r>
-                                <a:rPr lang="it-IT" b="0" i="1" dirty="0" smtClean="0">
-                                  <a:latin typeface="Cambria Math" panose="02040503050406030204" pitchFamily="18" charset="0"/>
-                                </a:rPr>
-                                <m:t>1</m:t>
+                                <m:t>−1</m:t>
                               </m:r>
                             </m:sub>
                             <m:sup>
@@ -10125,13 +10924,7 @@
                                 <a:rPr lang="it-IT" b="0" i="1" dirty="0" smtClean="0">
                                   <a:latin typeface="Cambria Math" panose="02040503050406030204" pitchFamily="18" charset="0"/>
                                 </a:rPr>
-                                <m:t>−</m:t>
-                              </m:r>
-                              <m:r>
-                                <a:rPr lang="it-IT" b="0" i="1" dirty="0" smtClean="0">
-                                  <a:latin typeface="Cambria Math" panose="02040503050406030204" pitchFamily="18" charset="0"/>
-                                </a:rPr>
-                                <m:t>1</m:t>
+                                <m:t>−1</m:t>
                               </m:r>
                             </m:sub>
                           </m:sSub>
@@ -10151,7 +10944,7 @@
             </p:txBody>
           </p:sp>
         </mc:Choice>
-        <mc:Fallback>
+        <mc:Fallback xmlns="">
           <p:sp>
             <p:nvSpPr>
               <p:cNvPr id="5" name="TextBox 4">
@@ -10196,8 +10989,8 @@
           </p:sp>
         </mc:Fallback>
       </mc:AlternateContent>
-      <mc:AlternateContent xmlns:mc="http://schemas.openxmlformats.org/markup-compatibility/2006">
-        <mc:Choice xmlns:a14="http://schemas.microsoft.com/office/drawing/2010/main" Requires="a14">
+      <mc:AlternateContent xmlns:mc="http://schemas.openxmlformats.org/markup-compatibility/2006" xmlns:a14="http://schemas.microsoft.com/office/drawing/2010/main">
+        <mc:Choice Requires="a14">
           <p:sp>
             <p:nvSpPr>
               <p:cNvPr id="6" name="Rectangle 5">
@@ -10391,7 +11184,7 @@
             </p:txBody>
           </p:sp>
         </mc:Choice>
-        <mc:Fallback>
+        <mc:Fallback xmlns="">
           <p:sp>
             <p:nvSpPr>
               <p:cNvPr id="6" name="Rectangle 5">
@@ -10436,8 +11229,8 @@
           </p:sp>
         </mc:Fallback>
       </mc:AlternateContent>
-      <mc:AlternateContent xmlns:mc="http://schemas.openxmlformats.org/markup-compatibility/2006">
-        <mc:Choice xmlns:a14="http://schemas.microsoft.com/office/drawing/2010/main" Requires="a14">
+      <mc:AlternateContent xmlns:mc="http://schemas.openxmlformats.org/markup-compatibility/2006" xmlns:a14="http://schemas.microsoft.com/office/drawing/2010/main">
+        <mc:Choice Requires="a14">
           <p:sp>
             <p:nvSpPr>
               <p:cNvPr id="11" name="TextBox 10">
@@ -10487,7 +11280,7 @@
             </p:txBody>
           </p:sp>
         </mc:Choice>
-        <mc:Fallback>
+        <mc:Fallback xmlns="">
           <p:sp>
             <p:nvSpPr>
               <p:cNvPr id="11" name="TextBox 10">
@@ -10959,8 +11752,8 @@
           </a:p>
         </p:txBody>
       </p:sp>
-      <mc:AlternateContent xmlns:mc="http://schemas.openxmlformats.org/markup-compatibility/2006">
-        <mc:Choice xmlns:a14="http://schemas.microsoft.com/office/drawing/2010/main" Requires="a14">
+      <mc:AlternateContent xmlns:mc="http://schemas.openxmlformats.org/markup-compatibility/2006" xmlns:a14="http://schemas.microsoft.com/office/drawing/2010/main">
+        <mc:Choice Requires="a14">
           <p:sp>
             <p:nvSpPr>
               <p:cNvPr id="20" name="Rectangle 19">
@@ -11075,7 +11868,7 @@
             </p:txBody>
           </p:sp>
         </mc:Choice>
-        <mc:Fallback>
+        <mc:Fallback xmlns="">
           <p:sp>
             <p:nvSpPr>
               <p:cNvPr id="20" name="Rectangle 19">
@@ -11297,8 +12090,8 @@
           </a:p>
         </p:txBody>
       </p:sp>
-      <mc:AlternateContent xmlns:mc="http://schemas.openxmlformats.org/markup-compatibility/2006">
-        <mc:Choice xmlns:a14="http://schemas.microsoft.com/office/drawing/2010/main" Requires="a14">
+      <mc:AlternateContent xmlns:mc="http://schemas.openxmlformats.org/markup-compatibility/2006" xmlns:a14="http://schemas.microsoft.com/office/drawing/2010/main">
+        <mc:Choice Requires="a14">
           <p:sp>
             <p:nvSpPr>
               <p:cNvPr id="15" name="TextBox 14">
@@ -11479,7 +12272,7 @@
             </p:txBody>
           </p:sp>
         </mc:Choice>
-        <mc:Fallback>
+        <mc:Fallback xmlns="">
           <p:sp>
             <p:nvSpPr>
               <p:cNvPr id="15" name="TextBox 14">
@@ -11524,8 +12317,8 @@
           </p:sp>
         </mc:Fallback>
       </mc:AlternateContent>
-      <mc:AlternateContent xmlns:mc="http://schemas.openxmlformats.org/markup-compatibility/2006">
-        <mc:Choice xmlns:a14="http://schemas.microsoft.com/office/drawing/2010/main" Requires="a14">
+      <mc:AlternateContent xmlns:mc="http://schemas.openxmlformats.org/markup-compatibility/2006" xmlns:a14="http://schemas.microsoft.com/office/drawing/2010/main">
+        <mc:Choice Requires="a14">
           <p:sp>
             <p:nvSpPr>
               <p:cNvPr id="16" name="TextBox 15">
@@ -11799,7 +12592,7 @@
             </p:txBody>
           </p:sp>
         </mc:Choice>
-        <mc:Fallback>
+        <mc:Fallback xmlns="">
           <p:sp>
             <p:nvSpPr>
               <p:cNvPr id="16" name="TextBox 15">
@@ -11891,8 +12684,8 @@
           </a:p>
         </p:txBody>
       </p:sp>
-      <mc:AlternateContent xmlns:mc="http://schemas.openxmlformats.org/markup-compatibility/2006">
-        <mc:Choice xmlns:a14="http://schemas.microsoft.com/office/drawing/2010/main" Requires="a14">
+      <mc:AlternateContent xmlns:mc="http://schemas.openxmlformats.org/markup-compatibility/2006" xmlns:a14="http://schemas.microsoft.com/office/drawing/2010/main">
+        <mc:Choice Requires="a14">
           <p:sp>
             <p:nvSpPr>
               <p:cNvPr id="18" name="TextBox 17">
@@ -12081,7 +12874,7 @@
             </p:txBody>
           </p:sp>
         </mc:Choice>
-        <mc:Fallback>
+        <mc:Fallback xmlns="">
           <p:sp>
             <p:nvSpPr>
               <p:cNvPr id="18" name="TextBox 17">
@@ -12126,8 +12919,8 @@
           </p:sp>
         </mc:Fallback>
       </mc:AlternateContent>
-      <mc:AlternateContent xmlns:mc="http://schemas.openxmlformats.org/markup-compatibility/2006">
-        <mc:Choice xmlns:a14="http://schemas.microsoft.com/office/drawing/2010/main" Requires="a14">
+      <mc:AlternateContent xmlns:mc="http://schemas.openxmlformats.org/markup-compatibility/2006" xmlns:a14="http://schemas.microsoft.com/office/drawing/2010/main">
+        <mc:Choice Requires="a14">
           <p:sp>
             <p:nvSpPr>
               <p:cNvPr id="19" name="TextBox 18">
@@ -12310,7 +13103,7 @@
             </p:txBody>
           </p:sp>
         </mc:Choice>
-        <mc:Fallback>
+        <mc:Fallback xmlns="">
           <p:sp>
             <p:nvSpPr>
               <p:cNvPr id="19" name="TextBox 18">
@@ -12635,8 +13428,8 @@
           </a:p>
         </p:txBody>
       </p:sp>
-      <mc:AlternateContent xmlns:mc="http://schemas.openxmlformats.org/markup-compatibility/2006">
-        <mc:Choice xmlns:a14="http://schemas.microsoft.com/office/drawing/2010/main" Requires="a14">
+      <mc:AlternateContent xmlns:mc="http://schemas.openxmlformats.org/markup-compatibility/2006" xmlns:a14="http://schemas.microsoft.com/office/drawing/2010/main">
+        <mc:Choice Requires="a14">
           <p:sp>
             <p:nvSpPr>
               <p:cNvPr id="21" name="TextBox 20">
@@ -12686,7 +13479,7 @@
             </p:txBody>
           </p:sp>
         </mc:Choice>
-        <mc:Fallback>
+        <mc:Fallback xmlns="">
           <p:sp>
             <p:nvSpPr>
               <p:cNvPr id="21" name="TextBox 20">
@@ -13021,8 +13814,8 @@
           </a:prstGeom>
         </p:spPr>
       </p:pic>
-      <mc:AlternateContent xmlns:mc="http://schemas.openxmlformats.org/markup-compatibility/2006">
-        <mc:Choice xmlns:a14="http://schemas.microsoft.com/office/drawing/2010/main" Requires="a14">
+      <mc:AlternateContent xmlns:mc="http://schemas.openxmlformats.org/markup-compatibility/2006" xmlns:a14="http://schemas.microsoft.com/office/drawing/2010/main">
+        <mc:Choice Requires="a14">
           <p:sp>
             <p:nvSpPr>
               <p:cNvPr id="5" name="TextBox 4">
@@ -13392,7 +14185,7 @@
             </p:txBody>
           </p:sp>
         </mc:Choice>
-        <mc:Fallback>
+        <mc:Fallback xmlns="">
           <p:sp>
             <p:nvSpPr>
               <p:cNvPr id="5" name="TextBox 4">
@@ -13599,8 +14392,8 @@
           </a:p>
         </p:txBody>
       </p:sp>
-      <mc:AlternateContent xmlns:mc="http://schemas.openxmlformats.org/markup-compatibility/2006">
-        <mc:Choice xmlns:a14="http://schemas.microsoft.com/office/drawing/2010/main" Requires="a14">
+      <mc:AlternateContent xmlns:mc="http://schemas.openxmlformats.org/markup-compatibility/2006" xmlns:a14="http://schemas.microsoft.com/office/drawing/2010/main">
+        <mc:Choice Requires="a14">
           <p:sp>
             <p:nvSpPr>
               <p:cNvPr id="7" name="Rectangle 6">
@@ -13774,7 +14567,7 @@
             </p:txBody>
           </p:sp>
         </mc:Choice>
-        <mc:Fallback>
+        <mc:Fallback xmlns="">
           <p:sp>
             <p:nvSpPr>
               <p:cNvPr id="7" name="Rectangle 6">
@@ -13819,8 +14612,8 @@
           </p:sp>
         </mc:Fallback>
       </mc:AlternateContent>
-      <mc:AlternateContent xmlns:mc="http://schemas.openxmlformats.org/markup-compatibility/2006">
-        <mc:Choice xmlns:a14="http://schemas.microsoft.com/office/drawing/2010/main" Requires="a14">
+      <mc:AlternateContent xmlns:mc="http://schemas.openxmlformats.org/markup-compatibility/2006" xmlns:a14="http://schemas.microsoft.com/office/drawing/2010/main">
+        <mc:Choice Requires="a14">
           <p:sp>
             <p:nvSpPr>
               <p:cNvPr id="9" name="TextBox 8">
@@ -13849,6 +14642,7 @@
               </a:bodyPr>
               <a:lstStyle/>
               <a:p>
+                <a:pPr/>
                 <a14:m>
                   <m:oMathPara xmlns:m="http://schemas.openxmlformats.org/officeDocument/2006/math">
                     <m:oMathParaPr>
@@ -14215,7 +15009,7 @@
             </p:txBody>
           </p:sp>
         </mc:Choice>
-        <mc:Fallback>
+        <mc:Fallback xmlns="">
           <p:sp>
             <p:nvSpPr>
               <p:cNvPr id="9" name="TextBox 8">
@@ -14260,8 +15054,8 @@
           </p:sp>
         </mc:Fallback>
       </mc:AlternateContent>
-      <mc:AlternateContent xmlns:mc="http://schemas.openxmlformats.org/markup-compatibility/2006">
-        <mc:Choice xmlns:a14="http://schemas.microsoft.com/office/drawing/2010/main" Requires="a14">
+      <mc:AlternateContent xmlns:mc="http://schemas.openxmlformats.org/markup-compatibility/2006" xmlns:a14="http://schemas.microsoft.com/office/drawing/2010/main">
+        <mc:Choice Requires="a14">
           <p:sp>
             <p:nvSpPr>
               <p:cNvPr id="10" name="TextBox 9">
@@ -14290,6 +15084,7 @@
               </a:bodyPr>
               <a:lstStyle/>
               <a:p>
+                <a:pPr/>
                 <a14:m>
                   <m:oMathPara xmlns:m="http://schemas.openxmlformats.org/officeDocument/2006/math">
                     <m:oMathParaPr>
@@ -14789,7 +15584,7 @@
             </p:txBody>
           </p:sp>
         </mc:Choice>
-        <mc:Fallback>
+        <mc:Fallback xmlns="">
           <p:sp>
             <p:nvSpPr>
               <p:cNvPr id="10" name="TextBox 9">
@@ -15204,8 +15999,8 @@
           </a:p>
         </p:txBody>
       </p:sp>
-      <mc:AlternateContent xmlns:mc="http://schemas.openxmlformats.org/markup-compatibility/2006">
-        <mc:Choice xmlns:a14="http://schemas.microsoft.com/office/drawing/2010/main" Requires="a14">
+      <mc:AlternateContent xmlns:mc="http://schemas.openxmlformats.org/markup-compatibility/2006" xmlns:a14="http://schemas.microsoft.com/office/drawing/2010/main">
+        <mc:Choice Requires="a14">
           <p:sp>
             <p:nvSpPr>
               <p:cNvPr id="8" name="TextBox 7">
@@ -16497,7 +17292,7 @@
             </p:txBody>
           </p:sp>
         </mc:Choice>
-        <mc:Fallback>
+        <mc:Fallback xmlns="">
           <p:sp>
             <p:nvSpPr>
               <p:cNvPr id="8" name="TextBox 7">
@@ -16542,8 +17337,8 @@
           </p:sp>
         </mc:Fallback>
       </mc:AlternateContent>
-      <mc:AlternateContent xmlns:mc="http://schemas.openxmlformats.org/markup-compatibility/2006">
-        <mc:Choice xmlns:a14="http://schemas.microsoft.com/office/drawing/2010/main" Requires="a14">
+      <mc:AlternateContent xmlns:mc="http://schemas.openxmlformats.org/markup-compatibility/2006" xmlns:a14="http://schemas.microsoft.com/office/drawing/2010/main">
+        <mc:Choice Requires="a14">
           <p:sp>
             <p:nvSpPr>
               <p:cNvPr id="3" name="Rectangle 2">
@@ -16630,7 +17425,7 @@
             </p:txBody>
           </p:sp>
         </mc:Choice>
-        <mc:Fallback>
+        <mc:Fallback xmlns="">
           <p:sp>
             <p:nvSpPr>
               <p:cNvPr id="3" name="Rectangle 2">
@@ -16675,8 +17470,8 @@
           </p:sp>
         </mc:Fallback>
       </mc:AlternateContent>
-      <mc:AlternateContent xmlns:mc="http://schemas.openxmlformats.org/markup-compatibility/2006">
-        <mc:Choice xmlns:a14="http://schemas.microsoft.com/office/drawing/2010/main" Requires="a14">
+      <mc:AlternateContent xmlns:mc="http://schemas.openxmlformats.org/markup-compatibility/2006" xmlns:a14="http://schemas.microsoft.com/office/drawing/2010/main">
+        <mc:Choice Requires="a14">
           <p:sp>
             <p:nvSpPr>
               <p:cNvPr id="5" name="Rectangle 4">
@@ -16704,6 +17499,7 @@
               </a:bodyPr>
               <a:lstStyle/>
               <a:p>
+                <a:pPr/>
                 <a14:m>
                   <m:oMathPara xmlns:m="http://schemas.openxmlformats.org/officeDocument/2006/math">
                     <m:oMathParaPr>
@@ -16840,7 +17636,7 @@
             </p:txBody>
           </p:sp>
         </mc:Choice>
-        <mc:Fallback>
+        <mc:Fallback xmlns="">
           <p:sp>
             <p:nvSpPr>
               <p:cNvPr id="5" name="Rectangle 4">
@@ -17003,8 +17799,8 @@
           </a:p>
         </p:txBody>
       </p:sp>
-      <mc:AlternateContent xmlns:mc="http://schemas.openxmlformats.org/markup-compatibility/2006">
-        <mc:Choice xmlns:a14="http://schemas.microsoft.com/office/drawing/2010/main" Requires="a14">
+      <mc:AlternateContent xmlns:mc="http://schemas.openxmlformats.org/markup-compatibility/2006" xmlns:a14="http://schemas.microsoft.com/office/drawing/2010/main">
+        <mc:Choice Requires="a14">
           <p:sp>
             <p:nvSpPr>
               <p:cNvPr id="7" name="Rectangle 6">
@@ -17066,7 +17862,7 @@
             </p:txBody>
           </p:sp>
         </mc:Choice>
-        <mc:Fallback>
+        <mc:Fallback xmlns="">
           <p:sp>
             <p:nvSpPr>
               <p:cNvPr id="7" name="Rectangle 6">
@@ -17111,8 +17907,8 @@
           </p:sp>
         </mc:Fallback>
       </mc:AlternateContent>
-      <mc:AlternateContent xmlns:mc="http://schemas.openxmlformats.org/markup-compatibility/2006">
-        <mc:Choice xmlns:a14="http://schemas.microsoft.com/office/drawing/2010/main" Requires="a14">
+      <mc:AlternateContent xmlns:mc="http://schemas.openxmlformats.org/markup-compatibility/2006" xmlns:a14="http://schemas.microsoft.com/office/drawing/2010/main">
+        <mc:Choice Requires="a14">
           <p:sp>
             <p:nvSpPr>
               <p:cNvPr id="6" name="TextBox 5">
@@ -17141,6 +17937,7 @@
               </a:bodyPr>
               <a:lstStyle/>
               <a:p>
+                <a:pPr/>
                 <a14:m>
                   <m:oMathPara xmlns:m="http://schemas.openxmlformats.org/officeDocument/2006/math">
                     <m:oMathParaPr>
@@ -17227,13 +18024,7 @@
                                             <a:rPr lang="it-IT" b="0" i="1" smtClean="0">
                                               <a:latin typeface="Cambria Math" panose="02040503050406030204" pitchFamily="18" charset="0"/>
                                             </a:rPr>
-                                            <m:t>−</m:t>
-                                          </m:r>
-                                          <m:r>
-                                            <a:rPr lang="it-IT" b="0" i="1" smtClean="0">
-                                              <a:latin typeface="Cambria Math" panose="02040503050406030204" pitchFamily="18" charset="0"/>
-                                            </a:rPr>
-                                            <m:t>1</m:t>
+                                            <m:t>−1</m:t>
                                           </m:r>
                                         </m:sub>
                                         <m:sup>
@@ -17290,13 +18081,7 @@
                                             <a:rPr lang="it-IT" b="0" i="1" smtClean="0">
                                               <a:latin typeface="Cambria Math" panose="02040503050406030204" pitchFamily="18" charset="0"/>
                                             </a:rPr>
-                                            <m:t>−</m:t>
-                                          </m:r>
-                                          <m:r>
-                                            <a:rPr lang="it-IT" b="0" i="1" smtClean="0">
-                                              <a:latin typeface="Cambria Math" panose="02040503050406030204" pitchFamily="18" charset="0"/>
-                                            </a:rPr>
-                                            <m:t>1</m:t>
+                                            <m:t>−1</m:t>
                                           </m:r>
                                         </m:sub>
                                         <m:sup>
@@ -17422,13 +18207,7 @@
                                             <a:rPr lang="it-IT" i="1">
                                               <a:latin typeface="Cambria Math" panose="02040503050406030204" pitchFamily="18" charset="0"/>
                                             </a:rPr>
-                                            <m:t>−</m:t>
-                                          </m:r>
-                                          <m:r>
-                                            <a:rPr lang="it-IT" i="1">
-                                              <a:latin typeface="Cambria Math" panose="02040503050406030204" pitchFamily="18" charset="0"/>
-                                            </a:rPr>
-                                            <m:t>1</m:t>
+                                            <m:t>−1</m:t>
                                           </m:r>
                                         </m:sub>
                                         <m:sup>
@@ -17485,13 +18264,7 @@
                                             <a:rPr lang="it-IT" i="1">
                                               <a:latin typeface="Cambria Math" panose="02040503050406030204" pitchFamily="18" charset="0"/>
                                             </a:rPr>
-                                            <m:t>−</m:t>
-                                          </m:r>
-                                          <m:r>
-                                            <a:rPr lang="it-IT" i="1">
-                                              <a:latin typeface="Cambria Math" panose="02040503050406030204" pitchFamily="18" charset="0"/>
-                                            </a:rPr>
-                                            <m:t>1</m:t>
+                                            <m:t>−1</m:t>
                                           </m:r>
                                         </m:sub>
                                         <m:sup>
@@ -17617,13 +18390,7 @@
                                             <a:rPr lang="it-IT" i="1">
                                               <a:latin typeface="Cambria Math" panose="02040503050406030204" pitchFamily="18" charset="0"/>
                                             </a:rPr>
-                                            <m:t>−</m:t>
-                                          </m:r>
-                                          <m:r>
-                                            <a:rPr lang="it-IT" i="1">
-                                              <a:latin typeface="Cambria Math" panose="02040503050406030204" pitchFamily="18" charset="0"/>
-                                            </a:rPr>
-                                            <m:t>1</m:t>
+                                            <m:t>−1</m:t>
                                           </m:r>
                                         </m:sub>
                                         <m:sup>
@@ -17680,13 +18447,7 @@
                                             <a:rPr lang="it-IT" i="1">
                                               <a:latin typeface="Cambria Math" panose="02040503050406030204" pitchFamily="18" charset="0"/>
                                             </a:rPr>
-                                            <m:t>−</m:t>
-                                          </m:r>
-                                          <m:r>
-                                            <a:rPr lang="it-IT" i="1">
-                                              <a:latin typeface="Cambria Math" panose="02040503050406030204" pitchFamily="18" charset="0"/>
-                                            </a:rPr>
-                                            <m:t>1</m:t>
+                                            <m:t>−1</m:t>
                                           </m:r>
                                         </m:sub>
                                         <m:sup>
@@ -17749,7 +18510,7 @@
             </p:txBody>
           </p:sp>
         </mc:Choice>
-        <mc:Fallback>
+        <mc:Fallback xmlns="">
           <p:sp>
             <p:nvSpPr>
               <p:cNvPr id="6" name="TextBox 5">
@@ -17794,8 +18555,8 @@
           </p:sp>
         </mc:Fallback>
       </mc:AlternateContent>
-      <mc:AlternateContent xmlns:mc="http://schemas.openxmlformats.org/markup-compatibility/2006">
-        <mc:Choice xmlns:a14="http://schemas.microsoft.com/office/drawing/2010/main" Requires="a14">
+      <mc:AlternateContent xmlns:mc="http://schemas.openxmlformats.org/markup-compatibility/2006" xmlns:a14="http://schemas.microsoft.com/office/drawing/2010/main">
+        <mc:Choice Requires="a14">
           <p:sp>
             <p:nvSpPr>
               <p:cNvPr id="9" name="Rectangle 8">
@@ -17930,7 +18691,7 @@
             </p:txBody>
           </p:sp>
         </mc:Choice>
-        <mc:Fallback>
+        <mc:Fallback xmlns="">
           <p:sp>
             <p:nvSpPr>
               <p:cNvPr id="9" name="Rectangle 8">
@@ -18013,8 +18774,8 @@
           </a:p>
         </p:txBody>
       </p:sp>
-      <mc:AlternateContent xmlns:mc="http://schemas.openxmlformats.org/markup-compatibility/2006">
-        <mc:Choice xmlns:a14="http://schemas.microsoft.com/office/drawing/2010/main" Requires="a14">
+      <mc:AlternateContent xmlns:mc="http://schemas.openxmlformats.org/markup-compatibility/2006" xmlns:a14="http://schemas.microsoft.com/office/drawing/2010/main">
+        <mc:Choice Requires="a14">
           <p:sp>
             <p:nvSpPr>
               <p:cNvPr id="11" name="TextBox 10">
@@ -18043,6 +18804,7 @@
               </a:bodyPr>
               <a:lstStyle/>
               <a:p>
+                <a:pPr/>
                 <a14:m>
                   <m:oMathPara xmlns:m="http://schemas.openxmlformats.org/officeDocument/2006/math">
                     <m:oMathParaPr>
@@ -18172,13 +18934,7 @@
                                             <a:rPr lang="it-IT" b="0" i="1" smtClean="0">
                                               <a:latin typeface="Cambria Math" panose="02040503050406030204" pitchFamily="18" charset="0"/>
                                             </a:rPr>
-                                            <m:t>−</m:t>
-                                          </m:r>
-                                          <m:r>
-                                            <a:rPr lang="it-IT" b="0" i="1" smtClean="0">
-                                              <a:latin typeface="Cambria Math" panose="02040503050406030204" pitchFamily="18" charset="0"/>
-                                            </a:rPr>
-                                            <m:t>1</m:t>
+                                            <m:t>−1</m:t>
                                           </m:r>
                                         </m:sub>
                                         <m:sup>
@@ -18274,13 +19030,7 @@
                                             <a:rPr lang="it-IT" b="0" i="1" smtClean="0">
                                               <a:latin typeface="Cambria Math" panose="02040503050406030204" pitchFamily="18" charset="0"/>
                                             </a:rPr>
-                                            <m:t>−</m:t>
-                                          </m:r>
-                                          <m:r>
-                                            <a:rPr lang="it-IT" b="0" i="1" smtClean="0">
-                                              <a:latin typeface="Cambria Math" panose="02040503050406030204" pitchFamily="18" charset="0"/>
-                                            </a:rPr>
-                                            <m:t>1</m:t>
+                                            <m:t>−1</m:t>
                                           </m:r>
                                         </m:sub>
                                         <m:sup>
@@ -18337,13 +19087,7 @@
                                             <a:rPr lang="it-IT" b="0" i="1" smtClean="0">
                                               <a:latin typeface="Cambria Math" panose="02040503050406030204" pitchFamily="18" charset="0"/>
                                             </a:rPr>
-                                            <m:t>−</m:t>
-                                          </m:r>
-                                          <m:r>
-                                            <a:rPr lang="it-IT" b="0" i="1" smtClean="0">
-                                              <a:latin typeface="Cambria Math" panose="02040503050406030204" pitchFamily="18" charset="0"/>
-                                            </a:rPr>
-                                            <m:t>1</m:t>
+                                            <m:t>−1</m:t>
                                           </m:r>
                                         </m:sub>
                                         <m:sup>
@@ -18416,13 +19160,7 @@
                                             <a:rPr lang="it-IT" b="0" i="1" smtClean="0">
                                               <a:latin typeface="Cambria Math" panose="02040503050406030204" pitchFamily="18" charset="0"/>
                                             </a:rPr>
-                                            <m:t>−</m:t>
-                                          </m:r>
-                                          <m:r>
-                                            <a:rPr lang="it-IT" b="0" i="1" smtClean="0">
-                                              <a:latin typeface="Cambria Math" panose="02040503050406030204" pitchFamily="18" charset="0"/>
-                                            </a:rPr>
-                                            <m:t>1</m:t>
+                                            <m:t>−1</m:t>
                                           </m:r>
                                         </m:sub>
                                         <m:sup>
@@ -18478,13 +19216,7 @@
                                             <a:rPr lang="it-IT" i="1">
                                               <a:latin typeface="Cambria Math" panose="02040503050406030204" pitchFamily="18" charset="0"/>
                                             </a:rPr>
-                                            <m:t>−</m:t>
-                                          </m:r>
-                                          <m:r>
-                                            <a:rPr lang="it-IT" i="1">
-                                              <a:latin typeface="Cambria Math" panose="02040503050406030204" pitchFamily="18" charset="0"/>
-                                            </a:rPr>
-                                            <m:t>1</m:t>
+                                            <m:t>−1</m:t>
                                           </m:r>
                                         </m:sub>
                                         <m:sup>
@@ -18541,13 +19273,7 @@
                                             <a:rPr lang="it-IT" i="1">
                                               <a:latin typeface="Cambria Math" panose="02040503050406030204" pitchFamily="18" charset="0"/>
                                             </a:rPr>
-                                            <m:t>−</m:t>
-                                          </m:r>
-                                          <m:r>
-                                            <a:rPr lang="it-IT" i="1">
-                                              <a:latin typeface="Cambria Math" panose="02040503050406030204" pitchFamily="18" charset="0"/>
-                                            </a:rPr>
-                                            <m:t>1</m:t>
+                                            <m:t>−1</m:t>
                                           </m:r>
                                         </m:sub>
                                         <m:sup>
@@ -18620,13 +19346,7 @@
                                             <a:rPr lang="it-IT" i="1">
                                               <a:latin typeface="Cambria Math" panose="02040503050406030204" pitchFamily="18" charset="0"/>
                                             </a:rPr>
-                                            <m:t>−</m:t>
-                                          </m:r>
-                                          <m:r>
-                                            <a:rPr lang="it-IT" i="1">
-                                              <a:latin typeface="Cambria Math" panose="02040503050406030204" pitchFamily="18" charset="0"/>
-                                            </a:rPr>
-                                            <m:t>1</m:t>
+                                            <m:t>−1</m:t>
                                           </m:r>
                                         </m:sub>
                                         <m:sup>
@@ -18695,13 +19415,7 @@
                                         <a:rPr lang="it-IT" b="0" i="1" smtClean="0">
                                           <a:latin typeface="Cambria Math" panose="02040503050406030204" pitchFamily="18" charset="0"/>
                                         </a:rPr>
-                                        <m:t>−</m:t>
-                                      </m:r>
-                                      <m:r>
-                                        <a:rPr lang="it-IT" b="0" i="1" smtClean="0">
-                                          <a:latin typeface="Cambria Math" panose="02040503050406030204" pitchFamily="18" charset="0"/>
-                                        </a:rPr>
-                                        <m:t>1</m:t>
+                                        <m:t>−1</m:t>
                                       </m:r>
                                     </m:sub>
                                     <m:sup>
@@ -18758,13 +19472,7 @@
                                         <a:rPr lang="it-IT" b="0" i="1" smtClean="0">
                                           <a:latin typeface="Cambria Math" panose="02040503050406030204" pitchFamily="18" charset="0"/>
                                         </a:rPr>
-                                        <m:t>−</m:t>
-                                      </m:r>
-                                      <m:r>
-                                        <a:rPr lang="it-IT" b="0" i="1" smtClean="0">
-                                          <a:latin typeface="Cambria Math" panose="02040503050406030204" pitchFamily="18" charset="0"/>
-                                        </a:rPr>
-                                        <m:t>1</m:t>
+                                        <m:t>−1</m:t>
                                       </m:r>
                                     </m:sub>
                                     <m:sup>
@@ -18905,13 +19613,7 @@
                                         <a:rPr lang="it-IT" b="0" i="1" smtClean="0">
                                           <a:latin typeface="Cambria Math" panose="02040503050406030204" pitchFamily="18" charset="0"/>
                                         </a:rPr>
-                                        <m:t>−</m:t>
-                                      </m:r>
-                                      <m:r>
-                                        <a:rPr lang="it-IT" b="0" i="1" smtClean="0">
-                                          <a:latin typeface="Cambria Math" panose="02040503050406030204" pitchFamily="18" charset="0"/>
-                                        </a:rPr>
-                                        <m:t>1</m:t>
+                                        <m:t>−1</m:t>
                                       </m:r>
                                     </m:sub>
                                     <m:sup>
@@ -19031,7 +19733,7 @@
             </p:txBody>
           </p:sp>
         </mc:Choice>
-        <mc:Fallback>
+        <mc:Fallback xmlns="">
           <p:sp>
             <p:nvSpPr>
               <p:cNvPr id="11" name="TextBox 10">
@@ -19292,8 +19994,8 @@
           </a:p>
         </p:txBody>
       </p:sp>
-      <mc:AlternateContent xmlns:mc="http://schemas.openxmlformats.org/markup-compatibility/2006">
-        <mc:Choice xmlns:a14="http://schemas.microsoft.com/office/drawing/2010/main" Requires="a14">
+      <mc:AlternateContent xmlns:mc="http://schemas.openxmlformats.org/markup-compatibility/2006" xmlns:a14="http://schemas.microsoft.com/office/drawing/2010/main">
+        <mc:Choice Requires="a14">
           <p:sp>
             <p:nvSpPr>
               <p:cNvPr id="3" name="TextBox 2">
@@ -19322,6 +20024,7 @@
               </a:bodyPr>
               <a:lstStyle/>
               <a:p>
+                <a:pPr/>
                 <a14:m>
                   <m:oMathPara xmlns:m="http://schemas.openxmlformats.org/officeDocument/2006/math">
                     <m:oMathParaPr>
@@ -19912,7 +20615,16 @@
                                       <a:rPr lang="it-IT" b="0" i="0" smtClean="0">
                                         <a:latin typeface="Cambria Math" panose="02040503050406030204" pitchFamily="18" charset="0"/>
                                       </a:rPr>
-                                      <m:t>cot</m:t>
+                                      <m:t>c</m:t>
+                                    </m:r>
+                                    <m:r>
+                                      <m:rPr>
+                                        <m:sty m:val="p"/>
+                                      </m:rPr>
+                                      <a:rPr lang="it-IT" b="0" i="0" smtClean="0">
+                                        <a:latin typeface="Cambria Math" panose="02040503050406030204" pitchFamily="18" charset="0"/>
+                                      </a:rPr>
+                                      <m:t>ot</m:t>
                                     </m:r>
                                   </m:fName>
                                   <m:e>
@@ -20364,7 +21076,16 @@
                                       <a:rPr lang="it-IT" b="0" i="0" smtClean="0">
                                         <a:latin typeface="Cambria Math" panose="02040503050406030204" pitchFamily="18" charset="0"/>
                                       </a:rPr>
-                                      <m:t>sin</m:t>
+                                      <m:t>s</m:t>
+                                    </m:r>
+                                    <m:r>
+                                      <m:rPr>
+                                        <m:sty m:val="p"/>
+                                      </m:rPr>
+                                      <a:rPr lang="it-IT" b="0" i="0" smtClean="0">
+                                        <a:latin typeface="Cambria Math" panose="02040503050406030204" pitchFamily="18" charset="0"/>
+                                      </a:rPr>
+                                      <m:t>in</m:t>
                                     </m:r>
                                   </m:fName>
                                   <m:e>
@@ -20985,7 +21706,7 @@
             </p:txBody>
           </p:sp>
         </mc:Choice>
-        <mc:Fallback>
+        <mc:Fallback xmlns="">
           <p:sp>
             <p:nvSpPr>
               <p:cNvPr id="3" name="TextBox 2">
@@ -21080,8 +21801,8 @@
           </a:p>
         </p:txBody>
       </p:sp>
-      <mc:AlternateContent xmlns:mc="http://schemas.openxmlformats.org/markup-compatibility/2006">
-        <mc:Choice xmlns:a14="http://schemas.microsoft.com/office/drawing/2010/main" Requires="a14">
+      <mc:AlternateContent xmlns:mc="http://schemas.openxmlformats.org/markup-compatibility/2006" xmlns:a14="http://schemas.microsoft.com/office/drawing/2010/main">
+        <mc:Choice Requires="a14">
           <p:sp>
             <p:nvSpPr>
               <p:cNvPr id="8" name="Rectangle 7">
@@ -21608,7 +22329,7 @@
             </p:txBody>
           </p:sp>
         </mc:Choice>
-        <mc:Fallback>
+        <mc:Fallback xmlns="">
           <p:sp>
             <p:nvSpPr>
               <p:cNvPr id="8" name="Rectangle 7">
@@ -21695,8 +22416,8 @@
           </a:p>
         </p:txBody>
       </p:sp>
-      <mc:AlternateContent xmlns:mc="http://schemas.openxmlformats.org/markup-compatibility/2006">
-        <mc:Choice xmlns:a14="http://schemas.microsoft.com/office/drawing/2010/main" Requires="a14">
+      <mc:AlternateContent xmlns:mc="http://schemas.openxmlformats.org/markup-compatibility/2006" xmlns:a14="http://schemas.microsoft.com/office/drawing/2010/main">
+        <mc:Choice Requires="a14">
           <p:sp>
             <p:nvSpPr>
               <p:cNvPr id="13" name="TextBox 12">
@@ -21725,6 +22446,7 @@
               </a:bodyPr>
               <a:lstStyle/>
               <a:p>
+                <a:pPr/>
                 <a14:m>
                   <m:oMathPara xmlns:m="http://schemas.openxmlformats.org/officeDocument/2006/math">
                     <m:oMathParaPr>
@@ -21891,7 +22613,7 @@
             </p:txBody>
           </p:sp>
         </mc:Choice>
-        <mc:Fallback>
+        <mc:Fallback xmlns="">
           <p:sp>
             <p:nvSpPr>
               <p:cNvPr id="13" name="TextBox 12">
@@ -22164,8 +22886,8 @@
           </a:p>
         </p:txBody>
       </p:sp>
-      <mc:AlternateContent xmlns:mc="http://schemas.openxmlformats.org/markup-compatibility/2006">
-        <mc:Choice xmlns:a14="http://schemas.microsoft.com/office/drawing/2010/main" Requires="a14">
+      <mc:AlternateContent xmlns:mc="http://schemas.openxmlformats.org/markup-compatibility/2006" xmlns:a14="http://schemas.microsoft.com/office/drawing/2010/main">
+        <mc:Choice Requires="a14">
           <p:sp>
             <p:nvSpPr>
               <p:cNvPr id="6" name="TextBox 5">
@@ -22194,6 +22916,7 @@
               </a:bodyPr>
               <a:lstStyle/>
               <a:p>
+                <a:pPr/>
                 <a14:m>
                   <m:oMathPara xmlns:m="http://schemas.openxmlformats.org/officeDocument/2006/math">
                     <m:oMathParaPr>
@@ -22566,7 +23289,7 @@
             </p:txBody>
           </p:sp>
         </mc:Choice>
-        <mc:Fallback>
+        <mc:Fallback xmlns="">
           <p:sp>
             <p:nvSpPr>
               <p:cNvPr id="6" name="TextBox 5">
@@ -22611,8 +23334,8 @@
           </p:sp>
         </mc:Fallback>
       </mc:AlternateContent>
-      <mc:AlternateContent xmlns:mc="http://schemas.openxmlformats.org/markup-compatibility/2006">
-        <mc:Choice xmlns:a14="http://schemas.microsoft.com/office/drawing/2010/main" Requires="a14">
+      <mc:AlternateContent xmlns:mc="http://schemas.openxmlformats.org/markup-compatibility/2006" xmlns:a14="http://schemas.microsoft.com/office/drawing/2010/main">
+        <mc:Choice Requires="a14">
           <p:sp>
             <p:nvSpPr>
               <p:cNvPr id="9" name="TextBox 8">
@@ -22641,6 +23364,7 @@
               </a:bodyPr>
               <a:lstStyle/>
               <a:p>
+                <a:pPr/>
                 <a14:m>
                   <m:oMathPara xmlns:m="http://schemas.openxmlformats.org/officeDocument/2006/math">
                     <m:oMathParaPr>
@@ -22831,7 +23555,7 @@
             </p:txBody>
           </p:sp>
         </mc:Choice>
-        <mc:Fallback>
+        <mc:Fallback xmlns="">
           <p:sp>
             <p:nvSpPr>
               <p:cNvPr id="9" name="TextBox 8">
@@ -22876,8 +23600,8 @@
           </p:sp>
         </mc:Fallback>
       </mc:AlternateContent>
-      <mc:AlternateContent xmlns:mc="http://schemas.openxmlformats.org/markup-compatibility/2006">
-        <mc:Choice xmlns:a14="http://schemas.microsoft.com/office/drawing/2010/main" Requires="a14">
+      <mc:AlternateContent xmlns:mc="http://schemas.openxmlformats.org/markup-compatibility/2006" xmlns:a14="http://schemas.microsoft.com/office/drawing/2010/main">
+        <mc:Choice Requires="a14">
           <p:sp>
             <p:nvSpPr>
               <p:cNvPr id="10" name="TextBox 9">
@@ -22906,6 +23630,7 @@
               </a:bodyPr>
               <a:lstStyle/>
               <a:p>
+                <a:pPr/>
                 <a14:m>
                   <m:oMathPara xmlns:m="http://schemas.openxmlformats.org/officeDocument/2006/math">
                     <m:oMathParaPr>
@@ -23107,7 +23832,7 @@
             </p:txBody>
           </p:sp>
         </mc:Choice>
-        <mc:Fallback>
+        <mc:Fallback xmlns="">
           <p:sp>
             <p:nvSpPr>
               <p:cNvPr id="10" name="TextBox 9">
@@ -23152,8 +23877,8 @@
           </p:sp>
         </mc:Fallback>
       </mc:AlternateContent>
-      <mc:AlternateContent xmlns:mc="http://schemas.openxmlformats.org/markup-compatibility/2006">
-        <mc:Choice xmlns:a14="http://schemas.microsoft.com/office/drawing/2010/main" Requires="a14">
+      <mc:AlternateContent xmlns:mc="http://schemas.openxmlformats.org/markup-compatibility/2006" xmlns:a14="http://schemas.microsoft.com/office/drawing/2010/main">
+        <mc:Choice Requires="a14">
           <p:sp>
             <p:nvSpPr>
               <p:cNvPr id="11" name="Rectangle 10">
@@ -23181,6 +23906,7 @@
               </a:bodyPr>
               <a:lstStyle/>
               <a:p>
+                <a:pPr/>
                 <a14:m>
                   <m:oMathPara xmlns:m="http://schemas.openxmlformats.org/officeDocument/2006/math">
                     <m:oMathParaPr>
@@ -23325,7 +24051,7 @@
             </p:txBody>
           </p:sp>
         </mc:Choice>
-        <mc:Fallback>
+        <mc:Fallback xmlns="">
           <p:sp>
             <p:nvSpPr>
               <p:cNvPr id="11" name="Rectangle 10">

</xml_diff>

<commit_message>
added smeared helix to kalman presentation
</commit_message>
<xml_diff>
--- a/Presentations/Kalman Filter.pptx
+++ b/Presentations/Kalman Filter.pptx
@@ -5,10 +5,10 @@
     <p:sldMasterId id="2147483648" r:id="rId3"/>
   </p:sldMasterIdLst>
   <p:notesMasterIdLst>
-    <p:notesMasterId r:id="rId34"/>
+    <p:notesMasterId r:id="rId37"/>
   </p:notesMasterIdLst>
   <p:handoutMasterIdLst>
-    <p:handoutMasterId r:id="rId35"/>
+    <p:handoutMasterId r:id="rId38"/>
   </p:handoutMasterIdLst>
   <p:sldIdLst>
     <p:sldId id="310" r:id="rId4"/>
@@ -41,6 +41,9 @@
     <p:sldId id="425" r:id="rId31"/>
     <p:sldId id="426" r:id="rId32"/>
     <p:sldId id="427" r:id="rId33"/>
+    <p:sldId id="428" r:id="rId34"/>
+    <p:sldId id="429" r:id="rId35"/>
+    <p:sldId id="430" r:id="rId36"/>
   </p:sldIdLst>
   <p:sldSz cx="12192000" cy="6858000"/>
   <p:notesSz cx="6858000" cy="9144000"/>
@@ -263,7 +266,7 @@
             <a:pPr rtl="0"/>
             <a:fld id="{444DDF42-EA81-4D58-9E48-71D338B26FAC}" type="datetime1">
               <a:rPr lang="it-IT" smtClean="0"/>
-              <a:t>06/11/2020</a:t>
+              <a:t>08/11/2020</a:t>
             </a:fld>
             <a:endParaRPr lang="it-IT" dirty="0"/>
           </a:p>
@@ -444,7 +447,7 @@
             <a:fld id="{FABFCAD0-C8D4-46EE-8714-3DAE081602B2}" type="datetime1">
               <a:rPr lang="it-IT" smtClean="0"/>
               <a:pPr/>
-              <a:t>06/11/2020</a:t>
+              <a:t>08/11/2020</a:t>
             </a:fld>
             <a:endParaRPr lang="it-IT" dirty="0"/>
           </a:p>
@@ -28970,6 +28973,2457 @@
 </p:sld>
 </file>
 
+<file path=ppt/slides/slide31.xml><?xml version="1.0" encoding="utf-8"?>
+<p:sld xmlns:a="http://schemas.openxmlformats.org/drawingml/2006/main" xmlns:r="http://schemas.openxmlformats.org/officeDocument/2006/relationships" xmlns:p="http://schemas.openxmlformats.org/presentationml/2006/main">
+  <p:cSld>
+    <p:spTree>
+      <p:nvGrpSpPr>
+        <p:cNvPr id="1" name=""/>
+        <p:cNvGrpSpPr/>
+        <p:nvPr/>
+      </p:nvGrpSpPr>
+      <p:grpSpPr>
+        <a:xfrm>
+          <a:off x="0" y="0"/>
+          <a:ext cx="0" cy="0"/>
+          <a:chOff x="0" y="0"/>
+          <a:chExt cx="0" cy="0"/>
+        </a:xfrm>
+      </p:grpSpPr>
+      <p:sp>
+        <p:nvSpPr>
+          <p:cNvPr id="2" name="Titolo 1">
+            <a:extLst>
+              <a:ext uri="{FF2B5EF4-FFF2-40B4-BE49-F238E27FC236}">
+                <a16:creationId xmlns:a16="http://schemas.microsoft.com/office/drawing/2014/main" id="{AEA5083B-CC27-4F1C-AD03-E3DBEC1C9E78}"/>
+              </a:ext>
+            </a:extLst>
+          </p:cNvPr>
+          <p:cNvSpPr>
+            <a:spLocks noGrp="1"/>
+          </p:cNvSpPr>
+          <p:nvPr>
+            <p:ph type="title"/>
+          </p:nvPr>
+        </p:nvSpPr>
+        <p:spPr>
+          <a:xfrm>
+            <a:off x="431999" y="413238"/>
+            <a:ext cx="10425391" cy="450762"/>
+          </a:xfrm>
+          <a:prstGeom prst="rect">
+            <a:avLst/>
+          </a:prstGeom>
+        </p:spPr>
+        <p:txBody>
+          <a:bodyPr rtlCol="0" anchor="ctr">
+            <a:normAutofit/>
+          </a:bodyPr>
+          <a:lstStyle/>
+          <a:p>
+            <a:pPr rtl="0"/>
+            <a:r>
+              <a:rPr lang="it-IT" dirty="0"/>
+              <a:t>KALMAN FILTER PERFORMANCE</a:t>
+            </a:r>
+          </a:p>
+        </p:txBody>
+      </p:sp>
+      <mc:AlternateContent xmlns:mc="http://schemas.openxmlformats.org/markup-compatibility/2006">
+        <mc:Choice xmlns:a14="http://schemas.microsoft.com/office/drawing/2010/main" Requires="a14">
+          <p:sp>
+            <p:nvSpPr>
+              <p:cNvPr id="7" name="Rectangle 6">
+                <a:extLst>
+                  <a:ext uri="{FF2B5EF4-FFF2-40B4-BE49-F238E27FC236}">
+                    <a16:creationId xmlns:a16="http://schemas.microsoft.com/office/drawing/2014/main" id="{28277CB6-6666-40F4-935A-E5B84D104CD2}"/>
+                  </a:ext>
+                </a:extLst>
+              </p:cNvPr>
+              <p:cNvSpPr/>
+              <p:nvPr/>
+            </p:nvSpPr>
+            <p:spPr>
+              <a:xfrm>
+                <a:off x="431999" y="1640761"/>
+                <a:ext cx="5001365" cy="3896067"/>
+              </a:xfrm>
+              <a:prstGeom prst="rect">
+                <a:avLst/>
+              </a:prstGeom>
+            </p:spPr>
+            <p:txBody>
+              <a:bodyPr wrap="square">
+                <a:spAutoFit/>
+              </a:bodyPr>
+              <a:lstStyle/>
+              <a:p>
+                <a:pPr marL="342900" indent="-342900">
+                  <a:buFont typeface="Arial" panose="020B0604020202020204" pitchFamily="34" charset="0"/>
+                  <a:buChar char="•"/>
+                </a:pPr>
+                <a:r>
+                  <a:rPr lang="it-IT" sz="1600" dirty="0">
+                    <a:solidFill>
+                      <a:schemeClr val="accent3"/>
+                    </a:solidFill>
+                  </a:rPr>
+                  <a:t>Reset Toy MonteCarlo to have smeared helix points: </a:t>
+                </a:r>
+                <a:r>
+                  <a:rPr lang="it-IT" sz="1600" dirty="0"/>
+                  <a:t>same</a:t>
+                </a:r>
+                <a:r>
+                  <a:rPr lang="it-IT" sz="1600" dirty="0">
+                    <a:solidFill>
+                      <a:schemeClr val="accent3"/>
+                    </a:solidFill>
+                  </a:rPr>
+                  <a:t> </a:t>
+                </a:r>
+                <a:r>
+                  <a:rPr lang="it-IT" sz="1600" dirty="0"/>
+                  <a:t>initial coordinates: </a:t>
+                </a:r>
+                <a14:m>
+                  <m:oMath xmlns:m="http://schemas.openxmlformats.org/officeDocument/2006/math">
+                    <m:sSubSup>
+                      <m:sSubSupPr>
+                        <m:ctrlPr>
+                          <a:rPr lang="it-IT" sz="1600" i="1">
+                            <a:latin typeface="Cambria Math" panose="02040503050406030204" pitchFamily="18" charset="0"/>
+                          </a:rPr>
+                        </m:ctrlPr>
+                      </m:sSubSupPr>
+                      <m:e>
+                        <m:r>
+                          <a:rPr lang="it-IT" sz="1600" i="1">
+                            <a:latin typeface="Cambria Math" panose="02040503050406030204" pitchFamily="18" charset="0"/>
+                          </a:rPr>
+                          <m:t>𝑥</m:t>
+                        </m:r>
+                      </m:e>
+                      <m:sub>
+                        <m:r>
+                          <a:rPr lang="it-IT" sz="1600" b="0" i="1" smtClean="0">
+                            <a:latin typeface="Cambria Math" panose="02040503050406030204" pitchFamily="18" charset="0"/>
+                          </a:rPr>
+                          <m:t>𝑖</m:t>
+                        </m:r>
+                      </m:sub>
+                      <m:sup>
+                        <m:r>
+                          <a:rPr lang="it-IT" sz="1600" i="1">
+                            <a:latin typeface="Cambria Math" panose="02040503050406030204" pitchFamily="18" charset="0"/>
+                          </a:rPr>
+                          <m:t>𝑇</m:t>
+                        </m:r>
+                      </m:sup>
+                    </m:sSubSup>
+                    <m:r>
+                      <a:rPr lang="it-IT" sz="1600" i="1">
+                        <a:latin typeface="Cambria Math" panose="02040503050406030204" pitchFamily="18" charset="0"/>
+                      </a:rPr>
+                      <m:t>=</m:t>
+                    </m:r>
+                    <m:m>
+                      <m:mPr>
+                        <m:mcs>
+                          <m:mc>
+                            <m:mcPr>
+                              <m:count m:val="3"/>
+                              <m:mcJc m:val="center"/>
+                            </m:mcPr>
+                          </m:mc>
+                        </m:mcs>
+                        <m:ctrlPr>
+                          <a:rPr lang="it-IT" sz="1600" i="1">
+                            <a:latin typeface="Cambria Math" panose="02040503050406030204" pitchFamily="18" charset="0"/>
+                          </a:rPr>
+                        </m:ctrlPr>
+                      </m:mPr>
+                      <m:mr>
+                        <m:e>
+                          <m:r>
+                            <m:rPr>
+                              <m:brk m:alnAt="7"/>
+                            </m:rPr>
+                            <a:rPr lang="it-IT" sz="1600" i="1">
+                              <a:latin typeface="Cambria Math" panose="02040503050406030204" pitchFamily="18" charset="0"/>
+                            </a:rPr>
+                            <m:t>(</m:t>
+                          </m:r>
+                          <m:sSub>
+                            <m:sSubPr>
+                              <m:ctrlPr>
+                                <a:rPr lang="it-IT" sz="1600" i="1">
+                                  <a:latin typeface="Cambria Math" panose="02040503050406030204" pitchFamily="18" charset="0"/>
+                                </a:rPr>
+                              </m:ctrlPr>
+                            </m:sSubPr>
+                            <m:e>
+                              <m:r>
+                                <a:rPr lang="it-IT" sz="1600" b="0" i="1" smtClean="0">
+                                  <a:latin typeface="Cambria Math" panose="02040503050406030204" pitchFamily="18" charset="0"/>
+                                </a:rPr>
+                                <m:t>𝑦</m:t>
+                              </m:r>
+                            </m:e>
+                            <m:sub>
+                              <m:r>
+                                <a:rPr lang="it-IT" sz="1600" b="0" i="1" smtClean="0">
+                                  <a:latin typeface="Cambria Math" panose="02040503050406030204" pitchFamily="18" charset="0"/>
+                                </a:rPr>
+                                <m:t>𝑖</m:t>
+                              </m:r>
+                            </m:sub>
+                          </m:sSub>
+                        </m:e>
+                        <m:e>
+                          <m:sSub>
+                            <m:sSubPr>
+                              <m:ctrlPr>
+                                <a:rPr lang="it-IT" sz="1600" i="1">
+                                  <a:latin typeface="Cambria Math" panose="02040503050406030204" pitchFamily="18" charset="0"/>
+                                </a:rPr>
+                              </m:ctrlPr>
+                            </m:sSubPr>
+                            <m:e>
+                              <m:r>
+                                <a:rPr lang="it-IT" sz="1600" i="1">
+                                  <a:latin typeface="Cambria Math" panose="02040503050406030204" pitchFamily="18" charset="0"/>
+                                </a:rPr>
+                                <m:t>𝑧</m:t>
+                              </m:r>
+                            </m:e>
+                            <m:sub>
+                              <m:r>
+                                <a:rPr lang="it-IT" sz="1600" b="0" i="1" smtClean="0">
+                                  <a:latin typeface="Cambria Math" panose="02040503050406030204" pitchFamily="18" charset="0"/>
+                                </a:rPr>
+                                <m:t>𝑖</m:t>
+                              </m:r>
+                            </m:sub>
+                          </m:sSub>
+                        </m:e>
+                        <m:e>
+                          <m:r>
+                            <a:rPr lang="it-IT" sz="1600" i="1">
+                              <a:latin typeface="Cambria Math" panose="02040503050406030204" pitchFamily="18" charset="0"/>
+                            </a:rPr>
+                            <m:t>1/</m:t>
+                          </m:r>
+                          <m:sSub>
+                            <m:sSubPr>
+                              <m:ctrlPr>
+                                <a:rPr lang="it-IT" sz="1600" i="1">
+                                  <a:latin typeface="Cambria Math" panose="02040503050406030204" pitchFamily="18" charset="0"/>
+                                </a:rPr>
+                              </m:ctrlPr>
+                            </m:sSubPr>
+                            <m:e>
+                              <m:r>
+                                <a:rPr lang="it-IT" sz="1600" i="1">
+                                  <a:latin typeface="Cambria Math" panose="02040503050406030204" pitchFamily="18" charset="0"/>
+                                </a:rPr>
+                                <m:t>𝑟</m:t>
+                              </m:r>
+                            </m:e>
+                            <m:sub>
+                              <m:r>
+                                <a:rPr lang="it-IT" sz="1600" b="0" i="1" smtClean="0">
+                                  <a:latin typeface="Cambria Math" panose="02040503050406030204" pitchFamily="18" charset="0"/>
+                                </a:rPr>
+                                <m:t>𝑖</m:t>
+                              </m:r>
+                            </m:sub>
+                          </m:sSub>
+                        </m:e>
+                      </m:mr>
+                    </m:m>
+                    <m:r>
+                      <a:rPr lang="it-IT" sz="1600" i="1">
+                        <a:latin typeface="Cambria Math" panose="02040503050406030204" pitchFamily="18" charset="0"/>
+                      </a:rPr>
+                      <m:t>    </m:t>
+                    </m:r>
+                    <m:m>
+                      <m:mPr>
+                        <m:mcs>
+                          <m:mc>
+                            <m:mcPr>
+                              <m:count m:val="2"/>
+                              <m:mcJc m:val="center"/>
+                            </m:mcPr>
+                          </m:mc>
+                        </m:mcs>
+                        <m:ctrlPr>
+                          <a:rPr lang="it-IT" sz="1600" i="1">
+                            <a:latin typeface="Cambria Math" panose="02040503050406030204" pitchFamily="18" charset="0"/>
+                          </a:rPr>
+                        </m:ctrlPr>
+                      </m:mPr>
+                      <m:mr>
+                        <m:e>
+                          <m:sSub>
+                            <m:sSubPr>
+                              <m:ctrlPr>
+                                <a:rPr lang="it-IT" sz="1600" i="1">
+                                  <a:latin typeface="Cambria Math" panose="02040503050406030204" pitchFamily="18" charset="0"/>
+                                </a:rPr>
+                              </m:ctrlPr>
+                            </m:sSubPr>
+                            <m:e>
+                              <m:r>
+                                <a:rPr lang="it-IT" sz="1600" i="1">
+                                  <a:latin typeface="Cambria Math" panose="02040503050406030204" pitchFamily="18" charset="0"/>
+                                </a:rPr>
+                                <m:t>𝜙</m:t>
+                              </m:r>
+                            </m:e>
+                            <m:sub>
+                              <m:r>
+                                <a:rPr lang="it-IT" sz="1600" b="0" i="1" smtClean="0">
+                                  <a:latin typeface="Cambria Math" panose="02040503050406030204" pitchFamily="18" charset="0"/>
+                                </a:rPr>
+                                <m:t>𝑖</m:t>
+                              </m:r>
+                            </m:sub>
+                          </m:sSub>
+                        </m:e>
+                        <m:e>
+                          <m:sSub>
+                            <m:sSubPr>
+                              <m:ctrlPr>
+                                <a:rPr lang="it-IT" sz="1600" i="1">
+                                  <a:latin typeface="Cambria Math" panose="02040503050406030204" pitchFamily="18" charset="0"/>
+                                </a:rPr>
+                              </m:ctrlPr>
+                            </m:sSubPr>
+                            <m:e>
+                              <m:r>
+                                <a:rPr lang="it-IT" sz="1600" i="1">
+                                  <a:latin typeface="Cambria Math" panose="02040503050406030204" pitchFamily="18" charset="0"/>
+                                </a:rPr>
+                                <m:t>𝜆</m:t>
+                              </m:r>
+                            </m:e>
+                            <m:sub>
+                              <m:r>
+                                <a:rPr lang="it-IT" sz="1600" b="0" i="1" smtClean="0">
+                                  <a:latin typeface="Cambria Math" panose="02040503050406030204" pitchFamily="18" charset="0"/>
+                                </a:rPr>
+                                <m:t>𝑖</m:t>
+                              </m:r>
+                            </m:sub>
+                          </m:sSub>
+                        </m:e>
+                      </m:mr>
+                    </m:m>
+                    <m:r>
+                      <a:rPr lang="it-IT" sz="1600" i="1">
+                        <a:latin typeface="Cambria Math" panose="02040503050406030204" pitchFamily="18" charset="0"/>
+                      </a:rPr>
+                      <m:t>)=</m:t>
+                    </m:r>
+                    <m:d>
+                      <m:dPr>
+                        <m:ctrlPr>
+                          <a:rPr lang="it-IT" sz="1600" i="1">
+                            <a:latin typeface="Cambria Math" panose="02040503050406030204" pitchFamily="18" charset="0"/>
+                          </a:rPr>
+                        </m:ctrlPr>
+                      </m:dPr>
+                      <m:e>
+                        <m:m>
+                          <m:mPr>
+                            <m:mcs>
+                              <m:mc>
+                                <m:mcPr>
+                                  <m:count m:val="3"/>
+                                  <m:mcJc m:val="center"/>
+                                </m:mcPr>
+                              </m:mc>
+                            </m:mcs>
+                            <m:ctrlPr>
+                              <a:rPr lang="it-IT" sz="1600" i="1">
+                                <a:latin typeface="Cambria Math" panose="02040503050406030204" pitchFamily="18" charset="0"/>
+                              </a:rPr>
+                            </m:ctrlPr>
+                          </m:mPr>
+                          <m:mr>
+                            <m:e>
+                              <m:sSubSup>
+                                <m:sSubSupPr>
+                                  <m:ctrlPr>
+                                    <a:rPr lang="it-IT" sz="1600" b="0" i="1" smtClean="0">
+                                      <a:latin typeface="Cambria Math" panose="02040503050406030204" pitchFamily="18" charset="0"/>
+                                    </a:rPr>
+                                  </m:ctrlPr>
+                                </m:sSubSupPr>
+                                <m:e>
+                                  <m:r>
+                                    <m:rPr>
+                                      <m:brk m:alnAt="7"/>
+                                    </m:rPr>
+                                    <a:rPr lang="it-IT" sz="1600" b="0" i="1" smtClean="0">
+                                      <a:latin typeface="Cambria Math" panose="02040503050406030204" pitchFamily="18" charset="0"/>
+                                    </a:rPr>
+                                    <m:t>𝑦</m:t>
+                                  </m:r>
+                                </m:e>
+                                <m:sub>
+                                  <m:r>
+                                    <a:rPr lang="it-IT" sz="1600" b="0" i="1" smtClean="0">
+                                      <a:latin typeface="Cambria Math" panose="02040503050406030204" pitchFamily="18" charset="0"/>
+                                    </a:rPr>
+                                    <m:t>1</m:t>
+                                  </m:r>
+                                </m:sub>
+                                <m:sup>
+                                  <m:r>
+                                    <m:rPr>
+                                      <m:brk m:alnAt="7"/>
+                                    </m:rPr>
+                                    <a:rPr lang="it-IT" sz="1600" b="0" i="1" smtClean="0">
+                                      <a:latin typeface="Cambria Math" panose="02040503050406030204" pitchFamily="18" charset="0"/>
+                                    </a:rPr>
+                                    <m:t>h</m:t>
+                                  </m:r>
+                                </m:sup>
+                              </m:sSubSup>
+                            </m:e>
+                            <m:e>
+                              <m:sSubSup>
+                                <m:sSubSupPr>
+                                  <m:ctrlPr>
+                                    <a:rPr lang="it-IT" sz="1600" b="0" i="1" smtClean="0">
+                                      <a:latin typeface="Cambria Math" panose="02040503050406030204" pitchFamily="18" charset="0"/>
+                                    </a:rPr>
+                                  </m:ctrlPr>
+                                </m:sSubSupPr>
+                                <m:e>
+                                  <m:r>
+                                    <a:rPr lang="it-IT" sz="1600" b="0" i="1" smtClean="0">
+                                      <a:latin typeface="Cambria Math" panose="02040503050406030204" pitchFamily="18" charset="0"/>
+                                    </a:rPr>
+                                    <m:t>𝑧</m:t>
+                                  </m:r>
+                                </m:e>
+                                <m:sub>
+                                  <m:r>
+                                    <a:rPr lang="it-IT" sz="1600" b="0" i="1" smtClean="0">
+                                      <a:latin typeface="Cambria Math" panose="02040503050406030204" pitchFamily="18" charset="0"/>
+                                    </a:rPr>
+                                    <m:t>1</m:t>
+                                  </m:r>
+                                </m:sub>
+                                <m:sup>
+                                  <m:r>
+                                    <a:rPr lang="it-IT" sz="1600" b="0" i="1" smtClean="0">
+                                      <a:latin typeface="Cambria Math" panose="02040503050406030204" pitchFamily="18" charset="0"/>
+                                    </a:rPr>
+                                    <m:t>h</m:t>
+                                  </m:r>
+                                </m:sup>
+                              </m:sSubSup>
+                            </m:e>
+                            <m:e>
+                              <m:r>
+                                <a:rPr lang="it-IT" sz="1600" b="0" i="1" smtClean="0">
+                                  <a:latin typeface="Cambria Math" panose="02040503050406030204" pitchFamily="18" charset="0"/>
+                                </a:rPr>
+                                <m:t>0.014 </m:t>
+                              </m:r>
+                              <m:r>
+                                <a:rPr lang="it-IT" sz="1600" b="0" i="1" smtClean="0">
+                                  <a:latin typeface="Cambria Math" panose="02040503050406030204" pitchFamily="18" charset="0"/>
+                                </a:rPr>
+                                <m:t>𝑐</m:t>
+                              </m:r>
+                              <m:sSup>
+                                <m:sSupPr>
+                                  <m:ctrlPr>
+                                    <a:rPr lang="it-IT" sz="1600" b="0" i="1" smtClean="0">
+                                      <a:latin typeface="Cambria Math" panose="02040503050406030204" pitchFamily="18" charset="0"/>
+                                    </a:rPr>
+                                  </m:ctrlPr>
+                                </m:sSupPr>
+                                <m:e>
+                                  <m:r>
+                                    <a:rPr lang="it-IT" sz="1600" b="0" i="1" smtClean="0">
+                                      <a:latin typeface="Cambria Math" panose="02040503050406030204" pitchFamily="18" charset="0"/>
+                                    </a:rPr>
+                                    <m:t>𝑚</m:t>
+                                  </m:r>
+                                </m:e>
+                                <m:sup>
+                                  <m:r>
+                                    <a:rPr lang="it-IT" sz="1600" b="0" i="1" smtClean="0">
+                                      <a:latin typeface="Cambria Math" panose="02040503050406030204" pitchFamily="18" charset="0"/>
+                                    </a:rPr>
+                                    <m:t>−1</m:t>
+                                  </m:r>
+                                </m:sup>
+                              </m:sSup>
+                            </m:e>
+                          </m:mr>
+                        </m:m>
+                        <m:r>
+                          <a:rPr lang="it-IT" sz="1600" i="1">
+                            <a:latin typeface="Cambria Math" panose="02040503050406030204" pitchFamily="18" charset="0"/>
+                          </a:rPr>
+                          <m:t>    </m:t>
+                        </m:r>
+                        <m:m>
+                          <m:mPr>
+                            <m:mcs>
+                              <m:mc>
+                                <m:mcPr>
+                                  <m:count m:val="2"/>
+                                  <m:mcJc m:val="center"/>
+                                </m:mcPr>
+                              </m:mc>
+                            </m:mcs>
+                            <m:ctrlPr>
+                              <a:rPr lang="it-IT" sz="1600" i="1">
+                                <a:latin typeface="Cambria Math" panose="02040503050406030204" pitchFamily="18" charset="0"/>
+                              </a:rPr>
+                            </m:ctrlPr>
+                          </m:mPr>
+                          <m:mr>
+                            <m:e>
+                              <m:r>
+                                <m:rPr>
+                                  <m:brk m:alnAt="7"/>
+                                </m:rPr>
+                                <a:rPr lang="it-IT" sz="1600" b="0" i="1" smtClean="0">
+                                  <a:latin typeface="Cambria Math" panose="02040503050406030204" pitchFamily="18" charset="0"/>
+                                </a:rPr>
+                                <m:t>6</m:t>
+                              </m:r>
+                              <m:r>
+                                <a:rPr lang="it-IT" sz="1600" b="0" i="1" smtClean="0">
+                                  <a:latin typeface="Cambria Math" panose="02040503050406030204" pitchFamily="18" charset="0"/>
+                                </a:rPr>
+                                <m:t> </m:t>
+                              </m:r>
+                              <m:r>
+                                <m:rPr>
+                                  <m:sty m:val="p"/>
+                                </m:rPr>
+                                <a:rPr lang="it-IT" sz="1600" b="0" i="1" smtClean="0">
+                                  <a:latin typeface="Cambria Math" panose="02040503050406030204" pitchFamily="18" charset="0"/>
+                                </a:rPr>
+                                <m:t>rad</m:t>
+                              </m:r>
+                            </m:e>
+                            <m:e>
+                              <m:r>
+                                <a:rPr lang="it-IT" sz="1600" b="0" i="1" smtClean="0">
+                                  <a:latin typeface="Cambria Math" panose="02040503050406030204" pitchFamily="18" charset="0"/>
+                                </a:rPr>
+                                <m:t>−0.05 </m:t>
+                              </m:r>
+                              <m:r>
+                                <m:rPr>
+                                  <m:sty m:val="p"/>
+                                </m:rPr>
+                                <a:rPr lang="it-IT" sz="1600" b="0" i="1" smtClean="0">
+                                  <a:latin typeface="Cambria Math" panose="02040503050406030204" pitchFamily="18" charset="0"/>
+                                </a:rPr>
+                                <m:t>rad</m:t>
+                              </m:r>
+                            </m:e>
+                          </m:mr>
+                        </m:m>
+                      </m:e>
+                    </m:d>
+                  </m:oMath>
+                </a14:m>
+                <a:endParaRPr lang="it-IT" sz="1600" b="0" dirty="0"/>
+              </a:p>
+              <a:p>
+                <a:endParaRPr lang="it-IT" sz="1600" b="0" dirty="0"/>
+              </a:p>
+              <a:p>
+                <a:pPr marL="342900" indent="-342900">
+                  <a:buFont typeface="Arial" panose="020B0604020202020204" pitchFamily="34" charset="0"/>
+                  <a:buChar char="•"/>
+                </a:pPr>
+                <a:r>
+                  <a:rPr lang="it-IT" sz="1600" dirty="0"/>
+                  <a:t>The </a:t>
+                </a:r>
+                <a:r>
+                  <a:rPr lang="it-IT" sz="1600" dirty="0">
+                    <a:solidFill>
+                      <a:schemeClr val="accent3"/>
+                    </a:solidFill>
+                  </a:rPr>
+                  <a:t>initial free parameter </a:t>
+                </a:r>
+                <a:r>
+                  <a:rPr lang="it-IT" sz="1600" dirty="0"/>
+                  <a:t>is </a:t>
+                </a:r>
+                <a14:m>
+                  <m:oMath xmlns:m="http://schemas.openxmlformats.org/officeDocument/2006/math">
+                    <m:sSub>
+                      <m:sSubPr>
+                        <m:ctrlPr>
+                          <a:rPr lang="it-IT" sz="1600" b="0" i="1" smtClean="0">
+                            <a:latin typeface="Cambria Math" panose="02040503050406030204" pitchFamily="18" charset="0"/>
+                          </a:rPr>
+                        </m:ctrlPr>
+                      </m:sSubPr>
+                      <m:e>
+                        <m:r>
+                          <a:rPr lang="it-IT" sz="1600" b="0" i="1" smtClean="0">
+                            <a:latin typeface="Cambria Math" panose="02040503050406030204" pitchFamily="18" charset="0"/>
+                          </a:rPr>
+                          <m:t>𝑥</m:t>
+                        </m:r>
+                      </m:e>
+                      <m:sub>
+                        <m:r>
+                          <a:rPr lang="it-IT" sz="1600" b="0" i="1" smtClean="0">
+                            <a:latin typeface="Cambria Math" panose="02040503050406030204" pitchFamily="18" charset="0"/>
+                          </a:rPr>
+                          <m:t>𝑖</m:t>
+                        </m:r>
+                      </m:sub>
+                    </m:sSub>
+                    <m:r>
+                      <a:rPr lang="it-IT" sz="1600" b="0" i="1" smtClean="0">
+                        <a:latin typeface="Cambria Math" panose="02040503050406030204" pitchFamily="18" charset="0"/>
+                      </a:rPr>
+                      <m:t>=</m:t>
+                    </m:r>
+                    <m:sSubSup>
+                      <m:sSubSupPr>
+                        <m:ctrlPr>
+                          <a:rPr lang="it-IT" sz="1600" b="0" i="1" smtClean="0">
+                            <a:latin typeface="Cambria Math" panose="02040503050406030204" pitchFamily="18" charset="0"/>
+                          </a:rPr>
+                        </m:ctrlPr>
+                      </m:sSubSupPr>
+                      <m:e>
+                        <m:r>
+                          <a:rPr lang="it-IT" sz="1600" b="0" i="1" smtClean="0">
+                            <a:latin typeface="Cambria Math" panose="02040503050406030204" pitchFamily="18" charset="0"/>
+                          </a:rPr>
+                          <m:t>𝑥</m:t>
+                        </m:r>
+                      </m:e>
+                      <m:sub>
+                        <m:r>
+                          <a:rPr lang="it-IT" sz="1600" b="0" i="1" smtClean="0">
+                            <a:latin typeface="Cambria Math" panose="02040503050406030204" pitchFamily="18" charset="0"/>
+                          </a:rPr>
+                          <m:t>1</m:t>
+                        </m:r>
+                      </m:sub>
+                      <m:sup>
+                        <m:r>
+                          <a:rPr lang="it-IT" sz="1600" b="0" i="1" smtClean="0">
+                            <a:latin typeface="Cambria Math" panose="02040503050406030204" pitchFamily="18" charset="0"/>
+                          </a:rPr>
+                          <m:t>h</m:t>
+                        </m:r>
+                      </m:sup>
+                    </m:sSubSup>
+                  </m:oMath>
+                </a14:m>
+                <a:r>
+                  <a:rPr lang="it-IT" sz="1600" dirty="0"/>
+                  <a:t> with step </a:t>
+                </a:r>
+                <a14:m>
+                  <m:oMath xmlns:m="http://schemas.openxmlformats.org/officeDocument/2006/math">
+                    <m:r>
+                      <a:rPr lang="it-IT" sz="1600" b="0" i="1" smtClean="0">
+                        <a:latin typeface="Cambria Math" panose="02040503050406030204" pitchFamily="18" charset="0"/>
+                      </a:rPr>
+                      <m:t>𝑑</m:t>
+                    </m:r>
+                    <m:sSub>
+                      <m:sSubPr>
+                        <m:ctrlPr>
+                          <a:rPr lang="it-IT" sz="1600" b="0" i="1" smtClean="0">
+                            <a:latin typeface="Cambria Math" panose="02040503050406030204" pitchFamily="18" charset="0"/>
+                          </a:rPr>
+                        </m:ctrlPr>
+                      </m:sSubPr>
+                      <m:e>
+                        <m:r>
+                          <a:rPr lang="it-IT" sz="1600" b="0" i="1" smtClean="0">
+                            <a:latin typeface="Cambria Math" panose="02040503050406030204" pitchFamily="18" charset="0"/>
+                          </a:rPr>
+                          <m:t>𝑥</m:t>
+                        </m:r>
+                      </m:e>
+                      <m:sub>
+                        <m:r>
+                          <a:rPr lang="it-IT" sz="1600" b="0" i="1" smtClean="0">
+                            <a:latin typeface="Cambria Math" panose="02040503050406030204" pitchFamily="18" charset="0"/>
+                          </a:rPr>
+                          <m:t>𝑘</m:t>
+                        </m:r>
+                      </m:sub>
+                    </m:sSub>
+                    <m:r>
+                      <a:rPr lang="it-IT" sz="1600" b="0" i="1" smtClean="0">
+                        <a:latin typeface="Cambria Math" panose="02040503050406030204" pitchFamily="18" charset="0"/>
+                      </a:rPr>
+                      <m:t>=</m:t>
+                    </m:r>
+                    <m:r>
+                      <a:rPr lang="it-IT" sz="1600" b="0" i="1" smtClean="0">
+                        <a:latin typeface="Cambria Math" panose="02040503050406030204" pitchFamily="18" charset="0"/>
+                      </a:rPr>
+                      <m:t>𝐺𝑎𝑢𝑠𝑠</m:t>
+                    </m:r>
+                    <m:r>
+                      <a:rPr lang="it-IT" sz="1600" b="0" i="1" smtClean="0">
+                        <a:latin typeface="Cambria Math" panose="02040503050406030204" pitchFamily="18" charset="0"/>
+                      </a:rPr>
+                      <m:t>(0.04</m:t>
+                    </m:r>
+                    <m:r>
+                      <m:rPr>
+                        <m:sty m:val="p"/>
+                      </m:rPr>
+                      <a:rPr lang="it-IT" sz="1600" b="0" i="1" smtClean="0">
+                        <a:latin typeface="Cambria Math" panose="02040503050406030204" pitchFamily="18" charset="0"/>
+                      </a:rPr>
+                      <m:t>cm</m:t>
+                    </m:r>
+                    <m:r>
+                      <a:rPr lang="it-IT" sz="1600" b="0" i="1" smtClean="0">
+                        <a:latin typeface="Cambria Math" panose="02040503050406030204" pitchFamily="18" charset="0"/>
+                      </a:rPr>
+                      <m:t>,0.01</m:t>
+                    </m:r>
+                    <m:r>
+                      <m:rPr>
+                        <m:sty m:val="p"/>
+                      </m:rPr>
+                      <a:rPr lang="it-IT" sz="1600" b="0" i="1" smtClean="0">
+                        <a:latin typeface="Cambria Math" panose="02040503050406030204" pitchFamily="18" charset="0"/>
+                      </a:rPr>
+                      <m:t>cm</m:t>
+                    </m:r>
+                    <m:r>
+                      <a:rPr lang="it-IT" sz="1600" b="0" i="1" smtClean="0">
+                        <a:latin typeface="Cambria Math" panose="02040503050406030204" pitchFamily="18" charset="0"/>
+                      </a:rPr>
+                      <m:t>)</m:t>
+                    </m:r>
+                  </m:oMath>
+                </a14:m>
+                <a:endParaRPr lang="it-IT" sz="1600" dirty="0"/>
+              </a:p>
+              <a:p>
+                <a:endParaRPr lang="it-IT" sz="1600" dirty="0"/>
+              </a:p>
+              <a:p>
+                <a:pPr marL="342900" indent="-342900">
+                  <a:buFont typeface="Arial" panose="020B0604020202020204" pitchFamily="34" charset="0"/>
+                  <a:buChar char="•"/>
+                </a:pPr>
+                <a:r>
+                  <a:rPr lang="it-IT" sz="1600" dirty="0"/>
+                  <a:t>After being evaluated for the current </a:t>
+                </a:r>
+                <a14:m>
+                  <m:oMath xmlns:m="http://schemas.openxmlformats.org/officeDocument/2006/math">
+                    <m:sSub>
+                      <m:sSubPr>
+                        <m:ctrlPr>
+                          <a:rPr lang="it-IT" sz="1600" i="1">
+                            <a:latin typeface="Cambria Math" panose="02040503050406030204" pitchFamily="18" charset="0"/>
+                          </a:rPr>
+                        </m:ctrlPr>
+                      </m:sSubPr>
+                      <m:e>
+                        <m:r>
+                          <a:rPr lang="it-IT" sz="1600" i="1">
+                            <a:latin typeface="Cambria Math" panose="02040503050406030204" pitchFamily="18" charset="0"/>
+                          </a:rPr>
+                          <m:t>𝑥</m:t>
+                        </m:r>
+                      </m:e>
+                      <m:sub>
+                        <m:r>
+                          <a:rPr lang="it-IT" sz="1600" b="0" i="1" smtClean="0">
+                            <a:latin typeface="Cambria Math" panose="02040503050406030204" pitchFamily="18" charset="0"/>
+                          </a:rPr>
+                          <m:t>𝑘</m:t>
+                        </m:r>
+                      </m:sub>
+                    </m:sSub>
+                  </m:oMath>
+                </a14:m>
+                <a:r>
+                  <a:rPr lang="it-IT" sz="1600" dirty="0"/>
+                  <a:t> as if we had a perfect helix, the </a:t>
+                </a:r>
+                <a14:m>
+                  <m:oMath xmlns:m="http://schemas.openxmlformats.org/officeDocument/2006/math">
+                    <m:sSub>
+                      <m:sSubPr>
+                        <m:ctrlPr>
+                          <a:rPr lang="it-IT" sz="1600" i="1">
+                            <a:latin typeface="Cambria Math" panose="02040503050406030204" pitchFamily="18" charset="0"/>
+                          </a:rPr>
+                        </m:ctrlPr>
+                      </m:sSubPr>
+                      <m:e>
+                        <m:r>
+                          <a:rPr lang="it-IT" sz="1600" b="0" i="1" smtClean="0">
+                            <a:latin typeface="Cambria Math" panose="02040503050406030204" pitchFamily="18" charset="0"/>
+                          </a:rPr>
+                          <m:t>𝑦</m:t>
+                        </m:r>
+                      </m:e>
+                      <m:sub>
+                        <m:r>
+                          <a:rPr lang="it-IT" sz="1600" b="0" i="1" smtClean="0">
+                            <a:latin typeface="Cambria Math" panose="02040503050406030204" pitchFamily="18" charset="0"/>
+                          </a:rPr>
+                          <m:t>𝑘</m:t>
+                        </m:r>
+                      </m:sub>
+                    </m:sSub>
+                  </m:oMath>
+                </a14:m>
+                <a:r>
+                  <a:rPr lang="it-IT" sz="1600" dirty="0"/>
+                  <a:t> and </a:t>
+                </a:r>
+                <a14:m>
+                  <m:oMath xmlns:m="http://schemas.openxmlformats.org/officeDocument/2006/math">
+                    <m:sSub>
+                      <m:sSubPr>
+                        <m:ctrlPr>
+                          <a:rPr lang="it-IT" sz="1600" i="1">
+                            <a:latin typeface="Cambria Math" panose="02040503050406030204" pitchFamily="18" charset="0"/>
+                          </a:rPr>
+                        </m:ctrlPr>
+                      </m:sSubPr>
+                      <m:e>
+                        <m:r>
+                          <a:rPr lang="it-IT" sz="1600" b="0" i="1" smtClean="0">
+                            <a:latin typeface="Cambria Math" panose="02040503050406030204" pitchFamily="18" charset="0"/>
+                          </a:rPr>
+                          <m:t>𝑧</m:t>
+                        </m:r>
+                      </m:e>
+                      <m:sub>
+                        <m:r>
+                          <a:rPr lang="it-IT" sz="1600" b="0" i="1" smtClean="0">
+                            <a:latin typeface="Cambria Math" panose="02040503050406030204" pitchFamily="18" charset="0"/>
+                          </a:rPr>
+                          <m:t>𝑘</m:t>
+                        </m:r>
+                      </m:sub>
+                    </m:sSub>
+                  </m:oMath>
+                </a14:m>
+                <a:r>
+                  <a:rPr lang="it-IT" sz="1600" dirty="0"/>
+                  <a:t> are smeared with a Gauss distibution: </a:t>
+                </a:r>
+                <a14:m>
+                  <m:oMath xmlns:m="http://schemas.openxmlformats.org/officeDocument/2006/math">
+                    <m:r>
+                      <a:rPr lang="it-IT" sz="1600" b="0" i="1" smtClean="0">
+                        <a:solidFill>
+                          <a:schemeClr val="accent3"/>
+                        </a:solidFill>
+                        <a:latin typeface="Cambria Math" panose="02040503050406030204" pitchFamily="18" charset="0"/>
+                      </a:rPr>
+                      <m:t>𝐺𝑎𝑢𝑠𝑠</m:t>
+                    </m:r>
+                    <m:d>
+                      <m:dPr>
+                        <m:ctrlPr>
+                          <a:rPr lang="it-IT" sz="1600" b="0" i="1" smtClean="0">
+                            <a:solidFill>
+                              <a:schemeClr val="accent3"/>
+                            </a:solidFill>
+                            <a:latin typeface="Cambria Math" panose="02040503050406030204" pitchFamily="18" charset="0"/>
+                          </a:rPr>
+                        </m:ctrlPr>
+                      </m:dPr>
+                      <m:e>
+                        <m:sSub>
+                          <m:sSubPr>
+                            <m:ctrlPr>
+                              <a:rPr lang="it-IT" sz="1600" b="0" i="1" smtClean="0">
+                                <a:solidFill>
+                                  <a:schemeClr val="accent3"/>
+                                </a:solidFill>
+                                <a:latin typeface="Cambria Math" panose="02040503050406030204" pitchFamily="18" charset="0"/>
+                              </a:rPr>
+                            </m:ctrlPr>
+                          </m:sSubPr>
+                          <m:e>
+                            <m:r>
+                              <a:rPr lang="it-IT" sz="1600" b="0" i="1" smtClean="0">
+                                <a:solidFill>
+                                  <a:schemeClr val="accent3"/>
+                                </a:solidFill>
+                                <a:latin typeface="Cambria Math" panose="02040503050406030204" pitchFamily="18" charset="0"/>
+                              </a:rPr>
+                              <m:t>𝑦</m:t>
+                            </m:r>
+                          </m:e>
+                          <m:sub>
+                            <m:r>
+                              <a:rPr lang="it-IT" sz="1600" b="0" i="1" smtClean="0">
+                                <a:solidFill>
+                                  <a:schemeClr val="accent3"/>
+                                </a:solidFill>
+                                <a:latin typeface="Cambria Math" panose="02040503050406030204" pitchFamily="18" charset="0"/>
+                              </a:rPr>
+                              <m:t>𝑘</m:t>
+                            </m:r>
+                          </m:sub>
+                        </m:sSub>
+                        <m:r>
+                          <a:rPr lang="it-IT" sz="1600" b="0" i="1" smtClean="0">
+                            <a:solidFill>
+                              <a:schemeClr val="accent3"/>
+                            </a:solidFill>
+                            <a:latin typeface="Cambria Math" panose="02040503050406030204" pitchFamily="18" charset="0"/>
+                          </a:rPr>
+                          <m:t>,4</m:t>
+                        </m:r>
+                        <m:r>
+                          <m:rPr>
+                            <m:sty m:val="p"/>
+                          </m:rPr>
+                          <a:rPr lang="it-IT" sz="1600" b="0" i="1" smtClean="0">
+                            <a:solidFill>
+                              <a:schemeClr val="accent3"/>
+                            </a:solidFill>
+                            <a:latin typeface="Cambria Math" panose="02040503050406030204" pitchFamily="18" charset="0"/>
+                          </a:rPr>
+                          <m:t>cm</m:t>
+                        </m:r>
+                      </m:e>
+                    </m:d>
+                  </m:oMath>
+                </a14:m>
+                <a:endParaRPr lang="it-IT" sz="1600" b="0" dirty="0"/>
+              </a:p>
+              <a:p>
+                <a:endParaRPr lang="it-IT" sz="1600" dirty="0"/>
+              </a:p>
+              <a:p>
+                <a:pPr marL="342900" indent="-342900">
+                  <a:buFont typeface="Arial" panose="020B0604020202020204" pitchFamily="34" charset="0"/>
+                  <a:buChar char="•"/>
+                </a:pPr>
+                <a:r>
+                  <a:rPr lang="it-IT" sz="1600" dirty="0"/>
+                  <a:t>The </a:t>
+                </a:r>
+                <a:r>
+                  <a:rPr lang="it-IT" sz="1600" dirty="0">
+                    <a:solidFill>
+                      <a:schemeClr val="accent3"/>
+                    </a:solidFill>
+                  </a:rPr>
+                  <a:t>error matrix </a:t>
+                </a:r>
+                <a14:m>
+                  <m:oMath xmlns:m="http://schemas.openxmlformats.org/officeDocument/2006/math">
+                    <m:r>
+                      <a:rPr lang="it-IT" sz="1600" b="0" i="1" smtClean="0">
+                        <a:solidFill>
+                          <a:schemeClr val="accent3"/>
+                        </a:solidFill>
+                        <a:latin typeface="Cambria Math" panose="02040503050406030204" pitchFamily="18" charset="0"/>
+                      </a:rPr>
+                      <m:t>𝑅</m:t>
+                    </m:r>
+                  </m:oMath>
+                </a14:m>
+                <a:r>
+                  <a:rPr lang="it-IT" sz="1600" dirty="0">
+                    <a:solidFill>
+                      <a:schemeClr val="accent3"/>
+                    </a:solidFill>
+                  </a:rPr>
+                  <a:t> </a:t>
+                </a:r>
+                <a:r>
+                  <a:rPr lang="it-IT" sz="1600" dirty="0"/>
+                  <a:t>is coherent with the smearing:             </a:t>
+                </a:r>
+                <a14:m>
+                  <m:oMath xmlns:m="http://schemas.openxmlformats.org/officeDocument/2006/math">
+                    <m:r>
+                      <a:rPr lang="it-IT" sz="1600" b="0" i="1" smtClean="0">
+                        <a:latin typeface="Cambria Math" panose="02040503050406030204" pitchFamily="18" charset="0"/>
+                      </a:rPr>
+                      <m:t>𝑅</m:t>
+                    </m:r>
+                    <m:r>
+                      <a:rPr lang="it-IT" sz="1600" b="0" i="1" smtClean="0">
+                        <a:latin typeface="Cambria Math" panose="02040503050406030204" pitchFamily="18" charset="0"/>
+                      </a:rPr>
+                      <m:t>=</m:t>
+                    </m:r>
+                    <m:d>
+                      <m:dPr>
+                        <m:ctrlPr>
+                          <a:rPr lang="it-IT" sz="1600" b="0" i="1" smtClean="0">
+                            <a:latin typeface="Cambria Math" panose="02040503050406030204" pitchFamily="18" charset="0"/>
+                          </a:rPr>
+                        </m:ctrlPr>
+                      </m:dPr>
+                      <m:e>
+                        <m:m>
+                          <m:mPr>
+                            <m:mcs>
+                              <m:mc>
+                                <m:mcPr>
+                                  <m:count m:val="2"/>
+                                  <m:mcJc m:val="center"/>
+                                </m:mcPr>
+                              </m:mc>
+                            </m:mcs>
+                            <m:ctrlPr>
+                              <a:rPr lang="it-IT" sz="1600" b="0" i="1" smtClean="0">
+                                <a:latin typeface="Cambria Math" panose="02040503050406030204" pitchFamily="18" charset="0"/>
+                              </a:rPr>
+                            </m:ctrlPr>
+                          </m:mPr>
+                          <m:mr>
+                            <m:e>
+                              <m:sSubSup>
+                                <m:sSubSupPr>
+                                  <m:ctrlPr>
+                                    <a:rPr lang="it-IT" sz="1600" b="0" i="1" smtClean="0">
+                                      <a:latin typeface="Cambria Math" panose="02040503050406030204" pitchFamily="18" charset="0"/>
+                                    </a:rPr>
+                                  </m:ctrlPr>
+                                </m:sSubSupPr>
+                                <m:e>
+                                  <m:r>
+                                    <a:rPr lang="it-IT" sz="1600" b="0" i="1" smtClean="0">
+                                      <a:latin typeface="Cambria Math" panose="02040503050406030204" pitchFamily="18" charset="0"/>
+                                    </a:rPr>
+                                    <m:t>𝜎</m:t>
+                                  </m:r>
+                                </m:e>
+                                <m:sub>
+                                  <m:r>
+                                    <a:rPr lang="it-IT" sz="1600" b="0" i="1" smtClean="0">
+                                      <a:latin typeface="Cambria Math" panose="02040503050406030204" pitchFamily="18" charset="0"/>
+                                    </a:rPr>
+                                    <m:t>𝑦𝑧</m:t>
+                                  </m:r>
+                                </m:sub>
+                                <m:sup>
+                                  <m:r>
+                                    <a:rPr lang="it-IT" sz="1600" b="0" i="1" smtClean="0">
+                                      <a:latin typeface="Cambria Math" panose="02040503050406030204" pitchFamily="18" charset="0"/>
+                                    </a:rPr>
+                                    <m:t>2</m:t>
+                                  </m:r>
+                                </m:sup>
+                              </m:sSubSup>
+                            </m:e>
+                            <m:e>
+                              <m:r>
+                                <a:rPr lang="it-IT" sz="1600" b="0" i="1" smtClean="0">
+                                  <a:latin typeface="Cambria Math" panose="02040503050406030204" pitchFamily="18" charset="0"/>
+                                </a:rPr>
+                                <m:t>0</m:t>
+                              </m:r>
+                            </m:e>
+                          </m:mr>
+                          <m:mr>
+                            <m:e>
+                              <m:r>
+                                <a:rPr lang="it-IT" sz="1600" b="0" i="1" smtClean="0">
+                                  <a:latin typeface="Cambria Math" panose="02040503050406030204" pitchFamily="18" charset="0"/>
+                                </a:rPr>
+                                <m:t>0</m:t>
+                              </m:r>
+                            </m:e>
+                            <m:e>
+                              <m:sSubSup>
+                                <m:sSubSupPr>
+                                  <m:ctrlPr>
+                                    <a:rPr lang="it-IT" sz="1600" b="0" i="1" smtClean="0">
+                                      <a:latin typeface="Cambria Math" panose="02040503050406030204" pitchFamily="18" charset="0"/>
+                                    </a:rPr>
+                                  </m:ctrlPr>
+                                </m:sSubSupPr>
+                                <m:e>
+                                  <m:r>
+                                    <a:rPr lang="it-IT" sz="1600" b="0" i="1" smtClean="0">
+                                      <a:latin typeface="Cambria Math" panose="02040503050406030204" pitchFamily="18" charset="0"/>
+                                    </a:rPr>
+                                    <m:t>𝜎</m:t>
+                                  </m:r>
+                                </m:e>
+                                <m:sub>
+                                  <m:r>
+                                    <a:rPr lang="it-IT" sz="1600" b="0" i="1" smtClean="0">
+                                      <a:latin typeface="Cambria Math" panose="02040503050406030204" pitchFamily="18" charset="0"/>
+                                    </a:rPr>
+                                    <m:t>𝑦𝑧</m:t>
+                                  </m:r>
+                                </m:sub>
+                                <m:sup>
+                                  <m:r>
+                                    <a:rPr lang="it-IT" sz="1600" b="0" i="1" smtClean="0">
+                                      <a:latin typeface="Cambria Math" panose="02040503050406030204" pitchFamily="18" charset="0"/>
+                                    </a:rPr>
+                                    <m:t>2</m:t>
+                                  </m:r>
+                                </m:sup>
+                              </m:sSubSup>
+                            </m:e>
+                          </m:mr>
+                        </m:m>
+                      </m:e>
+                    </m:d>
+                    <m:r>
+                      <a:rPr lang="it-IT" sz="1600" b="0" i="1" smtClean="0">
+                        <a:latin typeface="Cambria Math" panose="02040503050406030204" pitchFamily="18" charset="0"/>
+                      </a:rPr>
+                      <m:t>=</m:t>
+                    </m:r>
+                    <m:d>
+                      <m:dPr>
+                        <m:ctrlPr>
+                          <a:rPr lang="it-IT" sz="1600" i="1">
+                            <a:latin typeface="Cambria Math" panose="02040503050406030204" pitchFamily="18" charset="0"/>
+                          </a:rPr>
+                        </m:ctrlPr>
+                      </m:dPr>
+                      <m:e>
+                        <m:m>
+                          <m:mPr>
+                            <m:mcs>
+                              <m:mc>
+                                <m:mcPr>
+                                  <m:count m:val="2"/>
+                                  <m:mcJc m:val="center"/>
+                                </m:mcPr>
+                              </m:mc>
+                            </m:mcs>
+                            <m:ctrlPr>
+                              <a:rPr lang="it-IT" sz="1600" i="1">
+                                <a:latin typeface="Cambria Math" panose="02040503050406030204" pitchFamily="18" charset="0"/>
+                              </a:rPr>
+                            </m:ctrlPr>
+                          </m:mPr>
+                          <m:mr>
+                            <m:e>
+                              <m:r>
+                                <m:rPr>
+                                  <m:brk m:alnAt="7"/>
+                                </m:rPr>
+                                <a:rPr lang="it-IT" sz="1600" b="0" i="1" smtClean="0">
+                                  <a:latin typeface="Cambria Math" panose="02040503050406030204" pitchFamily="18" charset="0"/>
+                                </a:rPr>
+                                <m:t>16</m:t>
+                              </m:r>
+                              <m:sSup>
+                                <m:sSupPr>
+                                  <m:ctrlPr>
+                                    <a:rPr lang="it-IT" sz="1600" b="0" i="1" smtClean="0">
+                                      <a:latin typeface="Cambria Math" panose="02040503050406030204" pitchFamily="18" charset="0"/>
+                                    </a:rPr>
+                                  </m:ctrlPr>
+                                </m:sSupPr>
+                                <m:e>
+                                  <m:r>
+                                    <m:rPr>
+                                      <m:sty m:val="p"/>
+                                      <m:brk m:alnAt="7"/>
+                                    </m:rPr>
+                                    <a:rPr lang="it-IT" sz="1600" b="0" i="0" smtClean="0">
+                                      <a:latin typeface="Cambria Math" panose="02040503050406030204" pitchFamily="18" charset="0"/>
+                                    </a:rPr>
+                                    <m:t>cm</m:t>
+                                  </m:r>
+                                </m:e>
+                                <m:sup>
+                                  <m:r>
+                                    <m:rPr>
+                                      <m:brk m:alnAt="7"/>
+                                    </m:rPr>
+                                    <a:rPr lang="it-IT" sz="1600" b="0" i="1" smtClean="0">
+                                      <a:latin typeface="Cambria Math" panose="02040503050406030204" pitchFamily="18" charset="0"/>
+                                    </a:rPr>
+                                    <m:t>2</m:t>
+                                  </m:r>
+                                </m:sup>
+                              </m:sSup>
+                            </m:e>
+                            <m:e>
+                              <m:r>
+                                <a:rPr lang="it-IT" sz="1600" i="1">
+                                  <a:latin typeface="Cambria Math" panose="02040503050406030204" pitchFamily="18" charset="0"/>
+                                </a:rPr>
+                                <m:t>0</m:t>
+                              </m:r>
+                            </m:e>
+                          </m:mr>
+                          <m:mr>
+                            <m:e>
+                              <m:r>
+                                <a:rPr lang="it-IT" sz="1600" i="1">
+                                  <a:latin typeface="Cambria Math" panose="02040503050406030204" pitchFamily="18" charset="0"/>
+                                </a:rPr>
+                                <m:t>0</m:t>
+                              </m:r>
+                            </m:e>
+                            <m:e>
+                              <m:r>
+                                <a:rPr lang="it-IT" sz="1600" b="0" i="1" smtClean="0">
+                                  <a:latin typeface="Cambria Math" panose="02040503050406030204" pitchFamily="18" charset="0"/>
+                                </a:rPr>
+                                <m:t>16</m:t>
+                              </m:r>
+                              <m:sSup>
+                                <m:sSupPr>
+                                  <m:ctrlPr>
+                                    <a:rPr lang="it-IT" sz="1600" b="0" i="1" smtClean="0">
+                                      <a:latin typeface="Cambria Math" panose="02040503050406030204" pitchFamily="18" charset="0"/>
+                                    </a:rPr>
+                                  </m:ctrlPr>
+                                </m:sSupPr>
+                                <m:e>
+                                  <m:r>
+                                    <m:rPr>
+                                      <m:sty m:val="p"/>
+                                    </m:rPr>
+                                    <a:rPr lang="it-IT" sz="1600" b="0" i="0" smtClean="0">
+                                      <a:latin typeface="Cambria Math" panose="02040503050406030204" pitchFamily="18" charset="0"/>
+                                    </a:rPr>
+                                    <m:t>cm</m:t>
+                                  </m:r>
+                                </m:e>
+                                <m:sup>
+                                  <m:r>
+                                    <a:rPr lang="it-IT" sz="1600" b="0" i="1" smtClean="0">
+                                      <a:latin typeface="Cambria Math" panose="02040503050406030204" pitchFamily="18" charset="0"/>
+                                    </a:rPr>
+                                    <m:t>2</m:t>
+                                  </m:r>
+                                </m:sup>
+                              </m:sSup>
+                            </m:e>
+                          </m:mr>
+                        </m:m>
+                      </m:e>
+                    </m:d>
+                  </m:oMath>
+                </a14:m>
+                <a:endParaRPr lang="it-IT" sz="1600" dirty="0"/>
+              </a:p>
+            </p:txBody>
+          </p:sp>
+        </mc:Choice>
+        <mc:Fallback>
+          <p:sp>
+            <p:nvSpPr>
+              <p:cNvPr id="7" name="Rectangle 6">
+                <a:extLst>
+                  <a:ext uri="{FF2B5EF4-FFF2-40B4-BE49-F238E27FC236}">
+                    <a16:creationId xmlns:a16="http://schemas.microsoft.com/office/drawing/2014/main" id="{28277CB6-6666-40F4-935A-E5B84D104CD2}"/>
+                  </a:ext>
+                </a:extLst>
+              </p:cNvPr>
+              <p:cNvSpPr>
+                <a:spLocks noRot="1" noChangeAspect="1" noMove="1" noResize="1" noEditPoints="1" noAdjustHandles="1" noChangeArrowheads="1" noChangeShapeType="1" noTextEdit="1"/>
+              </p:cNvSpPr>
+              <p:nvPr/>
+            </p:nvSpPr>
+            <p:spPr>
+              <a:xfrm>
+                <a:off x="431999" y="1640761"/>
+                <a:ext cx="5001365" cy="3896067"/>
+              </a:xfrm>
+              <a:prstGeom prst="rect">
+                <a:avLst/>
+              </a:prstGeom>
+              <a:blipFill>
+                <a:blip r:embed="rId2"/>
+                <a:stretch>
+                  <a:fillRect l="-488" t="-469" r="-5122"/>
+                </a:stretch>
+              </a:blipFill>
+            </p:spPr>
+            <p:txBody>
+              <a:bodyPr/>
+              <a:lstStyle/>
+              <a:p>
+                <a:r>
+                  <a:rPr lang="en-US">
+                    <a:noFill/>
+                  </a:rPr>
+                  <a:t> </a:t>
+                </a:r>
+              </a:p>
+            </p:txBody>
+          </p:sp>
+        </mc:Fallback>
+      </mc:AlternateContent>
+      <p:sp>
+        <p:nvSpPr>
+          <p:cNvPr id="24" name="Segnaposto numero diapositiva 5">
+            <a:extLst>
+              <a:ext uri="{FF2B5EF4-FFF2-40B4-BE49-F238E27FC236}">
+                <a16:creationId xmlns:a16="http://schemas.microsoft.com/office/drawing/2014/main" id="{C66DAD69-A13B-4F24-87EB-361EA46CEE80}"/>
+              </a:ext>
+            </a:extLst>
+          </p:cNvPr>
+          <p:cNvSpPr>
+            <a:spLocks noGrp="1"/>
+          </p:cNvSpPr>
+          <p:nvPr>
+            <p:ph type="sldNum" sz="quarter" idx="33"/>
+          </p:nvPr>
+        </p:nvSpPr>
+        <p:spPr>
+          <a:xfrm>
+            <a:off x="11772820" y="6401750"/>
+            <a:ext cx="278418" cy="274324"/>
+          </a:xfrm>
+          <a:prstGeom prst="rect">
+            <a:avLst/>
+          </a:prstGeom>
+        </p:spPr>
+        <p:txBody>
+          <a:bodyPr rtlCol="0" anchor="ctr">
+            <a:normAutofit/>
+          </a:bodyPr>
+          <a:lstStyle/>
+          <a:p>
+            <a:pPr rtl="0">
+              <a:spcAft>
+                <a:spcPts val="600"/>
+              </a:spcAft>
+            </a:pPr>
+            <a:fld id="{19B51A1E-902D-48AF-9020-955120F399B6}" type="slidenum">
+              <a:rPr lang="it-IT" smtClean="0"/>
+              <a:pPr rtl="0">
+                <a:spcAft>
+                  <a:spcPts val="600"/>
+                </a:spcAft>
+              </a:pPr>
+              <a:t>31</a:t>
+            </a:fld>
+            <a:endParaRPr lang="it-IT"/>
+          </a:p>
+        </p:txBody>
+      </p:sp>
+      <p:pic>
+        <p:nvPicPr>
+          <p:cNvPr id="4" name="Picture 3">
+            <a:extLst>
+              <a:ext uri="{FF2B5EF4-FFF2-40B4-BE49-F238E27FC236}">
+                <a16:creationId xmlns:a16="http://schemas.microsoft.com/office/drawing/2014/main" id="{5AD38D93-FD94-466D-B2BA-7BC8574DC763}"/>
+              </a:ext>
+            </a:extLst>
+          </p:cNvPr>
+          <p:cNvPicPr>
+            <a:picLocks noChangeAspect="1"/>
+          </p:cNvPicPr>
+          <p:nvPr/>
+        </p:nvPicPr>
+        <p:blipFill>
+          <a:blip r:embed="rId3">
+            <a:extLst>
+              <a:ext uri="{28A0092B-C50C-407E-A947-70E740481C1C}">
+                <a14:useLocalDpi xmlns:a14="http://schemas.microsoft.com/office/drawing/2010/main" val="0"/>
+              </a:ext>
+            </a:extLst>
+          </a:blip>
+          <a:srcRect/>
+          <a:stretch/>
+        </p:blipFill>
+        <p:spPr>
+          <a:xfrm>
+            <a:off x="5955238" y="1224916"/>
+            <a:ext cx="6096000" cy="4727759"/>
+          </a:xfrm>
+          <a:prstGeom prst="rect">
+            <a:avLst/>
+          </a:prstGeom>
+        </p:spPr>
+      </p:pic>
+    </p:spTree>
+    <p:extLst>
+      <p:ext uri="{BB962C8B-B14F-4D97-AF65-F5344CB8AC3E}">
+        <p14:creationId xmlns:p14="http://schemas.microsoft.com/office/powerpoint/2010/main" val="3353376391"/>
+      </p:ext>
+    </p:extLst>
+  </p:cSld>
+  <p:clrMapOvr>
+    <a:masterClrMapping/>
+  </p:clrMapOvr>
+</p:sld>
+</file>
+
+<file path=ppt/slides/slide32.xml><?xml version="1.0" encoding="utf-8"?>
+<p:sld xmlns:a="http://schemas.openxmlformats.org/drawingml/2006/main" xmlns:r="http://schemas.openxmlformats.org/officeDocument/2006/relationships" xmlns:p="http://schemas.openxmlformats.org/presentationml/2006/main">
+  <p:cSld>
+    <p:spTree>
+      <p:nvGrpSpPr>
+        <p:cNvPr id="1" name=""/>
+        <p:cNvGrpSpPr/>
+        <p:nvPr/>
+      </p:nvGrpSpPr>
+      <p:grpSpPr>
+        <a:xfrm>
+          <a:off x="0" y="0"/>
+          <a:ext cx="0" cy="0"/>
+          <a:chOff x="0" y="0"/>
+          <a:chExt cx="0" cy="0"/>
+        </a:xfrm>
+      </p:grpSpPr>
+      <p:sp>
+        <p:nvSpPr>
+          <p:cNvPr id="2" name="Titolo 1">
+            <a:extLst>
+              <a:ext uri="{FF2B5EF4-FFF2-40B4-BE49-F238E27FC236}">
+                <a16:creationId xmlns:a16="http://schemas.microsoft.com/office/drawing/2014/main" id="{AEA5083B-CC27-4F1C-AD03-E3DBEC1C9E78}"/>
+              </a:ext>
+            </a:extLst>
+          </p:cNvPr>
+          <p:cNvSpPr>
+            <a:spLocks noGrp="1"/>
+          </p:cNvSpPr>
+          <p:nvPr>
+            <p:ph type="title"/>
+          </p:nvPr>
+        </p:nvSpPr>
+        <p:spPr>
+          <a:xfrm>
+            <a:off x="431999" y="413238"/>
+            <a:ext cx="10425391" cy="450762"/>
+          </a:xfrm>
+          <a:prstGeom prst="rect">
+            <a:avLst/>
+          </a:prstGeom>
+        </p:spPr>
+        <p:txBody>
+          <a:bodyPr rtlCol="0" anchor="ctr">
+            <a:normAutofit/>
+          </a:bodyPr>
+          <a:lstStyle/>
+          <a:p>
+            <a:pPr rtl="0"/>
+            <a:r>
+              <a:rPr lang="it-IT" dirty="0"/>
+              <a:t>KALMAN FILTER PERFORMANCE</a:t>
+            </a:r>
+          </a:p>
+        </p:txBody>
+      </p:sp>
+      <mc:AlternateContent xmlns:mc="http://schemas.openxmlformats.org/markup-compatibility/2006" xmlns:a14="http://schemas.microsoft.com/office/drawing/2010/main">
+        <mc:Choice Requires="a14">
+          <p:sp>
+            <p:nvSpPr>
+              <p:cNvPr id="7" name="Rectangle 6">
+                <a:extLst>
+                  <a:ext uri="{FF2B5EF4-FFF2-40B4-BE49-F238E27FC236}">
+                    <a16:creationId xmlns:a16="http://schemas.microsoft.com/office/drawing/2014/main" id="{28277CB6-6666-40F4-935A-E5B84D104CD2}"/>
+                  </a:ext>
+                </a:extLst>
+              </p:cNvPr>
+              <p:cNvSpPr/>
+              <p:nvPr/>
+            </p:nvSpPr>
+            <p:spPr>
+              <a:xfrm>
+                <a:off x="626334" y="938330"/>
+                <a:ext cx="11126727" cy="830997"/>
+              </a:xfrm>
+              <a:prstGeom prst="rect">
+                <a:avLst/>
+              </a:prstGeom>
+            </p:spPr>
+            <p:txBody>
+              <a:bodyPr wrap="square">
+                <a:spAutoFit/>
+              </a:bodyPr>
+              <a:lstStyle/>
+              <a:p>
+                <a:pPr marL="342900" indent="-342900">
+                  <a:buFont typeface="Arial" panose="020B0604020202020204" pitchFamily="34" charset="0"/>
+                  <a:buChar char="•"/>
+                </a:pPr>
+                <a:r>
+                  <a:rPr lang="it-IT" sz="1600" dirty="0"/>
+                  <a:t>Plots describing the evolution of the estimate of the </a:t>
+                </a:r>
+                <a:r>
+                  <a:rPr lang="it-IT" sz="1600" dirty="0">
+                    <a:solidFill>
+                      <a:schemeClr val="accent3"/>
+                    </a:solidFill>
+                  </a:rPr>
+                  <a:t>measured quantities </a:t>
+                </a:r>
+                <a14:m>
+                  <m:oMath xmlns:m="http://schemas.openxmlformats.org/officeDocument/2006/math">
+                    <m:r>
+                      <a:rPr lang="it-IT" sz="1600" i="1">
+                        <a:solidFill>
+                          <a:schemeClr val="accent3"/>
+                        </a:solidFill>
+                        <a:latin typeface="Cambria Math" panose="02040503050406030204" pitchFamily="18" charset="0"/>
+                      </a:rPr>
+                      <m:t>(</m:t>
+                    </m:r>
+                    <m:r>
+                      <a:rPr lang="it-IT" sz="1600" i="1">
+                        <a:solidFill>
+                          <a:schemeClr val="accent3"/>
+                        </a:solidFill>
+                        <a:latin typeface="Cambria Math" panose="02040503050406030204" pitchFamily="18" charset="0"/>
+                      </a:rPr>
+                      <m:t>𝑦</m:t>
+                    </m:r>
+                    <m:r>
+                      <a:rPr lang="it-IT" sz="1600" i="1">
+                        <a:solidFill>
+                          <a:schemeClr val="accent3"/>
+                        </a:solidFill>
+                        <a:latin typeface="Cambria Math" panose="02040503050406030204" pitchFamily="18" charset="0"/>
+                      </a:rPr>
+                      <m:t>,</m:t>
+                    </m:r>
+                    <m:r>
+                      <a:rPr lang="it-IT" sz="1600" i="1">
+                        <a:solidFill>
+                          <a:schemeClr val="accent3"/>
+                        </a:solidFill>
+                        <a:latin typeface="Cambria Math" panose="02040503050406030204" pitchFamily="18" charset="0"/>
+                      </a:rPr>
+                      <m:t>𝑧</m:t>
+                    </m:r>
+                    <m:r>
+                      <a:rPr lang="it-IT" sz="1600" i="1">
+                        <a:solidFill>
+                          <a:schemeClr val="accent3"/>
+                        </a:solidFill>
+                        <a:latin typeface="Cambria Math" panose="02040503050406030204" pitchFamily="18" charset="0"/>
+                      </a:rPr>
+                      <m:t>)</m:t>
+                    </m:r>
+                  </m:oMath>
+                </a14:m>
+                <a:r>
+                  <a:rPr lang="it-IT" sz="1600" dirty="0">
+                    <a:solidFill>
+                      <a:schemeClr val="accent3"/>
+                    </a:solidFill>
+                  </a:rPr>
+                  <a:t> </a:t>
+                </a:r>
+                <a:r>
+                  <a:rPr lang="it-IT" sz="1600" dirty="0"/>
+                  <a:t>as a function of the </a:t>
+                </a:r>
+                <a:r>
+                  <a:rPr lang="it-IT" sz="1600" dirty="0">
+                    <a:solidFill>
+                      <a:schemeClr val="accent3"/>
+                    </a:solidFill>
+                  </a:rPr>
+                  <a:t>free parameter </a:t>
+                </a:r>
+                <a14:m>
+                  <m:oMath xmlns:m="http://schemas.openxmlformats.org/officeDocument/2006/math">
+                    <m:r>
+                      <a:rPr lang="it-IT" sz="1600" i="1">
+                        <a:solidFill>
+                          <a:schemeClr val="accent3"/>
+                        </a:solidFill>
+                        <a:latin typeface="Cambria Math" panose="02040503050406030204" pitchFamily="18" charset="0"/>
+                      </a:rPr>
+                      <m:t>𝑥</m:t>
+                    </m:r>
+                  </m:oMath>
+                </a14:m>
+                <a:r>
+                  <a:rPr lang="it-IT" sz="1600" dirty="0"/>
+                  <a:t> for the perfect helix. Note that the the fake TPC points have on the x coordinate the  fake measured value, while for the estimates we use the estimated x (i.e. </a:t>
+                </a:r>
+                <a14:m>
+                  <m:oMath xmlns:m="http://schemas.openxmlformats.org/officeDocument/2006/math">
+                    <m:sSub>
+                      <m:sSubPr>
+                        <m:ctrlPr>
+                          <a:rPr lang="it-IT" sz="1600" b="0" i="1" smtClean="0">
+                            <a:latin typeface="Cambria Math" panose="02040503050406030204" pitchFamily="18" charset="0"/>
+                          </a:rPr>
+                        </m:ctrlPr>
+                      </m:sSubPr>
+                      <m:e>
+                        <m:sSub>
+                          <m:sSubPr>
+                            <m:ctrlPr>
+                              <a:rPr lang="it-IT" sz="1600" b="0" i="1" smtClean="0">
+                                <a:latin typeface="Cambria Math" panose="02040503050406030204" pitchFamily="18" charset="0"/>
+                              </a:rPr>
+                            </m:ctrlPr>
+                          </m:sSubPr>
+                          <m:e>
+                            <m:r>
+                              <a:rPr lang="it-IT" sz="1600" b="0" i="1" smtClean="0">
+                                <a:latin typeface="Cambria Math" panose="02040503050406030204" pitchFamily="18" charset="0"/>
+                              </a:rPr>
+                              <m:t>𝑥</m:t>
+                            </m:r>
+                          </m:e>
+                          <m:sub>
+                            <m:r>
+                              <a:rPr lang="it-IT" sz="1600" b="0" i="1" smtClean="0">
+                                <a:latin typeface="Cambria Math" panose="02040503050406030204" pitchFamily="18" charset="0"/>
+                              </a:rPr>
+                              <m:t>𝑘</m:t>
+                            </m:r>
+                          </m:sub>
+                        </m:sSub>
+                        <m:r>
+                          <a:rPr lang="it-IT" sz="1600" b="0" i="1" smtClean="0">
+                            <a:latin typeface="Cambria Math" panose="02040503050406030204" pitchFamily="18" charset="0"/>
+                          </a:rPr>
+                          <m:t>=</m:t>
+                        </m:r>
+                        <m:r>
+                          <a:rPr lang="it-IT" sz="1600" b="0" i="1" smtClean="0">
+                            <a:latin typeface="Cambria Math" panose="02040503050406030204" pitchFamily="18" charset="0"/>
+                          </a:rPr>
+                          <m:t>𝑥</m:t>
+                        </m:r>
+                      </m:e>
+                      <m:sub>
+                        <m:r>
+                          <a:rPr lang="it-IT" sz="1600" b="0" i="1" smtClean="0">
+                            <a:latin typeface="Cambria Math" panose="02040503050406030204" pitchFamily="18" charset="0"/>
+                          </a:rPr>
+                          <m:t>0</m:t>
+                        </m:r>
+                      </m:sub>
+                    </m:sSub>
+                    <m:r>
+                      <a:rPr lang="it-IT" sz="1600" b="0" i="1" smtClean="0">
+                        <a:latin typeface="Cambria Math" panose="02040503050406030204" pitchFamily="18" charset="0"/>
+                      </a:rPr>
+                      <m:t>+</m:t>
+                    </m:r>
+                    <m:r>
+                      <a:rPr lang="it-IT" sz="1600" b="0" i="1" smtClean="0">
+                        <a:latin typeface="Cambria Math" panose="02040503050406030204" pitchFamily="18" charset="0"/>
+                      </a:rPr>
+                      <m:t>𝑘</m:t>
+                    </m:r>
+                    <m:r>
+                      <a:rPr lang="it-IT" sz="1600" b="0" i="1" smtClean="0">
+                        <a:latin typeface="Cambria Math" panose="02040503050406030204" pitchFamily="18" charset="0"/>
+                      </a:rPr>
+                      <m:t>×</m:t>
+                    </m:r>
+                    <m:r>
+                      <a:rPr lang="it-IT" sz="1600" b="0" i="1" smtClean="0">
+                        <a:latin typeface="Cambria Math" panose="02040503050406030204" pitchFamily="18" charset="0"/>
+                      </a:rPr>
+                      <m:t>𝑑</m:t>
+                    </m:r>
+                    <m:sSub>
+                      <m:sSubPr>
+                        <m:ctrlPr>
+                          <a:rPr lang="it-IT" sz="1600" b="0" i="1" smtClean="0">
+                            <a:latin typeface="Cambria Math" panose="02040503050406030204" pitchFamily="18" charset="0"/>
+                          </a:rPr>
+                        </m:ctrlPr>
+                      </m:sSubPr>
+                      <m:e>
+                        <m:r>
+                          <a:rPr lang="it-IT" sz="1600" b="0" i="1" smtClean="0">
+                            <a:latin typeface="Cambria Math" panose="02040503050406030204" pitchFamily="18" charset="0"/>
+                          </a:rPr>
+                          <m:t>𝑥</m:t>
+                        </m:r>
+                      </m:e>
+                      <m:sub>
+                        <m:r>
+                          <a:rPr lang="it-IT" sz="1600" b="0" i="1" smtClean="0">
+                            <a:latin typeface="Cambria Math" panose="02040503050406030204" pitchFamily="18" charset="0"/>
+                          </a:rPr>
+                          <m:t>𝑘</m:t>
+                        </m:r>
+                      </m:sub>
+                    </m:sSub>
+                  </m:oMath>
+                </a14:m>
+                <a:r>
+                  <a:rPr lang="it-IT" sz="1600" dirty="0"/>
+                  <a:t>)</a:t>
+                </a:r>
+              </a:p>
+            </p:txBody>
+          </p:sp>
+        </mc:Choice>
+        <mc:Fallback xmlns="">
+          <p:sp>
+            <p:nvSpPr>
+              <p:cNvPr id="7" name="Rectangle 6">
+                <a:extLst>
+                  <a:ext uri="{FF2B5EF4-FFF2-40B4-BE49-F238E27FC236}">
+                    <a16:creationId xmlns:a16="http://schemas.microsoft.com/office/drawing/2014/main" id="{28277CB6-6666-40F4-935A-E5B84D104CD2}"/>
+                  </a:ext>
+                </a:extLst>
+              </p:cNvPr>
+              <p:cNvSpPr>
+                <a:spLocks noRot="1" noChangeAspect="1" noMove="1" noResize="1" noEditPoints="1" noAdjustHandles="1" noChangeArrowheads="1" noChangeShapeType="1" noTextEdit="1"/>
+              </p:cNvSpPr>
+              <p:nvPr/>
+            </p:nvSpPr>
+            <p:spPr>
+              <a:xfrm>
+                <a:off x="626334" y="938330"/>
+                <a:ext cx="11126727" cy="830997"/>
+              </a:xfrm>
+              <a:prstGeom prst="rect">
+                <a:avLst/>
+              </a:prstGeom>
+              <a:blipFill>
+                <a:blip r:embed="rId2"/>
+                <a:stretch>
+                  <a:fillRect l="-219" t="-2206" r="-219" b="-8824"/>
+                </a:stretch>
+              </a:blipFill>
+            </p:spPr>
+            <p:txBody>
+              <a:bodyPr/>
+              <a:lstStyle/>
+              <a:p>
+                <a:r>
+                  <a:rPr lang="en-US">
+                    <a:noFill/>
+                  </a:rPr>
+                  <a:t> </a:t>
+                </a:r>
+              </a:p>
+            </p:txBody>
+          </p:sp>
+        </mc:Fallback>
+      </mc:AlternateContent>
+      <p:sp>
+        <p:nvSpPr>
+          <p:cNvPr id="24" name="Segnaposto numero diapositiva 5">
+            <a:extLst>
+              <a:ext uri="{FF2B5EF4-FFF2-40B4-BE49-F238E27FC236}">
+                <a16:creationId xmlns:a16="http://schemas.microsoft.com/office/drawing/2014/main" id="{C66DAD69-A13B-4F24-87EB-361EA46CEE80}"/>
+              </a:ext>
+            </a:extLst>
+          </p:cNvPr>
+          <p:cNvSpPr>
+            <a:spLocks noGrp="1"/>
+          </p:cNvSpPr>
+          <p:nvPr>
+            <p:ph type="sldNum" sz="quarter" idx="33"/>
+          </p:nvPr>
+        </p:nvSpPr>
+        <p:spPr>
+          <a:xfrm>
+            <a:off x="11772820" y="6401750"/>
+            <a:ext cx="278418" cy="274324"/>
+          </a:xfrm>
+          <a:prstGeom prst="rect">
+            <a:avLst/>
+          </a:prstGeom>
+        </p:spPr>
+        <p:txBody>
+          <a:bodyPr rtlCol="0" anchor="ctr">
+            <a:normAutofit/>
+          </a:bodyPr>
+          <a:lstStyle/>
+          <a:p>
+            <a:pPr rtl="0">
+              <a:spcAft>
+                <a:spcPts val="600"/>
+              </a:spcAft>
+            </a:pPr>
+            <a:fld id="{19B51A1E-902D-48AF-9020-955120F399B6}" type="slidenum">
+              <a:rPr lang="it-IT" smtClean="0"/>
+              <a:pPr rtl="0">
+                <a:spcAft>
+                  <a:spcPts val="600"/>
+                </a:spcAft>
+              </a:pPr>
+              <a:t>32</a:t>
+            </a:fld>
+            <a:endParaRPr lang="it-IT"/>
+          </a:p>
+        </p:txBody>
+      </p:sp>
+      <p:pic>
+        <p:nvPicPr>
+          <p:cNvPr id="5" name="Picture 4">
+            <a:extLst>
+              <a:ext uri="{FF2B5EF4-FFF2-40B4-BE49-F238E27FC236}">
+                <a16:creationId xmlns:a16="http://schemas.microsoft.com/office/drawing/2014/main" id="{B867C71A-AAC8-4B0F-BDB1-7C6CE23A4886}"/>
+              </a:ext>
+            </a:extLst>
+          </p:cNvPr>
+          <p:cNvPicPr>
+            <a:picLocks noChangeAspect="1"/>
+          </p:cNvPicPr>
+          <p:nvPr/>
+        </p:nvPicPr>
+        <p:blipFill>
+          <a:blip r:embed="rId3">
+            <a:extLst>
+              <a:ext uri="{28A0092B-C50C-407E-A947-70E740481C1C}">
+                <a14:useLocalDpi xmlns:a14="http://schemas.microsoft.com/office/drawing/2010/main" val="0"/>
+              </a:ext>
+            </a:extLst>
+          </a:blip>
+          <a:srcRect/>
+          <a:stretch/>
+        </p:blipFill>
+        <p:spPr>
+          <a:xfrm>
+            <a:off x="961886" y="1744709"/>
+            <a:ext cx="5227811" cy="4054434"/>
+          </a:xfrm>
+          <a:prstGeom prst="rect">
+            <a:avLst/>
+          </a:prstGeom>
+        </p:spPr>
+      </p:pic>
+      <p:pic>
+        <p:nvPicPr>
+          <p:cNvPr id="10" name="Picture 9">
+            <a:extLst>
+              <a:ext uri="{FF2B5EF4-FFF2-40B4-BE49-F238E27FC236}">
+                <a16:creationId xmlns:a16="http://schemas.microsoft.com/office/drawing/2014/main" id="{D31F8521-5F67-488B-A78A-8203974DDD63}"/>
+              </a:ext>
+            </a:extLst>
+          </p:cNvPr>
+          <p:cNvPicPr>
+            <a:picLocks noChangeAspect="1"/>
+          </p:cNvPicPr>
+          <p:nvPr/>
+        </p:nvPicPr>
+        <p:blipFill>
+          <a:blip r:embed="rId4">
+            <a:extLst>
+              <a:ext uri="{28A0092B-C50C-407E-A947-70E740481C1C}">
+                <a14:useLocalDpi xmlns:a14="http://schemas.microsoft.com/office/drawing/2010/main" val="0"/>
+              </a:ext>
+            </a:extLst>
+          </a:blip>
+          <a:srcRect/>
+          <a:stretch/>
+        </p:blipFill>
+        <p:spPr>
+          <a:xfrm>
+            <a:off x="6189698" y="1743995"/>
+            <a:ext cx="5227811" cy="4054434"/>
+          </a:xfrm>
+          <a:prstGeom prst="rect">
+            <a:avLst/>
+          </a:prstGeom>
+        </p:spPr>
+      </p:pic>
+      <p:sp>
+        <p:nvSpPr>
+          <p:cNvPr id="8" name="Arrow: Right 7">
+            <a:extLst>
+              <a:ext uri="{FF2B5EF4-FFF2-40B4-BE49-F238E27FC236}">
+                <a16:creationId xmlns:a16="http://schemas.microsoft.com/office/drawing/2014/main" id="{60559521-5B8D-443E-9558-D941B7AE2FFA}"/>
+              </a:ext>
+            </a:extLst>
+          </p:cNvPr>
+          <p:cNvSpPr/>
+          <p:nvPr/>
+        </p:nvSpPr>
+        <p:spPr>
+          <a:xfrm>
+            <a:off x="5565882" y="5846033"/>
+            <a:ext cx="1060233" cy="443883"/>
+          </a:xfrm>
+          <a:prstGeom prst="rightArrow">
+            <a:avLst/>
+          </a:prstGeom>
+          <a:solidFill>
+            <a:schemeClr val="accent1"/>
+          </a:solidFill>
+          <a:ln>
+            <a:solidFill>
+              <a:schemeClr val="accent1"/>
+            </a:solidFill>
+          </a:ln>
+        </p:spPr>
+        <p:style>
+          <a:lnRef idx="2">
+            <a:schemeClr val="accent1">
+              <a:shade val="50000"/>
+            </a:schemeClr>
+          </a:lnRef>
+          <a:fillRef idx="1">
+            <a:schemeClr val="accent1"/>
+          </a:fillRef>
+          <a:effectRef idx="0">
+            <a:schemeClr val="accent1"/>
+          </a:effectRef>
+          <a:fontRef idx="minor">
+            <a:schemeClr val="lt1"/>
+          </a:fontRef>
+        </p:style>
+        <p:txBody>
+          <a:bodyPr rtlCol="0" anchor="ctr"/>
+          <a:lstStyle/>
+          <a:p>
+            <a:pPr algn="ctr"/>
+            <a:endParaRPr lang="en-US"/>
+          </a:p>
+        </p:txBody>
+      </p:sp>
+      <p:sp>
+        <p:nvSpPr>
+          <p:cNvPr id="9" name="TextBox 8">
+            <a:extLst>
+              <a:ext uri="{FF2B5EF4-FFF2-40B4-BE49-F238E27FC236}">
+                <a16:creationId xmlns:a16="http://schemas.microsoft.com/office/drawing/2014/main" id="{5FE6D66D-A57C-4149-AD57-070E3C8AC1DC}"/>
+              </a:ext>
+            </a:extLst>
+          </p:cNvPr>
+          <p:cNvSpPr txBox="1"/>
+          <p:nvPr/>
+        </p:nvSpPr>
+        <p:spPr>
+          <a:xfrm>
+            <a:off x="4346156" y="6337520"/>
+            <a:ext cx="3499683" cy="338554"/>
+          </a:xfrm>
+          <a:prstGeom prst="rect">
+            <a:avLst/>
+          </a:prstGeom>
+          <a:noFill/>
+        </p:spPr>
+        <p:txBody>
+          <a:bodyPr wrap="square" rtlCol="0">
+            <a:spAutoFit/>
+          </a:bodyPr>
+          <a:lstStyle/>
+          <a:p>
+            <a:r>
+              <a:rPr lang="it-IT" sz="1600" dirty="0">
+                <a:solidFill>
+                  <a:schemeClr val="accent3"/>
+                </a:solidFill>
+              </a:rPr>
+              <a:t>FITTER PROPAGATION DIRECTION</a:t>
+            </a:r>
+            <a:endParaRPr lang="en-US" sz="1600" dirty="0">
+              <a:solidFill>
+                <a:schemeClr val="accent3"/>
+              </a:solidFill>
+            </a:endParaRPr>
+          </a:p>
+        </p:txBody>
+      </p:sp>
+    </p:spTree>
+    <p:extLst>
+      <p:ext uri="{BB962C8B-B14F-4D97-AF65-F5344CB8AC3E}">
+        <p14:creationId xmlns:p14="http://schemas.microsoft.com/office/powerpoint/2010/main" val="1425294435"/>
+      </p:ext>
+    </p:extLst>
+  </p:cSld>
+  <p:clrMapOvr>
+    <a:masterClrMapping/>
+  </p:clrMapOvr>
+</p:sld>
+</file>
+
+<file path=ppt/slides/slide33.xml><?xml version="1.0" encoding="utf-8"?>
+<p:sld xmlns:a="http://schemas.openxmlformats.org/drawingml/2006/main" xmlns:r="http://schemas.openxmlformats.org/officeDocument/2006/relationships" xmlns:p="http://schemas.openxmlformats.org/presentationml/2006/main">
+  <p:cSld>
+    <p:spTree>
+      <p:nvGrpSpPr>
+        <p:cNvPr id="1" name=""/>
+        <p:cNvGrpSpPr/>
+        <p:nvPr/>
+      </p:nvGrpSpPr>
+      <p:grpSpPr>
+        <a:xfrm>
+          <a:off x="0" y="0"/>
+          <a:ext cx="0" cy="0"/>
+          <a:chOff x="0" y="0"/>
+          <a:chExt cx="0" cy="0"/>
+        </a:xfrm>
+      </p:grpSpPr>
+      <p:sp>
+        <p:nvSpPr>
+          <p:cNvPr id="2" name="Titolo 1">
+            <a:extLst>
+              <a:ext uri="{FF2B5EF4-FFF2-40B4-BE49-F238E27FC236}">
+                <a16:creationId xmlns:a16="http://schemas.microsoft.com/office/drawing/2014/main" id="{AEA5083B-CC27-4F1C-AD03-E3DBEC1C9E78}"/>
+              </a:ext>
+            </a:extLst>
+          </p:cNvPr>
+          <p:cNvSpPr>
+            <a:spLocks noGrp="1"/>
+          </p:cNvSpPr>
+          <p:nvPr>
+            <p:ph type="title"/>
+          </p:nvPr>
+        </p:nvSpPr>
+        <p:spPr>
+          <a:xfrm>
+            <a:off x="431999" y="413238"/>
+            <a:ext cx="10425391" cy="450762"/>
+          </a:xfrm>
+          <a:prstGeom prst="rect">
+            <a:avLst/>
+          </a:prstGeom>
+        </p:spPr>
+        <p:txBody>
+          <a:bodyPr rtlCol="0" anchor="ctr">
+            <a:normAutofit/>
+          </a:bodyPr>
+          <a:lstStyle/>
+          <a:p>
+            <a:pPr rtl="0"/>
+            <a:r>
+              <a:rPr lang="it-IT" dirty="0"/>
+              <a:t>KALMAN FILTER PERFORMANCE</a:t>
+            </a:r>
+          </a:p>
+        </p:txBody>
+      </p:sp>
+      <mc:AlternateContent xmlns:mc="http://schemas.openxmlformats.org/markup-compatibility/2006" xmlns:a14="http://schemas.microsoft.com/office/drawing/2010/main">
+        <mc:Choice Requires="a14">
+          <p:sp>
+            <p:nvSpPr>
+              <p:cNvPr id="7" name="Rectangle 6">
+                <a:extLst>
+                  <a:ext uri="{FF2B5EF4-FFF2-40B4-BE49-F238E27FC236}">
+                    <a16:creationId xmlns:a16="http://schemas.microsoft.com/office/drawing/2014/main" id="{28277CB6-6666-40F4-935A-E5B84D104CD2}"/>
+                  </a:ext>
+                </a:extLst>
+              </p:cNvPr>
+              <p:cNvSpPr/>
+              <p:nvPr/>
+            </p:nvSpPr>
+            <p:spPr>
+              <a:xfrm>
+                <a:off x="626334" y="938330"/>
+                <a:ext cx="11126727" cy="584775"/>
+              </a:xfrm>
+              <a:prstGeom prst="rect">
+                <a:avLst/>
+              </a:prstGeom>
+            </p:spPr>
+            <p:txBody>
+              <a:bodyPr wrap="square">
+                <a:spAutoFit/>
+              </a:bodyPr>
+              <a:lstStyle/>
+              <a:p>
+                <a:pPr marL="342900" indent="-342900">
+                  <a:buFont typeface="Arial" panose="020B0604020202020204" pitchFamily="34" charset="0"/>
+                  <a:buChar char="•"/>
+                </a:pPr>
+                <a:r>
+                  <a:rPr lang="it-IT" sz="1600" dirty="0"/>
+                  <a:t>Plots describing the evolution of the estimate of the </a:t>
+                </a:r>
+                <a:r>
+                  <a:rPr lang="it-IT" sz="1600" dirty="0">
+                    <a:solidFill>
+                      <a:schemeClr val="accent3"/>
+                    </a:solidFill>
+                  </a:rPr>
+                  <a:t>measured quantities </a:t>
+                </a:r>
+                <a14:m>
+                  <m:oMath xmlns:m="http://schemas.openxmlformats.org/officeDocument/2006/math">
+                    <m:r>
+                      <a:rPr lang="it-IT" sz="1600" i="1">
+                        <a:solidFill>
+                          <a:schemeClr val="accent3"/>
+                        </a:solidFill>
+                        <a:latin typeface="Cambria Math" panose="02040503050406030204" pitchFamily="18" charset="0"/>
+                      </a:rPr>
+                      <m:t>(</m:t>
+                    </m:r>
+                    <m:r>
+                      <a:rPr lang="it-IT" sz="1600" i="1">
+                        <a:solidFill>
+                          <a:schemeClr val="accent3"/>
+                        </a:solidFill>
+                        <a:latin typeface="Cambria Math" panose="02040503050406030204" pitchFamily="18" charset="0"/>
+                      </a:rPr>
+                      <m:t>𝑦</m:t>
+                    </m:r>
+                    <m:r>
+                      <a:rPr lang="it-IT" sz="1600" i="1">
+                        <a:solidFill>
+                          <a:schemeClr val="accent3"/>
+                        </a:solidFill>
+                        <a:latin typeface="Cambria Math" panose="02040503050406030204" pitchFamily="18" charset="0"/>
+                      </a:rPr>
+                      <m:t>,</m:t>
+                    </m:r>
+                    <m:r>
+                      <a:rPr lang="it-IT" sz="1600" i="1">
+                        <a:solidFill>
+                          <a:schemeClr val="accent3"/>
+                        </a:solidFill>
+                        <a:latin typeface="Cambria Math" panose="02040503050406030204" pitchFamily="18" charset="0"/>
+                      </a:rPr>
+                      <m:t>𝑧</m:t>
+                    </m:r>
+                    <m:r>
+                      <a:rPr lang="it-IT" sz="1600" i="1">
+                        <a:solidFill>
+                          <a:schemeClr val="accent3"/>
+                        </a:solidFill>
+                        <a:latin typeface="Cambria Math" panose="02040503050406030204" pitchFamily="18" charset="0"/>
+                      </a:rPr>
+                      <m:t>)</m:t>
+                    </m:r>
+                  </m:oMath>
+                </a14:m>
+                <a:r>
+                  <a:rPr lang="it-IT" sz="1600" dirty="0">
+                    <a:solidFill>
+                      <a:schemeClr val="accent3"/>
+                    </a:solidFill>
+                  </a:rPr>
+                  <a:t> </a:t>
+                </a:r>
+                <a:r>
+                  <a:rPr lang="it-IT" sz="1600" dirty="0"/>
+                  <a:t>as a function of the </a:t>
+                </a:r>
+                <a:r>
+                  <a:rPr lang="it-IT" sz="1600" dirty="0">
+                    <a:solidFill>
+                      <a:schemeClr val="accent3"/>
+                    </a:solidFill>
+                  </a:rPr>
+                  <a:t>free parameter </a:t>
+                </a:r>
+                <a14:m>
+                  <m:oMath xmlns:m="http://schemas.openxmlformats.org/officeDocument/2006/math">
+                    <m:r>
+                      <a:rPr lang="it-IT" sz="1600" i="1">
+                        <a:solidFill>
+                          <a:schemeClr val="accent3"/>
+                        </a:solidFill>
+                        <a:latin typeface="Cambria Math" panose="02040503050406030204" pitchFamily="18" charset="0"/>
+                      </a:rPr>
+                      <m:t>𝑥</m:t>
+                    </m:r>
+                  </m:oMath>
+                </a14:m>
+                <a:r>
+                  <a:rPr lang="it-IT" sz="1600" dirty="0"/>
+                  <a:t> for the perfect helix. This time both the fake TPC points have on the x coordinate the fake measured value</a:t>
+                </a:r>
+              </a:p>
+            </p:txBody>
+          </p:sp>
+        </mc:Choice>
+        <mc:Fallback xmlns="">
+          <p:sp>
+            <p:nvSpPr>
+              <p:cNvPr id="7" name="Rectangle 6">
+                <a:extLst>
+                  <a:ext uri="{FF2B5EF4-FFF2-40B4-BE49-F238E27FC236}">
+                    <a16:creationId xmlns:a16="http://schemas.microsoft.com/office/drawing/2014/main" id="{28277CB6-6666-40F4-935A-E5B84D104CD2}"/>
+                  </a:ext>
+                </a:extLst>
+              </p:cNvPr>
+              <p:cNvSpPr>
+                <a:spLocks noRot="1" noChangeAspect="1" noMove="1" noResize="1" noEditPoints="1" noAdjustHandles="1" noChangeArrowheads="1" noChangeShapeType="1" noTextEdit="1"/>
+              </p:cNvSpPr>
+              <p:nvPr/>
+            </p:nvSpPr>
+            <p:spPr>
+              <a:xfrm>
+                <a:off x="626334" y="938330"/>
+                <a:ext cx="11126727" cy="584775"/>
+              </a:xfrm>
+              <a:prstGeom prst="rect">
+                <a:avLst/>
+              </a:prstGeom>
+              <a:blipFill>
+                <a:blip r:embed="rId2"/>
+                <a:stretch>
+                  <a:fillRect l="-219" t="-3125" b="-12500"/>
+                </a:stretch>
+              </a:blipFill>
+            </p:spPr>
+            <p:txBody>
+              <a:bodyPr/>
+              <a:lstStyle/>
+              <a:p>
+                <a:r>
+                  <a:rPr lang="en-US">
+                    <a:noFill/>
+                  </a:rPr>
+                  <a:t> </a:t>
+                </a:r>
+              </a:p>
+            </p:txBody>
+          </p:sp>
+        </mc:Fallback>
+      </mc:AlternateContent>
+      <p:sp>
+        <p:nvSpPr>
+          <p:cNvPr id="24" name="Segnaposto numero diapositiva 5">
+            <a:extLst>
+              <a:ext uri="{FF2B5EF4-FFF2-40B4-BE49-F238E27FC236}">
+                <a16:creationId xmlns:a16="http://schemas.microsoft.com/office/drawing/2014/main" id="{C66DAD69-A13B-4F24-87EB-361EA46CEE80}"/>
+              </a:ext>
+            </a:extLst>
+          </p:cNvPr>
+          <p:cNvSpPr>
+            <a:spLocks noGrp="1"/>
+          </p:cNvSpPr>
+          <p:nvPr>
+            <p:ph type="sldNum" sz="quarter" idx="33"/>
+          </p:nvPr>
+        </p:nvSpPr>
+        <p:spPr>
+          <a:xfrm>
+            <a:off x="11772820" y="6401750"/>
+            <a:ext cx="278418" cy="274324"/>
+          </a:xfrm>
+          <a:prstGeom prst="rect">
+            <a:avLst/>
+          </a:prstGeom>
+        </p:spPr>
+        <p:txBody>
+          <a:bodyPr rtlCol="0" anchor="ctr">
+            <a:normAutofit/>
+          </a:bodyPr>
+          <a:lstStyle/>
+          <a:p>
+            <a:pPr rtl="0">
+              <a:spcAft>
+                <a:spcPts val="600"/>
+              </a:spcAft>
+            </a:pPr>
+            <a:fld id="{19B51A1E-902D-48AF-9020-955120F399B6}" type="slidenum">
+              <a:rPr lang="it-IT" smtClean="0"/>
+              <a:pPr rtl="0">
+                <a:spcAft>
+                  <a:spcPts val="600"/>
+                </a:spcAft>
+              </a:pPr>
+              <a:t>33</a:t>
+            </a:fld>
+            <a:endParaRPr lang="it-IT"/>
+          </a:p>
+        </p:txBody>
+      </p:sp>
+      <p:pic>
+        <p:nvPicPr>
+          <p:cNvPr id="5" name="Picture 4">
+            <a:extLst>
+              <a:ext uri="{FF2B5EF4-FFF2-40B4-BE49-F238E27FC236}">
+                <a16:creationId xmlns:a16="http://schemas.microsoft.com/office/drawing/2014/main" id="{B867C71A-AAC8-4B0F-BDB1-7C6CE23A4886}"/>
+              </a:ext>
+            </a:extLst>
+          </p:cNvPr>
+          <p:cNvPicPr>
+            <a:picLocks noChangeAspect="1"/>
+          </p:cNvPicPr>
+          <p:nvPr/>
+        </p:nvPicPr>
+        <p:blipFill>
+          <a:blip r:embed="rId3">
+            <a:extLst>
+              <a:ext uri="{28A0092B-C50C-407E-A947-70E740481C1C}">
+                <a14:useLocalDpi xmlns:a14="http://schemas.microsoft.com/office/drawing/2010/main" val="0"/>
+              </a:ext>
+            </a:extLst>
+          </a:blip>
+          <a:srcRect/>
+          <a:stretch/>
+        </p:blipFill>
+        <p:spPr>
+          <a:xfrm>
+            <a:off x="961886" y="1744709"/>
+            <a:ext cx="5227810" cy="4054434"/>
+          </a:xfrm>
+          <a:prstGeom prst="rect">
+            <a:avLst/>
+          </a:prstGeom>
+        </p:spPr>
+      </p:pic>
+      <p:pic>
+        <p:nvPicPr>
+          <p:cNvPr id="10" name="Picture 9">
+            <a:extLst>
+              <a:ext uri="{FF2B5EF4-FFF2-40B4-BE49-F238E27FC236}">
+                <a16:creationId xmlns:a16="http://schemas.microsoft.com/office/drawing/2014/main" id="{D31F8521-5F67-488B-A78A-8203974DDD63}"/>
+              </a:ext>
+            </a:extLst>
+          </p:cNvPr>
+          <p:cNvPicPr>
+            <a:picLocks noChangeAspect="1"/>
+          </p:cNvPicPr>
+          <p:nvPr/>
+        </p:nvPicPr>
+        <p:blipFill>
+          <a:blip r:embed="rId4">
+            <a:extLst>
+              <a:ext uri="{28A0092B-C50C-407E-A947-70E740481C1C}">
+                <a14:useLocalDpi xmlns:a14="http://schemas.microsoft.com/office/drawing/2010/main" val="0"/>
+              </a:ext>
+            </a:extLst>
+          </a:blip>
+          <a:srcRect/>
+          <a:stretch/>
+        </p:blipFill>
+        <p:spPr>
+          <a:xfrm>
+            <a:off x="6189698" y="1743995"/>
+            <a:ext cx="5227810" cy="4054434"/>
+          </a:xfrm>
+          <a:prstGeom prst="rect">
+            <a:avLst/>
+          </a:prstGeom>
+        </p:spPr>
+      </p:pic>
+      <p:sp>
+        <p:nvSpPr>
+          <p:cNvPr id="8" name="Arrow: Right 7">
+            <a:extLst>
+              <a:ext uri="{FF2B5EF4-FFF2-40B4-BE49-F238E27FC236}">
+                <a16:creationId xmlns:a16="http://schemas.microsoft.com/office/drawing/2014/main" id="{60559521-5B8D-443E-9558-D941B7AE2FFA}"/>
+              </a:ext>
+            </a:extLst>
+          </p:cNvPr>
+          <p:cNvSpPr/>
+          <p:nvPr/>
+        </p:nvSpPr>
+        <p:spPr>
+          <a:xfrm>
+            <a:off x="5565882" y="5846033"/>
+            <a:ext cx="1060233" cy="443883"/>
+          </a:xfrm>
+          <a:prstGeom prst="rightArrow">
+            <a:avLst/>
+          </a:prstGeom>
+          <a:solidFill>
+            <a:schemeClr val="accent1"/>
+          </a:solidFill>
+          <a:ln>
+            <a:solidFill>
+              <a:schemeClr val="accent1"/>
+            </a:solidFill>
+          </a:ln>
+        </p:spPr>
+        <p:style>
+          <a:lnRef idx="2">
+            <a:schemeClr val="accent1">
+              <a:shade val="50000"/>
+            </a:schemeClr>
+          </a:lnRef>
+          <a:fillRef idx="1">
+            <a:schemeClr val="accent1"/>
+          </a:fillRef>
+          <a:effectRef idx="0">
+            <a:schemeClr val="accent1"/>
+          </a:effectRef>
+          <a:fontRef idx="minor">
+            <a:schemeClr val="lt1"/>
+          </a:fontRef>
+        </p:style>
+        <p:txBody>
+          <a:bodyPr rtlCol="0" anchor="ctr"/>
+          <a:lstStyle/>
+          <a:p>
+            <a:pPr algn="ctr"/>
+            <a:endParaRPr lang="en-US"/>
+          </a:p>
+        </p:txBody>
+      </p:sp>
+      <p:sp>
+        <p:nvSpPr>
+          <p:cNvPr id="9" name="TextBox 8">
+            <a:extLst>
+              <a:ext uri="{FF2B5EF4-FFF2-40B4-BE49-F238E27FC236}">
+                <a16:creationId xmlns:a16="http://schemas.microsoft.com/office/drawing/2014/main" id="{5FE6D66D-A57C-4149-AD57-070E3C8AC1DC}"/>
+              </a:ext>
+            </a:extLst>
+          </p:cNvPr>
+          <p:cNvSpPr txBox="1"/>
+          <p:nvPr/>
+        </p:nvSpPr>
+        <p:spPr>
+          <a:xfrm>
+            <a:off x="4346156" y="6337520"/>
+            <a:ext cx="3499683" cy="338554"/>
+          </a:xfrm>
+          <a:prstGeom prst="rect">
+            <a:avLst/>
+          </a:prstGeom>
+          <a:noFill/>
+        </p:spPr>
+        <p:txBody>
+          <a:bodyPr wrap="square" rtlCol="0">
+            <a:spAutoFit/>
+          </a:bodyPr>
+          <a:lstStyle/>
+          <a:p>
+            <a:r>
+              <a:rPr lang="it-IT" sz="1600" dirty="0">
+                <a:solidFill>
+                  <a:schemeClr val="accent3"/>
+                </a:solidFill>
+              </a:rPr>
+              <a:t>FITTER PROPAGATION DIRECTION</a:t>
+            </a:r>
+            <a:endParaRPr lang="en-US" sz="1600" dirty="0">
+              <a:solidFill>
+                <a:schemeClr val="accent3"/>
+              </a:solidFill>
+            </a:endParaRPr>
+          </a:p>
+        </p:txBody>
+      </p:sp>
+    </p:spTree>
+    <p:extLst>
+      <p:ext uri="{BB962C8B-B14F-4D97-AF65-F5344CB8AC3E}">
+        <p14:creationId xmlns:p14="http://schemas.microsoft.com/office/powerpoint/2010/main" val="4242187633"/>
+      </p:ext>
+    </p:extLst>
+  </p:cSld>
+  <p:clrMapOvr>
+    <a:masterClrMapping/>
+  </p:clrMapOvr>
+</p:sld>
+</file>
+
 <file path=ppt/slides/slide4.xml><?xml version="1.0" encoding="utf-8"?>
 <p:sld xmlns:a="http://schemas.openxmlformats.org/drawingml/2006/main" xmlns:r="http://schemas.openxmlformats.org/officeDocument/2006/relationships" xmlns:p="http://schemas.openxmlformats.org/presentationml/2006/main">
   <p:cSld>
@@ -36265,6 +38719,15 @@
 </file>
 
 <file path=customXml/item1.xml><?xml version="1.0" encoding="utf-8"?>
+<p:properties xmlns:p="http://schemas.microsoft.com/office/2006/metadata/properties" xmlns:xsi="http://www.w3.org/2001/XMLSchema-instance" xmlns:pc="http://schemas.microsoft.com/office/infopath/2007/PartnerControls">
+  <documentManagement>
+    <_ip_UnifiedCompliancePolicyUIAction xmlns="http://schemas.microsoft.com/sharepoint/v3" xsi:nil="true"/>
+    <_ip_UnifiedCompliancePolicyProperties xmlns="http://schemas.microsoft.com/sharepoint/v3" xsi:nil="true"/>
+  </documentManagement>
+</p:properties>
+</file>
+
+<file path=customXml/item2.xml><?xml version="1.0" encoding="utf-8"?>
 <ct:contentTypeSchema xmlns:ct="http://schemas.microsoft.com/office/2006/metadata/contentType" xmlns:ma="http://schemas.microsoft.com/office/2006/metadata/properties/metaAttributes" ct:_="" ma:_="" ma:contentTypeName="Document" ma:contentTypeID="0x010100DEEA25CC0A0AC24199CDC46C25B8B0BC" ma:contentTypeVersion="9" ma:contentTypeDescription="Create a new document." ma:contentTypeScope="" ma:versionID="76e25e1730b4532ab1d5e5b131a96a5a">
   <xsd:schema xmlns:xsd="http://www.w3.org/2001/XMLSchema" xmlns:xs="http://www.w3.org/2001/XMLSchema" xmlns:p="http://schemas.microsoft.com/office/2006/metadata/properties" xmlns:ns1="http://schemas.microsoft.com/sharepoint/v3" xmlns:ns2="6dc4bcd6-49db-4c07-9060-8acfc67cef9f" xmlns:ns3="fb0879af-3eba-417a-a55a-ffe6dcd6ca77" targetNamespace="http://schemas.microsoft.com/office/2006/metadata/properties" ma:root="true" ma:fieldsID="ad1e9281a84c4949647088091c718de3" ns1:_="" ns2:_="" ns3:_="">
     <xsd:import namespace="http://schemas.microsoft.com/sharepoint/v3"/>
@@ -36466,16 +38929,25 @@
 </ct:contentTypeSchema>
 </file>
 
-<file path=customXml/item2.xml><?xml version="1.0" encoding="utf-8"?>
-<p:properties xmlns:p="http://schemas.microsoft.com/office/2006/metadata/properties" xmlns:xsi="http://www.w3.org/2001/XMLSchema-instance" xmlns:pc="http://schemas.microsoft.com/office/infopath/2007/PartnerControls">
-  <documentManagement>
-    <_ip_UnifiedCompliancePolicyUIAction xmlns="http://schemas.microsoft.com/sharepoint/v3" xsi:nil="true"/>
-    <_ip_UnifiedCompliancePolicyProperties xmlns="http://schemas.microsoft.com/sharepoint/v3" xsi:nil="true"/>
-  </documentManagement>
-</p:properties>
+<file path=customXml/itemProps1.xml><?xml version="1.0" encoding="utf-8"?>
+<ds:datastoreItem xmlns:ds="http://schemas.openxmlformats.org/officeDocument/2006/customXml" ds:itemID="{8FB61CFE-D4DA-4753-A9A5-D482B9609A35}">
+  <ds:schemaRefs>
+    <ds:schemaRef ds:uri="6dc4bcd6-49db-4c07-9060-8acfc67cef9f"/>
+    <ds:schemaRef ds:uri="http://schemas.microsoft.com/office/2006/documentManagement/types"/>
+    <ds:schemaRef ds:uri="http://www.w3.org/XML/1998/namespace"/>
+    <ds:schemaRef ds:uri="http://purl.org/dc/elements/1.1/"/>
+    <ds:schemaRef ds:uri="http://schemas.openxmlformats.org/package/2006/metadata/core-properties"/>
+    <ds:schemaRef ds:uri="fb0879af-3eba-417a-a55a-ffe6dcd6ca77"/>
+    <ds:schemaRef ds:uri="http://purl.org/dc/terms/"/>
+    <ds:schemaRef ds:uri="http://schemas.microsoft.com/office/infopath/2007/PartnerControls"/>
+    <ds:schemaRef ds:uri="http://schemas.microsoft.com/sharepoint/v3"/>
+    <ds:schemaRef ds:uri="http://schemas.microsoft.com/office/2006/metadata/properties"/>
+    <ds:schemaRef ds:uri="http://purl.org/dc/dcmitype/"/>
+  </ds:schemaRefs>
+</ds:datastoreItem>
 </file>
 
-<file path=customXml/itemProps1.xml><?xml version="1.0" encoding="utf-8"?>
+<file path=customXml/itemProps2.xml><?xml version="1.0" encoding="utf-8"?>
 <ds:datastoreItem xmlns:ds="http://schemas.openxmlformats.org/officeDocument/2006/customXml" ds:itemID="{58A784AD-7888-482C-A72A-80D3063962ED}">
   <ds:schemaRefs>
     <ds:schemaRef ds:uri="http://schemas.microsoft.com/office/2006/metadata/contentType"/>
@@ -36493,22 +38965,4 @@
     <ds:schemaRef ds:uri="http://schemas.microsoft.com/internal/obd"/>
   </ds:schemaRefs>
 </ds:datastoreItem>
-</file>
-
-<file path=customXml/itemProps2.xml><?xml version="1.0" encoding="utf-8"?>
-<ds:datastoreItem xmlns:ds="http://schemas.openxmlformats.org/officeDocument/2006/customXml" ds:itemID="{8FB61CFE-D4DA-4753-A9A5-D482B9609A35}">
-  <ds:schemaRefs>
-    <ds:schemaRef ds:uri="6dc4bcd6-49db-4c07-9060-8acfc67cef9f"/>
-    <ds:schemaRef ds:uri="http://schemas.microsoft.com/office/2006/documentManagement/types"/>
-    <ds:schemaRef ds:uri="http://www.w3.org/XML/1998/namespace"/>
-    <ds:schemaRef ds:uri="http://purl.org/dc/elements/1.1/"/>
-    <ds:schemaRef ds:uri="http://schemas.openxmlformats.org/package/2006/metadata/core-properties"/>
-    <ds:schemaRef ds:uri="fb0879af-3eba-417a-a55a-ffe6dcd6ca77"/>
-    <ds:schemaRef ds:uri="http://purl.org/dc/terms/"/>
-    <ds:schemaRef ds:uri="http://schemas.microsoft.com/office/infopath/2007/PartnerControls"/>
-    <ds:schemaRef ds:uri="http://schemas.microsoft.com/sharepoint/v3"/>
-    <ds:schemaRef ds:uri="http://schemas.microsoft.com/office/2006/metadata/properties"/>
-    <ds:schemaRef ds:uri="http://purl.org/dc/dcmitype/"/>
-  </ds:schemaRefs>
-</ds:datastoreItem>
 </file>
</xml_diff>